<commit_message>
Presentation for 5th week is added
</commit_message>
<xml_diff>
--- a/Presentations/presentation5_4_sep/20250904_bi.pptx
+++ b/Presentations/presentation5_4_sep/20250904_bi.pptx
@@ -5,10 +5,10 @@
     <p:sldMasterId id="2147483715" r:id="rId5"/>
   </p:sldMasterIdLst>
   <p:notesMasterIdLst>
-    <p:notesMasterId r:id="rId32"/>
+    <p:notesMasterId r:id="rId44"/>
   </p:notesMasterIdLst>
   <p:handoutMasterIdLst>
-    <p:handoutMasterId r:id="rId33"/>
+    <p:handoutMasterId r:id="rId45"/>
   </p:handoutMasterIdLst>
   <p:sldIdLst>
     <p:sldId id="347" r:id="rId6"/>
@@ -34,14 +34,26 @@
     <p:sldId id="474" r:id="rId26"/>
     <p:sldId id="475" r:id="rId27"/>
     <p:sldId id="476" r:id="rId28"/>
-    <p:sldId id="417" r:id="rId29"/>
-    <p:sldId id="358" r:id="rId30"/>
-    <p:sldId id="257" r:id="rId31"/>
+    <p:sldId id="477" r:id="rId29"/>
+    <p:sldId id="482" r:id="rId30"/>
+    <p:sldId id="481" r:id="rId31"/>
+    <p:sldId id="480" r:id="rId32"/>
+    <p:sldId id="478" r:id="rId33"/>
+    <p:sldId id="479" r:id="rId34"/>
+    <p:sldId id="483" r:id="rId35"/>
+    <p:sldId id="484" r:id="rId36"/>
+    <p:sldId id="485" r:id="rId37"/>
+    <p:sldId id="486" r:id="rId38"/>
+    <p:sldId id="487" r:id="rId39"/>
+    <p:sldId id="488" r:id="rId40"/>
+    <p:sldId id="417" r:id="rId41"/>
+    <p:sldId id="358" r:id="rId42"/>
+    <p:sldId id="257" r:id="rId43"/>
   </p:sldIdLst>
   <p:sldSz cx="12192000" cy="6858000"/>
   <p:notesSz cx="7099300" cy="10234613"/>
   <p:custDataLst>
-    <p:tags r:id="rId34"/>
+    <p:tags r:id="rId46"/>
   </p:custDataLst>
   <p:defaultTextStyle>
     <a:defPPr>
@@ -3107,117 +3119,6 @@
     </pc:docChg>
   </pc:docChgLst>
   <pc:docChgLst>
-    <pc:chgData name="Luca Ricci" userId="S::10451631@polimi.it::ee5f09d5-0832-4e68-94c9-d8bfd2ad04f0" providerId="AD" clId="Web-{01963A96-2E06-E2CD-1350-082BA7D4CF1B}"/>
-    <pc:docChg chg="modSld">
-      <pc:chgData name="Luca Ricci" userId="S::10451631@polimi.it::ee5f09d5-0832-4e68-94c9-d8bfd2ad04f0" providerId="AD" clId="Web-{01963A96-2E06-E2CD-1350-082BA7D4CF1B}" dt="2024-01-24T10:24:38.882" v="320"/>
-      <pc:docMkLst>
-        <pc:docMk/>
-      </pc:docMkLst>
-      <pc:sldChg chg="addSp delSp modSp modNotes">
-        <pc:chgData name="Luca Ricci" userId="S::10451631@polimi.it::ee5f09d5-0832-4e68-94c9-d8bfd2ad04f0" providerId="AD" clId="Web-{01963A96-2E06-E2CD-1350-082BA7D4CF1B}" dt="2024-01-24T10:24:38.882" v="320"/>
-        <pc:sldMkLst>
-          <pc:docMk/>
-          <pc:sldMk cId="4109715435" sldId="313"/>
-        </pc:sldMkLst>
-        <pc:picChg chg="add del mod">
-          <ac:chgData name="Luca Ricci" userId="S::10451631@polimi.it::ee5f09d5-0832-4e68-94c9-d8bfd2ad04f0" providerId="AD" clId="Web-{01963A96-2E06-E2CD-1350-082BA7D4CF1B}" dt="2024-01-24T10:24:38.882" v="320"/>
-          <ac:picMkLst>
-            <pc:docMk/>
-            <pc:sldMk cId="4109715435" sldId="313"/>
-            <ac:picMk id="5" creationId="{CA4B9B14-FA33-53DB-09E4-CEE578977A56}"/>
-          </ac:picMkLst>
-        </pc:picChg>
-        <pc:picChg chg="del">
-          <ac:chgData name="Luca Ricci" userId="S::10451631@polimi.it::ee5f09d5-0832-4e68-94c9-d8bfd2ad04f0" providerId="AD" clId="Web-{01963A96-2E06-E2CD-1350-082BA7D4CF1B}" dt="2024-01-24T10:21:46.517" v="318"/>
-          <ac:picMkLst>
-            <pc:docMk/>
-            <pc:sldMk cId="4109715435" sldId="313"/>
-            <ac:picMk id="6" creationId="{081E3E13-A1F1-4FF3-9F97-8D0431E79976}"/>
-          </ac:picMkLst>
-        </pc:picChg>
-      </pc:sldChg>
-    </pc:docChg>
-  </pc:docChgLst>
-  <pc:docChgLst>
-    <pc:chgData name="Luca Ricci" userId="S::10451631@polimi.it::ee5f09d5-0832-4e68-94c9-d8bfd2ad04f0" providerId="AD" clId="Web-{B2D310EA-72CF-4690-94EE-78BFEA809EFD}"/>
-    <pc:docChg chg="modSld">
-      <pc:chgData name="Luca Ricci" userId="S::10451631@polimi.it::ee5f09d5-0832-4e68-94c9-d8bfd2ad04f0" providerId="AD" clId="Web-{B2D310EA-72CF-4690-94EE-78BFEA809EFD}" dt="2024-01-23T15:58:01.521" v="949" actId="20577"/>
-      <pc:docMkLst>
-        <pc:docMk/>
-      </pc:docMkLst>
-      <pc:sldChg chg="modSp">
-        <pc:chgData name="Luca Ricci" userId="S::10451631@polimi.it::ee5f09d5-0832-4e68-94c9-d8bfd2ad04f0" providerId="AD" clId="Web-{B2D310EA-72CF-4690-94EE-78BFEA809EFD}" dt="2024-01-23T15:26:33.096" v="66" actId="20577"/>
-        <pc:sldMkLst>
-          <pc:docMk/>
-          <pc:sldMk cId="994454846" sldId="291"/>
-        </pc:sldMkLst>
-        <pc:spChg chg="mod">
-          <ac:chgData name="Luca Ricci" userId="S::10451631@polimi.it::ee5f09d5-0832-4e68-94c9-d8bfd2ad04f0" providerId="AD" clId="Web-{B2D310EA-72CF-4690-94EE-78BFEA809EFD}" dt="2024-01-23T15:26:33.096" v="66" actId="20577"/>
-          <ac:spMkLst>
-            <pc:docMk/>
-            <pc:sldMk cId="994454846" sldId="291"/>
-            <ac:spMk id="9" creationId="{384C8E91-B72A-D715-878D-3115E7D21AE9}"/>
-          </ac:spMkLst>
-        </pc:spChg>
-      </pc:sldChg>
-      <pc:sldChg chg="addSp delSp modSp mod modClrScheme chgLayout">
-        <pc:chgData name="Luca Ricci" userId="S::10451631@polimi.it::ee5f09d5-0832-4e68-94c9-d8bfd2ad04f0" providerId="AD" clId="Web-{B2D310EA-72CF-4690-94EE-78BFEA809EFD}" dt="2024-01-23T15:58:01.521" v="949" actId="20577"/>
-        <pc:sldMkLst>
-          <pc:docMk/>
-          <pc:sldMk cId="4109715435" sldId="313"/>
-        </pc:sldMkLst>
-        <pc:spChg chg="mod ord">
-          <ac:chgData name="Luca Ricci" userId="S::10451631@polimi.it::ee5f09d5-0832-4e68-94c9-d8bfd2ad04f0" providerId="AD" clId="Web-{B2D310EA-72CF-4690-94EE-78BFEA809EFD}" dt="2024-01-23T15:41:51.589" v="722" actId="20577"/>
-          <ac:spMkLst>
-            <pc:docMk/>
-            <pc:sldMk cId="4109715435" sldId="313"/>
-            <ac:spMk id="2" creationId="{2764E89C-42F0-7F7D-800A-DA392F66BC91}"/>
-          </ac:spMkLst>
-        </pc:spChg>
-        <pc:spChg chg="mod ord">
-          <ac:chgData name="Luca Ricci" userId="S::10451631@polimi.it::ee5f09d5-0832-4e68-94c9-d8bfd2ad04f0" providerId="AD" clId="Web-{B2D310EA-72CF-4690-94EE-78BFEA809EFD}" dt="2024-01-23T15:29:45.773" v="89"/>
-          <ac:spMkLst>
-            <pc:docMk/>
-            <pc:sldMk cId="4109715435" sldId="313"/>
-            <ac:spMk id="3" creationId="{937AAAB0-FB21-FB0E-A628-9C20C23B6347}"/>
-          </ac:spMkLst>
-        </pc:spChg>
-        <pc:spChg chg="mod ord">
-          <ac:chgData name="Luca Ricci" userId="S::10451631@polimi.it::ee5f09d5-0832-4e68-94c9-d8bfd2ad04f0" providerId="AD" clId="Web-{B2D310EA-72CF-4690-94EE-78BFEA809EFD}" dt="2024-01-23T15:29:45.773" v="89"/>
-          <ac:spMkLst>
-            <pc:docMk/>
-            <pc:sldMk cId="4109715435" sldId="313"/>
-            <ac:spMk id="4" creationId="{AAB1B8BC-4F92-6038-D555-1AD1EDEF431A}"/>
-          </ac:spMkLst>
-        </pc:spChg>
-        <pc:spChg chg="add del mod ord">
-          <ac:chgData name="Luca Ricci" userId="S::10451631@polimi.it::ee5f09d5-0832-4e68-94c9-d8bfd2ad04f0" providerId="AD" clId="Web-{B2D310EA-72CF-4690-94EE-78BFEA809EFD}" dt="2024-01-23T15:30:00.117" v="92"/>
-          <ac:spMkLst>
-            <pc:docMk/>
-            <pc:sldMk cId="4109715435" sldId="313"/>
-            <ac:spMk id="5" creationId="{42712514-1EB7-83FB-F854-2424E1C5F6FC}"/>
-          </ac:spMkLst>
-        </pc:spChg>
-        <pc:spChg chg="add mod ord">
-          <ac:chgData name="Luca Ricci" userId="S::10451631@polimi.it::ee5f09d5-0832-4e68-94c9-d8bfd2ad04f0" providerId="AD" clId="Web-{B2D310EA-72CF-4690-94EE-78BFEA809EFD}" dt="2024-01-23T15:58:01.521" v="949" actId="20577"/>
-          <ac:spMkLst>
-            <pc:docMk/>
-            <pc:sldMk cId="4109715435" sldId="313"/>
-            <ac:spMk id="7" creationId="{8ED043E4-ED32-1DA9-33FC-E4B34D009A79}"/>
-          </ac:spMkLst>
-        </pc:spChg>
-        <pc:picChg chg="add del mod">
-          <ac:chgData name="Luca Ricci" userId="S::10451631@polimi.it::ee5f09d5-0832-4e68-94c9-d8bfd2ad04f0" providerId="AD" clId="Web-{B2D310EA-72CF-4690-94EE-78BFEA809EFD}" dt="2024-01-23T15:50:29.821" v="912" actId="1076"/>
-          <ac:picMkLst>
-            <pc:docMk/>
-            <pc:sldMk cId="4109715435" sldId="313"/>
-            <ac:picMk id="6" creationId="{081E3E13-A1F1-4FF3-9F97-8D0431E79976}"/>
-          </ac:picMkLst>
-        </pc:picChg>
-      </pc:sldChg>
-    </pc:docChg>
-  </pc:docChgLst>
-  <pc:docChgLst>
     <pc:chgData name="Gabriele Zanoletti" userId="fc6666fa-3441-4ddc-a8b9-f69fbbdf5644" providerId="ADAL" clId="{FF896906-D997-4B2C-9772-B85E3A21DE27}"/>
     <pc:docChg chg="undo custSel delSld modSld sldOrd addSection modSection">
       <pc:chgData name="Gabriele Zanoletti" userId="fc6666fa-3441-4ddc-a8b9-f69fbbdf5644" providerId="ADAL" clId="{FF896906-D997-4B2C-9772-B85E3A21DE27}" dt="2024-01-25T12:01:57.728" v="4336" actId="47"/>
@@ -3546,6 +3447,117 @@
             <pc:docMk/>
             <pc:sldMk cId="3489691726" sldId="348"/>
             <ac:picMk id="7" creationId="{BF47B201-4C7A-808B-4502-11BCAE8039BE}"/>
+          </ac:picMkLst>
+        </pc:picChg>
+      </pc:sldChg>
+    </pc:docChg>
+  </pc:docChgLst>
+  <pc:docChgLst>
+    <pc:chgData name="Luca Ricci" userId="S::10451631@polimi.it::ee5f09d5-0832-4e68-94c9-d8bfd2ad04f0" providerId="AD" clId="Web-{B2D310EA-72CF-4690-94EE-78BFEA809EFD}"/>
+    <pc:docChg chg="modSld">
+      <pc:chgData name="Luca Ricci" userId="S::10451631@polimi.it::ee5f09d5-0832-4e68-94c9-d8bfd2ad04f0" providerId="AD" clId="Web-{B2D310EA-72CF-4690-94EE-78BFEA809EFD}" dt="2024-01-23T15:58:01.521" v="949" actId="20577"/>
+      <pc:docMkLst>
+        <pc:docMk/>
+      </pc:docMkLst>
+      <pc:sldChg chg="modSp">
+        <pc:chgData name="Luca Ricci" userId="S::10451631@polimi.it::ee5f09d5-0832-4e68-94c9-d8bfd2ad04f0" providerId="AD" clId="Web-{B2D310EA-72CF-4690-94EE-78BFEA809EFD}" dt="2024-01-23T15:26:33.096" v="66" actId="20577"/>
+        <pc:sldMkLst>
+          <pc:docMk/>
+          <pc:sldMk cId="994454846" sldId="291"/>
+        </pc:sldMkLst>
+        <pc:spChg chg="mod">
+          <ac:chgData name="Luca Ricci" userId="S::10451631@polimi.it::ee5f09d5-0832-4e68-94c9-d8bfd2ad04f0" providerId="AD" clId="Web-{B2D310EA-72CF-4690-94EE-78BFEA809EFD}" dt="2024-01-23T15:26:33.096" v="66" actId="20577"/>
+          <ac:spMkLst>
+            <pc:docMk/>
+            <pc:sldMk cId="994454846" sldId="291"/>
+            <ac:spMk id="9" creationId="{384C8E91-B72A-D715-878D-3115E7D21AE9}"/>
+          </ac:spMkLst>
+        </pc:spChg>
+      </pc:sldChg>
+      <pc:sldChg chg="addSp delSp modSp mod modClrScheme chgLayout">
+        <pc:chgData name="Luca Ricci" userId="S::10451631@polimi.it::ee5f09d5-0832-4e68-94c9-d8bfd2ad04f0" providerId="AD" clId="Web-{B2D310EA-72CF-4690-94EE-78BFEA809EFD}" dt="2024-01-23T15:58:01.521" v="949" actId="20577"/>
+        <pc:sldMkLst>
+          <pc:docMk/>
+          <pc:sldMk cId="4109715435" sldId="313"/>
+        </pc:sldMkLst>
+        <pc:spChg chg="mod ord">
+          <ac:chgData name="Luca Ricci" userId="S::10451631@polimi.it::ee5f09d5-0832-4e68-94c9-d8bfd2ad04f0" providerId="AD" clId="Web-{B2D310EA-72CF-4690-94EE-78BFEA809EFD}" dt="2024-01-23T15:41:51.589" v="722" actId="20577"/>
+          <ac:spMkLst>
+            <pc:docMk/>
+            <pc:sldMk cId="4109715435" sldId="313"/>
+            <ac:spMk id="2" creationId="{2764E89C-42F0-7F7D-800A-DA392F66BC91}"/>
+          </ac:spMkLst>
+        </pc:spChg>
+        <pc:spChg chg="mod ord">
+          <ac:chgData name="Luca Ricci" userId="S::10451631@polimi.it::ee5f09d5-0832-4e68-94c9-d8bfd2ad04f0" providerId="AD" clId="Web-{B2D310EA-72CF-4690-94EE-78BFEA809EFD}" dt="2024-01-23T15:29:45.773" v="89"/>
+          <ac:spMkLst>
+            <pc:docMk/>
+            <pc:sldMk cId="4109715435" sldId="313"/>
+            <ac:spMk id="3" creationId="{937AAAB0-FB21-FB0E-A628-9C20C23B6347}"/>
+          </ac:spMkLst>
+        </pc:spChg>
+        <pc:spChg chg="mod ord">
+          <ac:chgData name="Luca Ricci" userId="S::10451631@polimi.it::ee5f09d5-0832-4e68-94c9-d8bfd2ad04f0" providerId="AD" clId="Web-{B2D310EA-72CF-4690-94EE-78BFEA809EFD}" dt="2024-01-23T15:29:45.773" v="89"/>
+          <ac:spMkLst>
+            <pc:docMk/>
+            <pc:sldMk cId="4109715435" sldId="313"/>
+            <ac:spMk id="4" creationId="{AAB1B8BC-4F92-6038-D555-1AD1EDEF431A}"/>
+          </ac:spMkLst>
+        </pc:spChg>
+        <pc:spChg chg="add del mod ord">
+          <ac:chgData name="Luca Ricci" userId="S::10451631@polimi.it::ee5f09d5-0832-4e68-94c9-d8bfd2ad04f0" providerId="AD" clId="Web-{B2D310EA-72CF-4690-94EE-78BFEA809EFD}" dt="2024-01-23T15:30:00.117" v="92"/>
+          <ac:spMkLst>
+            <pc:docMk/>
+            <pc:sldMk cId="4109715435" sldId="313"/>
+            <ac:spMk id="5" creationId="{42712514-1EB7-83FB-F854-2424E1C5F6FC}"/>
+          </ac:spMkLst>
+        </pc:spChg>
+        <pc:spChg chg="add mod ord">
+          <ac:chgData name="Luca Ricci" userId="S::10451631@polimi.it::ee5f09d5-0832-4e68-94c9-d8bfd2ad04f0" providerId="AD" clId="Web-{B2D310EA-72CF-4690-94EE-78BFEA809EFD}" dt="2024-01-23T15:58:01.521" v="949" actId="20577"/>
+          <ac:spMkLst>
+            <pc:docMk/>
+            <pc:sldMk cId="4109715435" sldId="313"/>
+            <ac:spMk id="7" creationId="{8ED043E4-ED32-1DA9-33FC-E4B34D009A79}"/>
+          </ac:spMkLst>
+        </pc:spChg>
+        <pc:picChg chg="add del mod">
+          <ac:chgData name="Luca Ricci" userId="S::10451631@polimi.it::ee5f09d5-0832-4e68-94c9-d8bfd2ad04f0" providerId="AD" clId="Web-{B2D310EA-72CF-4690-94EE-78BFEA809EFD}" dt="2024-01-23T15:50:29.821" v="912" actId="1076"/>
+          <ac:picMkLst>
+            <pc:docMk/>
+            <pc:sldMk cId="4109715435" sldId="313"/>
+            <ac:picMk id="6" creationId="{081E3E13-A1F1-4FF3-9F97-8D0431E79976}"/>
+          </ac:picMkLst>
+        </pc:picChg>
+      </pc:sldChg>
+    </pc:docChg>
+  </pc:docChgLst>
+  <pc:docChgLst>
+    <pc:chgData name="Luca Ricci" userId="S::10451631@polimi.it::ee5f09d5-0832-4e68-94c9-d8bfd2ad04f0" providerId="AD" clId="Web-{01963A96-2E06-E2CD-1350-082BA7D4CF1B}"/>
+    <pc:docChg chg="modSld">
+      <pc:chgData name="Luca Ricci" userId="S::10451631@polimi.it::ee5f09d5-0832-4e68-94c9-d8bfd2ad04f0" providerId="AD" clId="Web-{01963A96-2E06-E2CD-1350-082BA7D4CF1B}" dt="2024-01-24T10:24:38.882" v="320"/>
+      <pc:docMkLst>
+        <pc:docMk/>
+      </pc:docMkLst>
+      <pc:sldChg chg="addSp delSp modSp modNotes">
+        <pc:chgData name="Luca Ricci" userId="S::10451631@polimi.it::ee5f09d5-0832-4e68-94c9-d8bfd2ad04f0" providerId="AD" clId="Web-{01963A96-2E06-E2CD-1350-082BA7D4CF1B}" dt="2024-01-24T10:24:38.882" v="320"/>
+        <pc:sldMkLst>
+          <pc:docMk/>
+          <pc:sldMk cId="4109715435" sldId="313"/>
+        </pc:sldMkLst>
+        <pc:picChg chg="add del mod">
+          <ac:chgData name="Luca Ricci" userId="S::10451631@polimi.it::ee5f09d5-0832-4e68-94c9-d8bfd2ad04f0" providerId="AD" clId="Web-{01963A96-2E06-E2CD-1350-082BA7D4CF1B}" dt="2024-01-24T10:24:38.882" v="320"/>
+          <ac:picMkLst>
+            <pc:docMk/>
+            <pc:sldMk cId="4109715435" sldId="313"/>
+            <ac:picMk id="5" creationId="{CA4B9B14-FA33-53DB-09E4-CEE578977A56}"/>
+          </ac:picMkLst>
+        </pc:picChg>
+        <pc:picChg chg="del">
+          <ac:chgData name="Luca Ricci" userId="S::10451631@polimi.it::ee5f09d5-0832-4e68-94c9-d8bfd2ad04f0" providerId="AD" clId="Web-{01963A96-2E06-E2CD-1350-082BA7D4CF1B}" dt="2024-01-24T10:21:46.517" v="318"/>
+          <ac:picMkLst>
+            <pc:docMk/>
+            <pc:sldMk cId="4109715435" sldId="313"/>
+            <ac:picMk id="6" creationId="{081E3E13-A1F1-4FF3-9F97-8D0431E79976}"/>
           </ac:picMkLst>
         </pc:picChg>
       </pc:sldChg>
@@ -12148,6 +12160,850 @@
         <p:cNvPr id="1" name="">
           <a:extLst>
             <a:ext uri="{FF2B5EF4-FFF2-40B4-BE49-F238E27FC236}">
+              <a16:creationId xmlns:a16="http://schemas.microsoft.com/office/drawing/2014/main" id="{1FD7D2D6-B594-8244-7D3A-5B297B182B6B}"/>
+            </a:ext>
+          </a:extLst>
+        </p:cNvPr>
+        <p:cNvGrpSpPr/>
+        <p:nvPr/>
+      </p:nvGrpSpPr>
+      <p:grpSpPr>
+        <a:xfrm>
+          <a:off x="0" y="0"/>
+          <a:ext cx="0" cy="0"/>
+          <a:chOff x="0" y="0"/>
+          <a:chExt cx="0" cy="0"/>
+        </a:xfrm>
+      </p:grpSpPr>
+      <p:sp>
+        <p:nvSpPr>
+          <p:cNvPr id="2" name="Slide Image Placeholder 1">
+            <a:extLst>
+              <a:ext uri="{FF2B5EF4-FFF2-40B4-BE49-F238E27FC236}">
+                <a16:creationId xmlns:a16="http://schemas.microsoft.com/office/drawing/2014/main" id="{9B705157-8A99-2193-5A24-B9BA8E7DD117}"/>
+              </a:ext>
+            </a:extLst>
+          </p:cNvPr>
+          <p:cNvSpPr>
+            <a:spLocks noGrp="1" noRot="1" noChangeAspect="1"/>
+          </p:cNvSpPr>
+          <p:nvPr>
+            <p:ph type="sldImg"/>
+          </p:nvPr>
+        </p:nvSpPr>
+        <p:spPr/>
+      </p:sp>
+      <p:sp>
+        <p:nvSpPr>
+          <p:cNvPr id="3" name="Notes Placeholder 2">
+            <a:extLst>
+              <a:ext uri="{FF2B5EF4-FFF2-40B4-BE49-F238E27FC236}">
+                <a16:creationId xmlns:a16="http://schemas.microsoft.com/office/drawing/2014/main" id="{6BB7D65D-1091-1FAA-447E-5D63D7E14499}"/>
+              </a:ext>
+            </a:extLst>
+          </p:cNvPr>
+          <p:cNvSpPr>
+            <a:spLocks noGrp="1"/>
+          </p:cNvSpPr>
+          <p:nvPr>
+            <p:ph type="body" idx="1"/>
+          </p:nvPr>
+        </p:nvSpPr>
+        <p:spPr/>
+        <p:txBody>
+          <a:bodyPr/>
+          <a:lstStyle/>
+          <a:p>
+            <a:endParaRPr lang="en-US"/>
+          </a:p>
+        </p:txBody>
+      </p:sp>
+      <p:sp>
+        <p:nvSpPr>
+          <p:cNvPr id="4" name="Header Placeholder 3">
+            <a:extLst>
+              <a:ext uri="{FF2B5EF4-FFF2-40B4-BE49-F238E27FC236}">
+                <a16:creationId xmlns:a16="http://schemas.microsoft.com/office/drawing/2014/main" id="{EB60B9C0-D96D-15AB-3EDE-4D0B9B538CA5}"/>
+              </a:ext>
+            </a:extLst>
+          </p:cNvPr>
+          <p:cNvSpPr>
+            <a:spLocks noGrp="1"/>
+          </p:cNvSpPr>
+          <p:nvPr>
+            <p:ph type="hdr" sz="quarter"/>
+          </p:nvPr>
+        </p:nvSpPr>
+        <p:spPr/>
+        <p:txBody>
+          <a:bodyPr/>
+          <a:lstStyle/>
+          <a:p>
+            <a:endParaRPr lang="en-US" sz="100"/>
+          </a:p>
+        </p:txBody>
+      </p:sp>
+      <p:sp>
+        <p:nvSpPr>
+          <p:cNvPr id="5" name="Footer Placeholder 4">
+            <a:extLst>
+              <a:ext uri="{FF2B5EF4-FFF2-40B4-BE49-F238E27FC236}">
+                <a16:creationId xmlns:a16="http://schemas.microsoft.com/office/drawing/2014/main" id="{16F743EB-3E08-7711-60AF-C6F0273969C8}"/>
+              </a:ext>
+            </a:extLst>
+          </p:cNvPr>
+          <p:cNvSpPr>
+            <a:spLocks noGrp="1"/>
+          </p:cNvSpPr>
+          <p:nvPr>
+            <p:ph type="ftr" sz="quarter" idx="4"/>
+          </p:nvPr>
+        </p:nvSpPr>
+        <p:spPr/>
+        <p:txBody>
+          <a:bodyPr/>
+          <a:lstStyle/>
+          <a:p>
+            <a:r>
+              <a:rPr lang="en-US">
+                <a:latin typeface="Arial" panose="020B0604020202020204" pitchFamily="34" charset="0"/>
+                <a:cs typeface="Arial" panose="020B0604020202020204" pitchFamily="34" charset="0"/>
+              </a:rPr>
+              <a:t>Copyright © Infineon Technologies AG 2020. All rights reserved.</a:t>
+            </a:r>
+          </a:p>
+          <a:p>
+            <a:r>
+              <a:rPr lang="en-US" b="1">
+                <a:latin typeface="Arial" panose="020B0604020202020204" pitchFamily="34" charset="0"/>
+                <a:cs typeface="Arial" panose="020B0604020202020204" pitchFamily="34" charset="0"/>
+              </a:rPr>
+              <a:t>restricted</a:t>
+            </a:r>
+          </a:p>
+        </p:txBody>
+      </p:sp>
+      <p:sp>
+        <p:nvSpPr>
+          <p:cNvPr id="6" name="Date Placeholder 5">
+            <a:extLst>
+              <a:ext uri="{FF2B5EF4-FFF2-40B4-BE49-F238E27FC236}">
+                <a16:creationId xmlns:a16="http://schemas.microsoft.com/office/drawing/2014/main" id="{741EB7B7-9A76-77AF-1CC1-5EAF0594468F}"/>
+              </a:ext>
+            </a:extLst>
+          </p:cNvPr>
+          <p:cNvSpPr>
+            <a:spLocks noGrp="1"/>
+          </p:cNvSpPr>
+          <p:nvPr>
+            <p:ph type="dt" idx="1"/>
+          </p:nvPr>
+        </p:nvSpPr>
+        <p:spPr/>
+        <p:txBody>
+          <a:bodyPr/>
+          <a:lstStyle/>
+          <a:p>
+            <a:r>
+              <a:rPr lang="en-US"/>
+              <a:t>2020-09-28</a:t>
+            </a:r>
+          </a:p>
+          <a:p>
+            <a:endParaRPr lang="en-US"/>
+          </a:p>
+        </p:txBody>
+      </p:sp>
+      <p:sp>
+        <p:nvSpPr>
+          <p:cNvPr id="7" name="Slide Number Placeholder 6">
+            <a:extLst>
+              <a:ext uri="{FF2B5EF4-FFF2-40B4-BE49-F238E27FC236}">
+                <a16:creationId xmlns:a16="http://schemas.microsoft.com/office/drawing/2014/main" id="{F6E817D5-60CD-D928-71AB-CB43C7B81B9D}"/>
+              </a:ext>
+            </a:extLst>
+          </p:cNvPr>
+          <p:cNvSpPr>
+            <a:spLocks noGrp="1"/>
+          </p:cNvSpPr>
+          <p:nvPr>
+            <p:ph type="sldNum" sz="quarter" idx="5"/>
+          </p:nvPr>
+        </p:nvSpPr>
+        <p:spPr/>
+        <p:txBody>
+          <a:bodyPr/>
+          <a:lstStyle/>
+          <a:p>
+            <a:fld id="{4165D906-55BD-49C5-997D-27A40DB53D15}" type="slidenum">
+              <a:rPr lang="en-US" smtClean="0">
+                <a:latin typeface="Arial" panose="020B0604020202020204" pitchFamily="34" charset="0"/>
+                <a:cs typeface="Arial" panose="020B0604020202020204" pitchFamily="34" charset="0"/>
+              </a:rPr>
+              <a:pPr/>
+              <a:t>25</a:t>
+            </a:fld>
+            <a:endParaRPr lang="en-US">
+              <a:latin typeface="Arial" panose="020B0604020202020204" pitchFamily="34" charset="0"/>
+              <a:cs typeface="Arial" panose="020B0604020202020204" pitchFamily="34" charset="0"/>
+            </a:endParaRPr>
+          </a:p>
+        </p:txBody>
+      </p:sp>
+    </p:spTree>
+    <p:extLst>
+      <p:ext uri="{BB962C8B-B14F-4D97-AF65-F5344CB8AC3E}">
+        <p14:creationId xmlns:p14="http://schemas.microsoft.com/office/powerpoint/2010/main" val="3102876149"/>
+      </p:ext>
+    </p:extLst>
+  </p:cSld>
+  <p:clrMapOvr>
+    <a:masterClrMapping/>
+  </p:clrMapOvr>
+</p:notes>
+</file>
+
+<file path=ppt/notesSlides/notesSlide12.xml><?xml version="1.0" encoding="utf-8"?>
+<p:notes xmlns:a="http://schemas.openxmlformats.org/drawingml/2006/main" xmlns:r="http://schemas.openxmlformats.org/officeDocument/2006/relationships" xmlns:p="http://schemas.openxmlformats.org/presentationml/2006/main">
+  <p:cSld>
+    <p:spTree>
+      <p:nvGrpSpPr>
+        <p:cNvPr id="1" name="">
+          <a:extLst>
+            <a:ext uri="{FF2B5EF4-FFF2-40B4-BE49-F238E27FC236}">
+              <a16:creationId xmlns:a16="http://schemas.microsoft.com/office/drawing/2014/main" id="{957CCAA4-5814-CD83-55B2-FCEF74544886}"/>
+            </a:ext>
+          </a:extLst>
+        </p:cNvPr>
+        <p:cNvGrpSpPr/>
+        <p:nvPr/>
+      </p:nvGrpSpPr>
+      <p:grpSpPr>
+        <a:xfrm>
+          <a:off x="0" y="0"/>
+          <a:ext cx="0" cy="0"/>
+          <a:chOff x="0" y="0"/>
+          <a:chExt cx="0" cy="0"/>
+        </a:xfrm>
+      </p:grpSpPr>
+      <p:sp>
+        <p:nvSpPr>
+          <p:cNvPr id="2" name="Slide Image Placeholder 1">
+            <a:extLst>
+              <a:ext uri="{FF2B5EF4-FFF2-40B4-BE49-F238E27FC236}">
+                <a16:creationId xmlns:a16="http://schemas.microsoft.com/office/drawing/2014/main" id="{1FDB41C3-270E-E2EA-6FDE-B54E4DBA9C2D}"/>
+              </a:ext>
+            </a:extLst>
+          </p:cNvPr>
+          <p:cNvSpPr>
+            <a:spLocks noGrp="1" noRot="1" noChangeAspect="1"/>
+          </p:cNvSpPr>
+          <p:nvPr>
+            <p:ph type="sldImg"/>
+          </p:nvPr>
+        </p:nvSpPr>
+        <p:spPr/>
+      </p:sp>
+      <p:sp>
+        <p:nvSpPr>
+          <p:cNvPr id="3" name="Notes Placeholder 2">
+            <a:extLst>
+              <a:ext uri="{FF2B5EF4-FFF2-40B4-BE49-F238E27FC236}">
+                <a16:creationId xmlns:a16="http://schemas.microsoft.com/office/drawing/2014/main" id="{F4F3B1B2-AA96-4D64-7B0E-D00C309BAD80}"/>
+              </a:ext>
+            </a:extLst>
+          </p:cNvPr>
+          <p:cNvSpPr>
+            <a:spLocks noGrp="1"/>
+          </p:cNvSpPr>
+          <p:nvPr>
+            <p:ph type="body" idx="1"/>
+          </p:nvPr>
+        </p:nvSpPr>
+        <p:spPr/>
+        <p:txBody>
+          <a:bodyPr/>
+          <a:lstStyle/>
+          <a:p>
+            <a:endParaRPr lang="en-US"/>
+          </a:p>
+        </p:txBody>
+      </p:sp>
+      <p:sp>
+        <p:nvSpPr>
+          <p:cNvPr id="4" name="Header Placeholder 3">
+            <a:extLst>
+              <a:ext uri="{FF2B5EF4-FFF2-40B4-BE49-F238E27FC236}">
+                <a16:creationId xmlns:a16="http://schemas.microsoft.com/office/drawing/2014/main" id="{8ED080A7-8B38-22F9-EE61-684FC0B70EC4}"/>
+              </a:ext>
+            </a:extLst>
+          </p:cNvPr>
+          <p:cNvSpPr>
+            <a:spLocks noGrp="1"/>
+          </p:cNvSpPr>
+          <p:nvPr>
+            <p:ph type="hdr" sz="quarter"/>
+          </p:nvPr>
+        </p:nvSpPr>
+        <p:spPr/>
+        <p:txBody>
+          <a:bodyPr/>
+          <a:lstStyle/>
+          <a:p>
+            <a:endParaRPr lang="en-US" sz="100"/>
+          </a:p>
+        </p:txBody>
+      </p:sp>
+      <p:sp>
+        <p:nvSpPr>
+          <p:cNvPr id="5" name="Footer Placeholder 4">
+            <a:extLst>
+              <a:ext uri="{FF2B5EF4-FFF2-40B4-BE49-F238E27FC236}">
+                <a16:creationId xmlns:a16="http://schemas.microsoft.com/office/drawing/2014/main" id="{F48A17C7-F976-EB10-E710-A7463037F162}"/>
+              </a:ext>
+            </a:extLst>
+          </p:cNvPr>
+          <p:cNvSpPr>
+            <a:spLocks noGrp="1"/>
+          </p:cNvSpPr>
+          <p:nvPr>
+            <p:ph type="ftr" sz="quarter" idx="4"/>
+          </p:nvPr>
+        </p:nvSpPr>
+        <p:spPr/>
+        <p:txBody>
+          <a:bodyPr/>
+          <a:lstStyle/>
+          <a:p>
+            <a:r>
+              <a:rPr lang="en-US">
+                <a:latin typeface="Arial" panose="020B0604020202020204" pitchFamily="34" charset="0"/>
+                <a:cs typeface="Arial" panose="020B0604020202020204" pitchFamily="34" charset="0"/>
+              </a:rPr>
+              <a:t>Copyright © Infineon Technologies AG 2020. All rights reserved.</a:t>
+            </a:r>
+          </a:p>
+          <a:p>
+            <a:r>
+              <a:rPr lang="en-US" b="1">
+                <a:latin typeface="Arial" panose="020B0604020202020204" pitchFamily="34" charset="0"/>
+                <a:cs typeface="Arial" panose="020B0604020202020204" pitchFamily="34" charset="0"/>
+              </a:rPr>
+              <a:t>restricted</a:t>
+            </a:r>
+          </a:p>
+        </p:txBody>
+      </p:sp>
+      <p:sp>
+        <p:nvSpPr>
+          <p:cNvPr id="6" name="Date Placeholder 5">
+            <a:extLst>
+              <a:ext uri="{FF2B5EF4-FFF2-40B4-BE49-F238E27FC236}">
+                <a16:creationId xmlns:a16="http://schemas.microsoft.com/office/drawing/2014/main" id="{C838FAE1-8639-4758-EFAC-93137A1268CF}"/>
+              </a:ext>
+            </a:extLst>
+          </p:cNvPr>
+          <p:cNvSpPr>
+            <a:spLocks noGrp="1"/>
+          </p:cNvSpPr>
+          <p:nvPr>
+            <p:ph type="dt" idx="1"/>
+          </p:nvPr>
+        </p:nvSpPr>
+        <p:spPr/>
+        <p:txBody>
+          <a:bodyPr/>
+          <a:lstStyle/>
+          <a:p>
+            <a:r>
+              <a:rPr lang="en-US"/>
+              <a:t>2020-09-28</a:t>
+            </a:r>
+          </a:p>
+          <a:p>
+            <a:endParaRPr lang="en-US"/>
+          </a:p>
+        </p:txBody>
+      </p:sp>
+      <p:sp>
+        <p:nvSpPr>
+          <p:cNvPr id="7" name="Slide Number Placeholder 6">
+            <a:extLst>
+              <a:ext uri="{FF2B5EF4-FFF2-40B4-BE49-F238E27FC236}">
+                <a16:creationId xmlns:a16="http://schemas.microsoft.com/office/drawing/2014/main" id="{7BA9F074-CB90-3286-A441-53F4D7C33104}"/>
+              </a:ext>
+            </a:extLst>
+          </p:cNvPr>
+          <p:cNvSpPr>
+            <a:spLocks noGrp="1"/>
+          </p:cNvSpPr>
+          <p:nvPr>
+            <p:ph type="sldNum" sz="quarter" idx="5"/>
+          </p:nvPr>
+        </p:nvSpPr>
+        <p:spPr/>
+        <p:txBody>
+          <a:bodyPr/>
+          <a:lstStyle/>
+          <a:p>
+            <a:fld id="{4165D906-55BD-49C5-997D-27A40DB53D15}" type="slidenum">
+              <a:rPr lang="en-US" smtClean="0">
+                <a:latin typeface="Arial" panose="020B0604020202020204" pitchFamily="34" charset="0"/>
+                <a:cs typeface="Arial" panose="020B0604020202020204" pitchFamily="34" charset="0"/>
+              </a:rPr>
+              <a:pPr/>
+              <a:t>28</a:t>
+            </a:fld>
+            <a:endParaRPr lang="en-US">
+              <a:latin typeface="Arial" panose="020B0604020202020204" pitchFamily="34" charset="0"/>
+              <a:cs typeface="Arial" panose="020B0604020202020204" pitchFamily="34" charset="0"/>
+            </a:endParaRPr>
+          </a:p>
+        </p:txBody>
+      </p:sp>
+    </p:spTree>
+    <p:extLst>
+      <p:ext uri="{BB962C8B-B14F-4D97-AF65-F5344CB8AC3E}">
+        <p14:creationId xmlns:p14="http://schemas.microsoft.com/office/powerpoint/2010/main" val="238120432"/>
+      </p:ext>
+    </p:extLst>
+  </p:cSld>
+  <p:clrMapOvr>
+    <a:masterClrMapping/>
+  </p:clrMapOvr>
+</p:notes>
+</file>
+
+<file path=ppt/notesSlides/notesSlide13.xml><?xml version="1.0" encoding="utf-8"?>
+<p:notes xmlns:a="http://schemas.openxmlformats.org/drawingml/2006/main" xmlns:r="http://schemas.openxmlformats.org/officeDocument/2006/relationships" xmlns:p="http://schemas.openxmlformats.org/presentationml/2006/main">
+  <p:cSld>
+    <p:spTree>
+      <p:nvGrpSpPr>
+        <p:cNvPr id="1" name="">
+          <a:extLst>
+            <a:ext uri="{FF2B5EF4-FFF2-40B4-BE49-F238E27FC236}">
+              <a16:creationId xmlns:a16="http://schemas.microsoft.com/office/drawing/2014/main" id="{A211F36F-F40C-1791-0743-0E1C80ED4D16}"/>
+            </a:ext>
+          </a:extLst>
+        </p:cNvPr>
+        <p:cNvGrpSpPr/>
+        <p:nvPr/>
+      </p:nvGrpSpPr>
+      <p:grpSpPr>
+        <a:xfrm>
+          <a:off x="0" y="0"/>
+          <a:ext cx="0" cy="0"/>
+          <a:chOff x="0" y="0"/>
+          <a:chExt cx="0" cy="0"/>
+        </a:xfrm>
+      </p:grpSpPr>
+      <p:sp>
+        <p:nvSpPr>
+          <p:cNvPr id="2" name="Slide Image Placeholder 1">
+            <a:extLst>
+              <a:ext uri="{FF2B5EF4-FFF2-40B4-BE49-F238E27FC236}">
+                <a16:creationId xmlns:a16="http://schemas.microsoft.com/office/drawing/2014/main" id="{4ABF882C-3FB8-2727-4E2C-5759E96923C0}"/>
+              </a:ext>
+            </a:extLst>
+          </p:cNvPr>
+          <p:cNvSpPr>
+            <a:spLocks noGrp="1" noRot="1" noChangeAspect="1"/>
+          </p:cNvSpPr>
+          <p:nvPr>
+            <p:ph type="sldImg"/>
+          </p:nvPr>
+        </p:nvSpPr>
+        <p:spPr/>
+      </p:sp>
+      <p:sp>
+        <p:nvSpPr>
+          <p:cNvPr id="3" name="Notes Placeholder 2">
+            <a:extLst>
+              <a:ext uri="{FF2B5EF4-FFF2-40B4-BE49-F238E27FC236}">
+                <a16:creationId xmlns:a16="http://schemas.microsoft.com/office/drawing/2014/main" id="{E723F90B-77F2-8648-C686-6576C5AEB407}"/>
+              </a:ext>
+            </a:extLst>
+          </p:cNvPr>
+          <p:cNvSpPr>
+            <a:spLocks noGrp="1"/>
+          </p:cNvSpPr>
+          <p:nvPr>
+            <p:ph type="body" idx="1"/>
+          </p:nvPr>
+        </p:nvSpPr>
+        <p:spPr/>
+        <p:txBody>
+          <a:bodyPr/>
+          <a:lstStyle/>
+          <a:p>
+            <a:endParaRPr lang="en-US"/>
+          </a:p>
+        </p:txBody>
+      </p:sp>
+      <p:sp>
+        <p:nvSpPr>
+          <p:cNvPr id="4" name="Header Placeholder 3">
+            <a:extLst>
+              <a:ext uri="{FF2B5EF4-FFF2-40B4-BE49-F238E27FC236}">
+                <a16:creationId xmlns:a16="http://schemas.microsoft.com/office/drawing/2014/main" id="{DA0B0B2D-8DC9-D540-F628-3B43980611B4}"/>
+              </a:ext>
+            </a:extLst>
+          </p:cNvPr>
+          <p:cNvSpPr>
+            <a:spLocks noGrp="1"/>
+          </p:cNvSpPr>
+          <p:nvPr>
+            <p:ph type="hdr" sz="quarter"/>
+          </p:nvPr>
+        </p:nvSpPr>
+        <p:spPr/>
+        <p:txBody>
+          <a:bodyPr/>
+          <a:lstStyle/>
+          <a:p>
+            <a:endParaRPr lang="en-US" sz="100"/>
+          </a:p>
+        </p:txBody>
+      </p:sp>
+      <p:sp>
+        <p:nvSpPr>
+          <p:cNvPr id="5" name="Footer Placeholder 4">
+            <a:extLst>
+              <a:ext uri="{FF2B5EF4-FFF2-40B4-BE49-F238E27FC236}">
+                <a16:creationId xmlns:a16="http://schemas.microsoft.com/office/drawing/2014/main" id="{E5447ADF-F34C-7607-8DFB-86C18D8FE9B0}"/>
+              </a:ext>
+            </a:extLst>
+          </p:cNvPr>
+          <p:cNvSpPr>
+            <a:spLocks noGrp="1"/>
+          </p:cNvSpPr>
+          <p:nvPr>
+            <p:ph type="ftr" sz="quarter" idx="4"/>
+          </p:nvPr>
+        </p:nvSpPr>
+        <p:spPr/>
+        <p:txBody>
+          <a:bodyPr/>
+          <a:lstStyle/>
+          <a:p>
+            <a:r>
+              <a:rPr lang="en-US">
+                <a:latin typeface="Arial" panose="020B0604020202020204" pitchFamily="34" charset="0"/>
+                <a:cs typeface="Arial" panose="020B0604020202020204" pitchFamily="34" charset="0"/>
+              </a:rPr>
+              <a:t>Copyright © Infineon Technologies AG 2020. All rights reserved.</a:t>
+            </a:r>
+          </a:p>
+          <a:p>
+            <a:r>
+              <a:rPr lang="en-US" b="1">
+                <a:latin typeface="Arial" panose="020B0604020202020204" pitchFamily="34" charset="0"/>
+                <a:cs typeface="Arial" panose="020B0604020202020204" pitchFamily="34" charset="0"/>
+              </a:rPr>
+              <a:t>restricted</a:t>
+            </a:r>
+          </a:p>
+        </p:txBody>
+      </p:sp>
+      <p:sp>
+        <p:nvSpPr>
+          <p:cNvPr id="6" name="Date Placeholder 5">
+            <a:extLst>
+              <a:ext uri="{FF2B5EF4-FFF2-40B4-BE49-F238E27FC236}">
+                <a16:creationId xmlns:a16="http://schemas.microsoft.com/office/drawing/2014/main" id="{BDBF6976-05D5-3E68-A70A-72561738AF69}"/>
+              </a:ext>
+            </a:extLst>
+          </p:cNvPr>
+          <p:cNvSpPr>
+            <a:spLocks noGrp="1"/>
+          </p:cNvSpPr>
+          <p:nvPr>
+            <p:ph type="dt" idx="1"/>
+          </p:nvPr>
+        </p:nvSpPr>
+        <p:spPr/>
+        <p:txBody>
+          <a:bodyPr/>
+          <a:lstStyle/>
+          <a:p>
+            <a:r>
+              <a:rPr lang="en-US"/>
+              <a:t>2020-09-28</a:t>
+            </a:r>
+          </a:p>
+          <a:p>
+            <a:endParaRPr lang="en-US"/>
+          </a:p>
+        </p:txBody>
+      </p:sp>
+      <p:sp>
+        <p:nvSpPr>
+          <p:cNvPr id="7" name="Slide Number Placeholder 6">
+            <a:extLst>
+              <a:ext uri="{FF2B5EF4-FFF2-40B4-BE49-F238E27FC236}">
+                <a16:creationId xmlns:a16="http://schemas.microsoft.com/office/drawing/2014/main" id="{77C9EF4A-1AA7-EE37-3813-CE61DA141B2E}"/>
+              </a:ext>
+            </a:extLst>
+          </p:cNvPr>
+          <p:cNvSpPr>
+            <a:spLocks noGrp="1"/>
+          </p:cNvSpPr>
+          <p:nvPr>
+            <p:ph type="sldNum" sz="quarter" idx="5"/>
+          </p:nvPr>
+        </p:nvSpPr>
+        <p:spPr/>
+        <p:txBody>
+          <a:bodyPr/>
+          <a:lstStyle/>
+          <a:p>
+            <a:fld id="{4165D906-55BD-49C5-997D-27A40DB53D15}" type="slidenum">
+              <a:rPr lang="en-US" smtClean="0">
+                <a:latin typeface="Arial" panose="020B0604020202020204" pitchFamily="34" charset="0"/>
+                <a:cs typeface="Arial" panose="020B0604020202020204" pitchFamily="34" charset="0"/>
+              </a:rPr>
+              <a:pPr/>
+              <a:t>31</a:t>
+            </a:fld>
+            <a:endParaRPr lang="en-US">
+              <a:latin typeface="Arial" panose="020B0604020202020204" pitchFamily="34" charset="0"/>
+              <a:cs typeface="Arial" panose="020B0604020202020204" pitchFamily="34" charset="0"/>
+            </a:endParaRPr>
+          </a:p>
+        </p:txBody>
+      </p:sp>
+    </p:spTree>
+    <p:extLst>
+      <p:ext uri="{BB962C8B-B14F-4D97-AF65-F5344CB8AC3E}">
+        <p14:creationId xmlns:p14="http://schemas.microsoft.com/office/powerpoint/2010/main" val="4000991044"/>
+      </p:ext>
+    </p:extLst>
+  </p:cSld>
+  <p:clrMapOvr>
+    <a:masterClrMapping/>
+  </p:clrMapOvr>
+</p:notes>
+</file>
+
+<file path=ppt/notesSlides/notesSlide14.xml><?xml version="1.0" encoding="utf-8"?>
+<p:notes xmlns:a="http://schemas.openxmlformats.org/drawingml/2006/main" xmlns:r="http://schemas.openxmlformats.org/officeDocument/2006/relationships" xmlns:p="http://schemas.openxmlformats.org/presentationml/2006/main">
+  <p:cSld>
+    <p:spTree>
+      <p:nvGrpSpPr>
+        <p:cNvPr id="1" name="">
+          <a:extLst>
+            <a:ext uri="{FF2B5EF4-FFF2-40B4-BE49-F238E27FC236}">
+              <a16:creationId xmlns:a16="http://schemas.microsoft.com/office/drawing/2014/main" id="{D7FC272D-50CA-23F6-2AD9-6876577DA737}"/>
+            </a:ext>
+          </a:extLst>
+        </p:cNvPr>
+        <p:cNvGrpSpPr/>
+        <p:nvPr/>
+      </p:nvGrpSpPr>
+      <p:grpSpPr>
+        <a:xfrm>
+          <a:off x="0" y="0"/>
+          <a:ext cx="0" cy="0"/>
+          <a:chOff x="0" y="0"/>
+          <a:chExt cx="0" cy="0"/>
+        </a:xfrm>
+      </p:grpSpPr>
+      <p:sp>
+        <p:nvSpPr>
+          <p:cNvPr id="2" name="Slide Image Placeholder 1">
+            <a:extLst>
+              <a:ext uri="{FF2B5EF4-FFF2-40B4-BE49-F238E27FC236}">
+                <a16:creationId xmlns:a16="http://schemas.microsoft.com/office/drawing/2014/main" id="{F753FFA1-14FF-2C77-52CE-BEC4E753AC92}"/>
+              </a:ext>
+            </a:extLst>
+          </p:cNvPr>
+          <p:cNvSpPr>
+            <a:spLocks noGrp="1" noRot="1" noChangeAspect="1"/>
+          </p:cNvSpPr>
+          <p:nvPr>
+            <p:ph type="sldImg"/>
+          </p:nvPr>
+        </p:nvSpPr>
+        <p:spPr/>
+      </p:sp>
+      <p:sp>
+        <p:nvSpPr>
+          <p:cNvPr id="3" name="Notes Placeholder 2">
+            <a:extLst>
+              <a:ext uri="{FF2B5EF4-FFF2-40B4-BE49-F238E27FC236}">
+                <a16:creationId xmlns:a16="http://schemas.microsoft.com/office/drawing/2014/main" id="{8075A590-ABFF-2352-AF50-D4B71562420D}"/>
+              </a:ext>
+            </a:extLst>
+          </p:cNvPr>
+          <p:cNvSpPr>
+            <a:spLocks noGrp="1"/>
+          </p:cNvSpPr>
+          <p:nvPr>
+            <p:ph type="body" idx="1"/>
+          </p:nvPr>
+        </p:nvSpPr>
+        <p:spPr/>
+        <p:txBody>
+          <a:bodyPr/>
+          <a:lstStyle/>
+          <a:p>
+            <a:endParaRPr lang="en-US"/>
+          </a:p>
+        </p:txBody>
+      </p:sp>
+      <p:sp>
+        <p:nvSpPr>
+          <p:cNvPr id="4" name="Header Placeholder 3">
+            <a:extLst>
+              <a:ext uri="{FF2B5EF4-FFF2-40B4-BE49-F238E27FC236}">
+                <a16:creationId xmlns:a16="http://schemas.microsoft.com/office/drawing/2014/main" id="{45FE5FAB-AF2F-14DD-A08A-4849224A0F33}"/>
+              </a:ext>
+            </a:extLst>
+          </p:cNvPr>
+          <p:cNvSpPr>
+            <a:spLocks noGrp="1"/>
+          </p:cNvSpPr>
+          <p:nvPr>
+            <p:ph type="hdr" sz="quarter"/>
+          </p:nvPr>
+        </p:nvSpPr>
+        <p:spPr/>
+        <p:txBody>
+          <a:bodyPr/>
+          <a:lstStyle/>
+          <a:p>
+            <a:endParaRPr lang="en-US" sz="100"/>
+          </a:p>
+        </p:txBody>
+      </p:sp>
+      <p:sp>
+        <p:nvSpPr>
+          <p:cNvPr id="5" name="Footer Placeholder 4">
+            <a:extLst>
+              <a:ext uri="{FF2B5EF4-FFF2-40B4-BE49-F238E27FC236}">
+                <a16:creationId xmlns:a16="http://schemas.microsoft.com/office/drawing/2014/main" id="{77FBDE6D-7D3A-47E5-ACD3-57E1C27D41F5}"/>
+              </a:ext>
+            </a:extLst>
+          </p:cNvPr>
+          <p:cNvSpPr>
+            <a:spLocks noGrp="1"/>
+          </p:cNvSpPr>
+          <p:nvPr>
+            <p:ph type="ftr" sz="quarter" idx="4"/>
+          </p:nvPr>
+        </p:nvSpPr>
+        <p:spPr/>
+        <p:txBody>
+          <a:bodyPr/>
+          <a:lstStyle/>
+          <a:p>
+            <a:r>
+              <a:rPr lang="en-US">
+                <a:latin typeface="Arial" panose="020B0604020202020204" pitchFamily="34" charset="0"/>
+                <a:cs typeface="Arial" panose="020B0604020202020204" pitchFamily="34" charset="0"/>
+              </a:rPr>
+              <a:t>Copyright © Infineon Technologies AG 2020. All rights reserved.</a:t>
+            </a:r>
+          </a:p>
+          <a:p>
+            <a:r>
+              <a:rPr lang="en-US" b="1">
+                <a:latin typeface="Arial" panose="020B0604020202020204" pitchFamily="34" charset="0"/>
+                <a:cs typeface="Arial" panose="020B0604020202020204" pitchFamily="34" charset="0"/>
+              </a:rPr>
+              <a:t>restricted</a:t>
+            </a:r>
+          </a:p>
+        </p:txBody>
+      </p:sp>
+      <p:sp>
+        <p:nvSpPr>
+          <p:cNvPr id="6" name="Date Placeholder 5">
+            <a:extLst>
+              <a:ext uri="{FF2B5EF4-FFF2-40B4-BE49-F238E27FC236}">
+                <a16:creationId xmlns:a16="http://schemas.microsoft.com/office/drawing/2014/main" id="{96909D05-41DE-0B30-5EC4-E02EECF81C73}"/>
+              </a:ext>
+            </a:extLst>
+          </p:cNvPr>
+          <p:cNvSpPr>
+            <a:spLocks noGrp="1"/>
+          </p:cNvSpPr>
+          <p:nvPr>
+            <p:ph type="dt" idx="1"/>
+          </p:nvPr>
+        </p:nvSpPr>
+        <p:spPr/>
+        <p:txBody>
+          <a:bodyPr/>
+          <a:lstStyle/>
+          <a:p>
+            <a:r>
+              <a:rPr lang="en-US"/>
+              <a:t>2020-09-28</a:t>
+            </a:r>
+          </a:p>
+          <a:p>
+            <a:endParaRPr lang="en-US"/>
+          </a:p>
+        </p:txBody>
+      </p:sp>
+      <p:sp>
+        <p:nvSpPr>
+          <p:cNvPr id="7" name="Slide Number Placeholder 6">
+            <a:extLst>
+              <a:ext uri="{FF2B5EF4-FFF2-40B4-BE49-F238E27FC236}">
+                <a16:creationId xmlns:a16="http://schemas.microsoft.com/office/drawing/2014/main" id="{9AA753C6-A190-6BDE-0A3C-1BF03A49D433}"/>
+              </a:ext>
+            </a:extLst>
+          </p:cNvPr>
+          <p:cNvSpPr>
+            <a:spLocks noGrp="1"/>
+          </p:cNvSpPr>
+          <p:nvPr>
+            <p:ph type="sldNum" sz="quarter" idx="5"/>
+          </p:nvPr>
+        </p:nvSpPr>
+        <p:spPr/>
+        <p:txBody>
+          <a:bodyPr/>
+          <a:lstStyle/>
+          <a:p>
+            <a:fld id="{4165D906-55BD-49C5-997D-27A40DB53D15}" type="slidenum">
+              <a:rPr lang="en-US" smtClean="0">
+                <a:latin typeface="Arial" panose="020B0604020202020204" pitchFamily="34" charset="0"/>
+                <a:cs typeface="Arial" panose="020B0604020202020204" pitchFamily="34" charset="0"/>
+              </a:rPr>
+              <a:pPr/>
+              <a:t>34</a:t>
+            </a:fld>
+            <a:endParaRPr lang="en-US">
+              <a:latin typeface="Arial" panose="020B0604020202020204" pitchFamily="34" charset="0"/>
+              <a:cs typeface="Arial" panose="020B0604020202020204" pitchFamily="34" charset="0"/>
+            </a:endParaRPr>
+          </a:p>
+        </p:txBody>
+      </p:sp>
+    </p:spTree>
+    <p:extLst>
+      <p:ext uri="{BB962C8B-B14F-4D97-AF65-F5344CB8AC3E}">
+        <p14:creationId xmlns:p14="http://schemas.microsoft.com/office/powerpoint/2010/main" val="2374848346"/>
+      </p:ext>
+    </p:extLst>
+  </p:cSld>
+  <p:clrMapOvr>
+    <a:masterClrMapping/>
+  </p:clrMapOvr>
+</p:notes>
+</file>
+
+<file path=ppt/notesSlides/notesSlide15.xml><?xml version="1.0" encoding="utf-8"?>
+<p:notes xmlns:a="http://schemas.openxmlformats.org/drawingml/2006/main" xmlns:r="http://schemas.openxmlformats.org/officeDocument/2006/relationships" xmlns:p="http://schemas.openxmlformats.org/presentationml/2006/main">
+  <p:cSld>
+    <p:spTree>
+      <p:nvGrpSpPr>
+        <p:cNvPr id="1" name="">
+          <a:extLst>
+            <a:ext uri="{FF2B5EF4-FFF2-40B4-BE49-F238E27FC236}">
               <a16:creationId xmlns:a16="http://schemas.microsoft.com/office/drawing/2014/main" id="{61C45BCD-4A05-37C1-FC56-8E7D1643FEFB}"/>
             </a:ext>
           </a:extLst>
@@ -12329,7 +13185,7 @@
                 <a:cs typeface="Arial" panose="020B0604020202020204" pitchFamily="34" charset="0"/>
               </a:rPr>
               <a:pPr/>
-              <a:t>24</a:t>
+              <a:t>36</a:t>
             </a:fld>
             <a:endParaRPr lang="en-US">
               <a:latin typeface="Arial" panose="020B0604020202020204" pitchFamily="34" charset="0"/>
@@ -12351,7 +13207,7 @@
 </p:notes>
 </file>
 
-<file path=ppt/notesSlides/notesSlide12.xml><?xml version="1.0" encoding="utf-8"?>
+<file path=ppt/notesSlides/notesSlide16.xml><?xml version="1.0" encoding="utf-8"?>
 <p:notes xmlns:a="http://schemas.openxmlformats.org/drawingml/2006/main" xmlns:r="http://schemas.openxmlformats.org/officeDocument/2006/relationships" xmlns:p="http://schemas.openxmlformats.org/presentationml/2006/main">
   <p:cSld>
     <p:spTree>
@@ -12540,7 +13396,7 @@
                 <a:cs typeface="Arial" panose="020B0604020202020204" pitchFamily="34" charset="0"/>
               </a:rPr>
               <a:pPr/>
-              <a:t>25</a:t>
+              <a:t>37</a:t>
             </a:fld>
             <a:endParaRPr lang="en-US">
               <a:latin typeface="Arial" panose="020B0604020202020204" pitchFamily="34" charset="0"/>
@@ -12562,7 +13418,7 @@
 </p:notes>
 </file>
 
-<file path=ppt/notesSlides/notesSlide13.xml><?xml version="1.0" encoding="utf-8"?>
+<file path=ppt/notesSlides/notesSlide17.xml><?xml version="1.0" encoding="utf-8"?>
 <p:notes xmlns:a="http://schemas.openxmlformats.org/drawingml/2006/main" xmlns:r="http://schemas.openxmlformats.org/officeDocument/2006/relationships" xmlns:p="http://schemas.openxmlformats.org/presentationml/2006/main">
   <p:cSld>
     <p:spTree>
@@ -12709,7 +13565,7 @@
                 <a:cs typeface="Arial" panose="020B0604020202020204" pitchFamily="34" charset="0"/>
               </a:rPr>
               <a:pPr/>
-              <a:t>26</a:t>
+              <a:t>38</a:t>
             </a:fld>
             <a:endParaRPr lang="en-US">
               <a:latin typeface="Arial" panose="020B0604020202020204" pitchFamily="34" charset="0"/>
@@ -34526,13 +35382,8 @@
             </a:r>
             <a:r>
               <a:rPr lang="en-US" dirty="0"/>
-              <a:t>: We want to make sure that </a:t>
-            </a:r>
-            <a:r>
-              <a:rPr lang="en-US"/>
-              <a:t>the signal can be . </a:t>
-            </a:r>
-            <a:endParaRPr lang="en-US" dirty="0"/>
+              <a:t>: We want to make sure that the signal can be . </a:t>
+            </a:r>
           </a:p>
           <a:p>
             <a:endParaRPr lang="en-US" dirty="0"/>
@@ -34564,7 +35415,15 @@
             </a:r>
             <a:r>
               <a:rPr lang="en-US" dirty="0"/>
-              <a:t>Calculate THD values for the input, output and calibrated waveforms.</a:t>
+              <a:t>Calculate THD values for the input, output and calibrated waveforms. (</a:t>
+            </a:r>
+            <a:r>
+              <a:rPr lang="en-US" i="1" dirty="0"/>
+              <a:t>#ofHarmonics is 9 @1.5 GHz, 15 otherwise</a:t>
+            </a:r>
+            <a:r>
+              <a:rPr lang="en-US" dirty="0"/>
+              <a:t>)</a:t>
             </a:r>
           </a:p>
           <a:p>
@@ -34606,7 +35465,7 @@
             </a:br>
             <a:r>
               <a:rPr lang="en-US" dirty="0"/>
-              <a:t>Final Checking – Set Up</a:t>
+              <a:t>Approaching an ideal calibration: Set Up</a:t>
             </a:r>
             <a:endParaRPr lang="tr-TR" dirty="0"/>
           </a:p>
@@ -34730,14 +35589,7 @@
             <a:pPr algn="ctr"/>
             <a:r>
               <a:rPr lang="en-US" sz="3600" dirty="0"/>
-              <a:t> </a:t>
-            </a:r>
-            <a:br>
-              <a:rPr lang="en-US" sz="3600" dirty="0"/>
-            </a:br>
-            <a:r>
-              <a:rPr lang="en-US" sz="3600" dirty="0"/>
-              <a:t>Final Checking:</a:t>
+              <a:t>Approaching an ideal calibration:</a:t>
             </a:r>
             <a:br>
               <a:rPr lang="en-US" sz="3600" dirty="0"/>
@@ -34770,7 +35622,7 @@
         <p:cNvPr id="1" name="">
           <a:extLst>
             <a:ext uri="{FF2B5EF4-FFF2-40B4-BE49-F238E27FC236}">
-              <a16:creationId xmlns:a16="http://schemas.microsoft.com/office/drawing/2014/main" id="{07DC1060-EAC9-4BAF-DDBF-49F03AA91252}"/>
+              <a16:creationId xmlns:a16="http://schemas.microsoft.com/office/drawing/2014/main" id="{29377AD7-9A25-B505-D783-BC2AC1AE8932}"/>
             </a:ext>
           </a:extLst>
         </p:cNvPr>
@@ -34790,7 +35642,7 @@
           <p:cNvPr id="3" name="Title 2">
             <a:extLst>
               <a:ext uri="{FF2B5EF4-FFF2-40B4-BE49-F238E27FC236}">
-                <a16:creationId xmlns:a16="http://schemas.microsoft.com/office/drawing/2014/main" id="{FEBD8611-DB6F-B45E-47B6-36A49E68329D}"/>
+                <a16:creationId xmlns:a16="http://schemas.microsoft.com/office/drawing/2014/main" id="{BABDF410-F053-5542-20A2-D1495C8D96A2}"/>
               </a:ext>
             </a:extLst>
           </p:cNvPr>
@@ -34801,31 +35653,199 @@
             <p:ph type="title"/>
           </p:nvPr>
         </p:nvSpPr>
+        <p:spPr/>
+        <p:txBody>
+          <a:bodyPr/>
+          <a:lstStyle/>
+          <a:p>
+            <a:r>
+              <a:rPr lang="en-US" dirty="0"/>
+              <a:t>Approaching an ideal calibration - Results</a:t>
+            </a:r>
+            <a:endParaRPr lang="tr-TR" dirty="0"/>
+          </a:p>
+        </p:txBody>
+      </p:sp>
+      <p:sp>
+        <p:nvSpPr>
+          <p:cNvPr id="4" name="Footer Placeholder 3">
+            <a:extLst>
+              <a:ext uri="{FF2B5EF4-FFF2-40B4-BE49-F238E27FC236}">
+                <a16:creationId xmlns:a16="http://schemas.microsoft.com/office/drawing/2014/main" id="{375D18E6-B0DE-932F-8B3E-DAD249BC654D}"/>
+              </a:ext>
+            </a:extLst>
+          </p:cNvPr>
+          <p:cNvSpPr>
+            <a:spLocks noGrp="1"/>
+          </p:cNvSpPr>
+          <p:nvPr>
+            <p:ph type="ftr" sz="quarter" idx="15"/>
+          </p:nvPr>
+        </p:nvSpPr>
+        <p:spPr/>
+        <p:txBody>
+          <a:bodyPr/>
+          <a:lstStyle/>
+          <a:p>
+            <a:endParaRPr lang="en-US"/>
+          </a:p>
+        </p:txBody>
+      </p:sp>
+      <p:sp>
+        <p:nvSpPr>
+          <p:cNvPr id="5" name="Slide Number Placeholder 4">
+            <a:extLst>
+              <a:ext uri="{FF2B5EF4-FFF2-40B4-BE49-F238E27FC236}">
+                <a16:creationId xmlns:a16="http://schemas.microsoft.com/office/drawing/2014/main" id="{B61964AD-4FE0-4CDE-2390-5E798DC40F28}"/>
+              </a:ext>
+            </a:extLst>
+          </p:cNvPr>
+          <p:cNvSpPr>
+            <a:spLocks noGrp="1"/>
+          </p:cNvSpPr>
+          <p:nvPr>
+            <p:ph type="sldNum" sz="quarter" idx="16"/>
+          </p:nvPr>
+        </p:nvSpPr>
+        <p:spPr/>
+        <p:txBody>
+          <a:bodyPr/>
+          <a:lstStyle/>
+          <a:p>
+            <a:r>
+              <a:rPr lang="en-US"/>
+              <a:t> </a:t>
+            </a:r>
+          </a:p>
+        </p:txBody>
+      </p:sp>
+      <p:pic>
+        <p:nvPicPr>
+          <p:cNvPr id="9" name="Content Placeholder 8" descr="A graph of different frequency&#10;&#10;AI-generated content may be incorrect.">
+            <a:extLst>
+              <a:ext uri="{FF2B5EF4-FFF2-40B4-BE49-F238E27FC236}">
+                <a16:creationId xmlns:a16="http://schemas.microsoft.com/office/drawing/2014/main" id="{A56490A6-5BD5-5CAB-B5A1-95EDBB0D9DAF}"/>
+              </a:ext>
+            </a:extLst>
+          </p:cNvPr>
+          <p:cNvPicPr>
+            <a:picLocks noGrp="1" noChangeAspect="1"/>
+          </p:cNvPicPr>
+          <p:nvPr>
+            <p:ph sz="quarter" idx="13"/>
+          </p:nvPr>
+        </p:nvPicPr>
+        <p:blipFill>
+          <a:blip r:embed="rId2">
+            <a:extLst>
+              <a:ext uri="{28A0092B-C50C-407E-A947-70E740481C1C}">
+                <a14:useLocalDpi xmlns:a14="http://schemas.microsoft.com/office/drawing/2010/main" val="0"/>
+              </a:ext>
+            </a:extLst>
+          </a:blip>
+          <a:stretch>
+            <a:fillRect/>
+          </a:stretch>
+        </p:blipFill>
         <p:spPr>
           <a:xfrm>
-            <a:off x="445713" y="1517515"/>
-            <a:ext cx="11300573" cy="2779921"/>
+            <a:off x="334963" y="1376265"/>
+            <a:ext cx="11520487" cy="4897633"/>
           </a:xfrm>
         </p:spPr>
-        <p:txBody>
-          <a:bodyPr/>
-          <a:lstStyle/>
-          <a:p>
-            <a:pPr algn="ctr"/>
-            <a:br>
-              <a:rPr lang="en-US" sz="3600" dirty="0"/>
-            </a:br>
-            <a:r>
-              <a:rPr lang="en-US" sz="3600" dirty="0"/>
-              <a:t>Plans for the next weeks</a:t>
-            </a:r>
-          </a:p>
-        </p:txBody>
-      </p:sp>
+      </p:pic>
+      <p:cxnSp>
+        <p:nvCxnSpPr>
+          <p:cNvPr id="10" name="Straight Arrow Connector 9">
+            <a:extLst>
+              <a:ext uri="{FF2B5EF4-FFF2-40B4-BE49-F238E27FC236}">
+                <a16:creationId xmlns:a16="http://schemas.microsoft.com/office/drawing/2014/main" id="{26619E17-3E67-1A89-1730-369024FBDD4D}"/>
+              </a:ext>
+            </a:extLst>
+          </p:cNvPr>
+          <p:cNvCxnSpPr>
+            <a:cxnSpLocks/>
+          </p:cNvCxnSpPr>
+          <p:nvPr/>
+        </p:nvCxnSpPr>
+        <p:spPr>
+          <a:xfrm flipH="1">
+            <a:off x="1173804" y="4046706"/>
+            <a:ext cx="1258110" cy="515874"/>
+          </a:xfrm>
+          <a:prstGeom prst="straightConnector1">
+            <a:avLst/>
+          </a:prstGeom>
+          <a:ln w="76200">
+            <a:solidFill>
+              <a:srgbClr val="FF0000"/>
+            </a:solidFill>
+            <a:tailEnd type="triangle"/>
+          </a:ln>
+        </p:spPr>
+        <p:style>
+          <a:lnRef idx="1">
+            <a:schemeClr val="accent1"/>
+          </a:lnRef>
+          <a:fillRef idx="0">
+            <a:schemeClr val="accent1"/>
+          </a:fillRef>
+          <a:effectRef idx="0">
+            <a:schemeClr val="accent1"/>
+          </a:effectRef>
+          <a:fontRef idx="minor">
+            <a:schemeClr val="tx1"/>
+          </a:fontRef>
+        </p:style>
+      </p:cxnSp>
+      <p:cxnSp>
+        <p:nvCxnSpPr>
+          <p:cNvPr id="13" name="Straight Arrow Connector 12">
+            <a:extLst>
+              <a:ext uri="{FF2B5EF4-FFF2-40B4-BE49-F238E27FC236}">
+                <a16:creationId xmlns:a16="http://schemas.microsoft.com/office/drawing/2014/main" id="{3B9C8D13-321C-4584-FD36-70040C9E1C38}"/>
+              </a:ext>
+            </a:extLst>
+          </p:cNvPr>
+          <p:cNvCxnSpPr>
+            <a:cxnSpLocks/>
+          </p:cNvCxnSpPr>
+          <p:nvPr/>
+        </p:nvCxnSpPr>
+        <p:spPr>
+          <a:xfrm flipV="1">
+            <a:off x="11018196" y="4137071"/>
+            <a:ext cx="476655" cy="851017"/>
+          </a:xfrm>
+          <a:prstGeom prst="straightConnector1">
+            <a:avLst/>
+          </a:prstGeom>
+          <a:ln w="76200">
+            <a:solidFill>
+              <a:srgbClr val="FF0000"/>
+            </a:solidFill>
+            <a:tailEnd type="triangle"/>
+          </a:ln>
+        </p:spPr>
+        <p:style>
+          <a:lnRef idx="1">
+            <a:schemeClr val="accent1"/>
+          </a:lnRef>
+          <a:fillRef idx="0">
+            <a:schemeClr val="accent1"/>
+          </a:fillRef>
+          <a:effectRef idx="0">
+            <a:schemeClr val="accent1"/>
+          </a:effectRef>
+          <a:fontRef idx="minor">
+            <a:schemeClr val="tx1"/>
+          </a:fontRef>
+        </p:style>
+      </p:cxnSp>
     </p:spTree>
     <p:extLst>
       <p:ext uri="{BB962C8B-B14F-4D97-AF65-F5344CB8AC3E}">
-        <p14:creationId xmlns:p14="http://schemas.microsoft.com/office/powerpoint/2010/main" val="2276428960"/>
+        <p14:creationId xmlns:p14="http://schemas.microsoft.com/office/powerpoint/2010/main" val="2018725671"/>
       </p:ext>
     </p:extLst>
   </p:cSld>
@@ -34843,7 +35863,7 @@
         <p:cNvPr id="1" name="">
           <a:extLst>
             <a:ext uri="{FF2B5EF4-FFF2-40B4-BE49-F238E27FC236}">
-              <a16:creationId xmlns:a16="http://schemas.microsoft.com/office/drawing/2014/main" id="{680F7869-6885-4764-BC2A-EEA50D472907}"/>
+              <a16:creationId xmlns:a16="http://schemas.microsoft.com/office/drawing/2014/main" id="{4E51E902-2BB6-CC45-7206-FB10F519FF2E}"/>
             </a:ext>
           </a:extLst>
         </p:cNvPr>
@@ -34863,7 +35883,7 @@
           <p:cNvPr id="3" name="Title 2">
             <a:extLst>
               <a:ext uri="{FF2B5EF4-FFF2-40B4-BE49-F238E27FC236}">
-                <a16:creationId xmlns:a16="http://schemas.microsoft.com/office/drawing/2014/main" id="{2ADA1D37-2629-ED52-7026-F9A080B825C4}"/>
+                <a16:creationId xmlns:a16="http://schemas.microsoft.com/office/drawing/2014/main" id="{18535830-7A27-1796-6351-9D7A96AD3CE8}"/>
               </a:ext>
             </a:extLst>
           </p:cNvPr>
@@ -34874,106 +35894,33 @@
             <p:ph type="title"/>
           </p:nvPr>
         </p:nvSpPr>
-        <p:spPr/>
+        <p:spPr>
+          <a:xfrm>
+            <a:off x="445713" y="1517515"/>
+            <a:ext cx="11300573" cy="2779921"/>
+          </a:xfrm>
+        </p:spPr>
         <p:txBody>
           <a:bodyPr/>
           <a:lstStyle/>
           <a:p>
-            <a:pPr>
-              <a:lnSpc>
-                <a:spcPct val="250000"/>
-              </a:lnSpc>
-            </a:pPr>
-            <a:r>
-              <a:rPr lang="en-US" dirty="0"/>
-              <a:t>Plans for the next weeks </a:t>
-            </a:r>
-          </a:p>
-        </p:txBody>
-      </p:sp>
-      <p:sp>
-        <p:nvSpPr>
-          <p:cNvPr id="4" name="Footer Placeholder 3">
-            <a:extLst>
-              <a:ext uri="{FF2B5EF4-FFF2-40B4-BE49-F238E27FC236}">
-                <a16:creationId xmlns:a16="http://schemas.microsoft.com/office/drawing/2014/main" id="{B05EA2D6-AA58-9CF6-4C00-B074DB58E102}"/>
-              </a:ext>
-            </a:extLst>
-          </p:cNvPr>
-          <p:cNvSpPr>
-            <a:spLocks noGrp="1"/>
-          </p:cNvSpPr>
-          <p:nvPr>
-            <p:ph type="ftr" sz="quarter" idx="15"/>
-          </p:nvPr>
-        </p:nvSpPr>
-        <p:spPr/>
-        <p:txBody>
-          <a:bodyPr/>
-          <a:lstStyle/>
-          <a:p>
-            <a:endParaRPr lang="en-US"/>
-          </a:p>
-        </p:txBody>
-      </p:sp>
-      <p:sp>
-        <p:nvSpPr>
-          <p:cNvPr id="5" name="Slide Number Placeholder 4">
-            <a:extLst>
-              <a:ext uri="{FF2B5EF4-FFF2-40B4-BE49-F238E27FC236}">
-                <a16:creationId xmlns:a16="http://schemas.microsoft.com/office/drawing/2014/main" id="{72BC4D0F-4BE5-27FC-8DCB-2F3CBCC183FE}"/>
-              </a:ext>
-            </a:extLst>
-          </p:cNvPr>
-          <p:cNvSpPr>
-            <a:spLocks noGrp="1"/>
-          </p:cNvSpPr>
-          <p:nvPr>
-            <p:ph type="sldNum" sz="quarter" idx="16"/>
-          </p:nvPr>
-        </p:nvSpPr>
-        <p:spPr/>
-        <p:txBody>
-          <a:bodyPr/>
-          <a:lstStyle/>
-          <a:p>
-            <a:r>
-              <a:rPr lang="en-US"/>
-              <a:t> </a:t>
-            </a:r>
-          </a:p>
-        </p:txBody>
-      </p:sp>
-      <p:sp>
-        <p:nvSpPr>
-          <p:cNvPr id="10" name="Content Placeholder 9">
-            <a:extLst>
-              <a:ext uri="{FF2B5EF4-FFF2-40B4-BE49-F238E27FC236}">
-                <a16:creationId xmlns:a16="http://schemas.microsoft.com/office/drawing/2014/main" id="{4216B05E-B5E4-FF76-7F06-40FA03298148}"/>
-              </a:ext>
-            </a:extLst>
-          </p:cNvPr>
-          <p:cNvSpPr>
-            <a:spLocks noGrp="1"/>
-          </p:cNvSpPr>
-          <p:nvPr>
-            <p:ph sz="quarter" idx="13"/>
-          </p:nvPr>
-        </p:nvSpPr>
-        <p:spPr/>
-        <p:txBody>
-          <a:bodyPr/>
-          <a:lstStyle/>
-          <a:p>
-            <a:r>
-              <a:rPr lang="en-US" dirty="0"/>
-              <a:t>Now, we decided which order is going to be used.</a:t>
-            </a:r>
-          </a:p>
-          <a:p>
-            <a:r>
-              <a:rPr lang="en-US" dirty="0"/>
-              <a:t>For the next week, implementation in digital domain will be analyzed and discussed.</a:t>
+            <a:pPr algn="ctr"/>
+            <a:br>
+              <a:rPr lang="en-US" sz="3600" dirty="0"/>
+            </a:br>
+            <a:br>
+              <a:rPr lang="en-US" sz="3600" dirty="0"/>
+            </a:br>
+            <a:r>
+              <a:rPr lang="en-US" sz="3600" dirty="0"/>
+              <a:t>Approaching an ideal calibration:</a:t>
+            </a:r>
+            <a:br>
+              <a:rPr lang="en-US" sz="3600" dirty="0"/>
+            </a:br>
+            <a:r>
+              <a:rPr lang="en-US" sz="3600" dirty="0"/>
+              <a:t>Set Up - Reviewed</a:t>
             </a:r>
           </a:p>
         </p:txBody>
@@ -34981,7 +35928,7 @@
     </p:spTree>
     <p:extLst>
       <p:ext uri="{BB962C8B-B14F-4D97-AF65-F5344CB8AC3E}">
-        <p14:creationId xmlns:p14="http://schemas.microsoft.com/office/powerpoint/2010/main" val="2024187701"/>
+        <p14:creationId xmlns:p14="http://schemas.microsoft.com/office/powerpoint/2010/main" val="664467836"/>
       </p:ext>
     </p:extLst>
   </p:cSld>
@@ -34996,7 +35943,13 @@
   <p:cSld>
     <p:spTree>
       <p:nvGrpSpPr>
-        <p:cNvPr id="1" name=""/>
+        <p:cNvPr id="1" name="">
+          <a:extLst>
+            <a:ext uri="{FF2B5EF4-FFF2-40B4-BE49-F238E27FC236}">
+              <a16:creationId xmlns:a16="http://schemas.microsoft.com/office/drawing/2014/main" id="{037B6B2D-AB47-730E-56FE-9F8AE9A342CC}"/>
+            </a:ext>
+          </a:extLst>
+        </p:cNvPr>
         <p:cNvGrpSpPr/>
         <p:nvPr/>
       </p:nvGrpSpPr>
@@ -35008,10 +35961,781 @@
           <a:chExt cx="0" cy="0"/>
         </a:xfrm>
       </p:grpSpPr>
+      <p:sp>
+        <p:nvSpPr>
+          <p:cNvPr id="2" name="Content Placeholder 1">
+            <a:extLst>
+              <a:ext uri="{FF2B5EF4-FFF2-40B4-BE49-F238E27FC236}">
+                <a16:creationId xmlns:a16="http://schemas.microsoft.com/office/drawing/2014/main" id="{63FF426A-BACC-78F4-8434-2381B4E54EB5}"/>
+              </a:ext>
+            </a:extLst>
+          </p:cNvPr>
+          <p:cNvSpPr>
+            <a:spLocks noGrp="1"/>
+          </p:cNvSpPr>
+          <p:nvPr>
+            <p:ph sz="quarter" idx="13"/>
+          </p:nvPr>
+        </p:nvSpPr>
+        <p:spPr/>
+        <p:txBody>
+          <a:bodyPr/>
+          <a:lstStyle/>
+          <a:p>
+            <a:r>
+              <a:rPr lang="en-US" i="1" dirty="0"/>
+              <a:t>Purpose</a:t>
+            </a:r>
+            <a:r>
+              <a:rPr lang="en-US" dirty="0"/>
+              <a:t>: We want to make sure that the signal can be . </a:t>
+            </a:r>
+          </a:p>
+          <a:p>
+            <a:endParaRPr lang="en-US" dirty="0"/>
+          </a:p>
+          <a:p>
+            <a:r>
+              <a:rPr lang="en-US" i="1" dirty="0"/>
+              <a:t>Step 1</a:t>
+            </a:r>
+            <a:r>
+              <a:rPr lang="en-US" dirty="0"/>
+              <a:t>: Take the signal of input and output @ 1 GHz, 1.5GHz and 2 GHz.</a:t>
+            </a:r>
+          </a:p>
+          <a:p>
+            <a:r>
+              <a:rPr lang="en-US" i="1" dirty="0"/>
+              <a:t>Step 2</a:t>
+            </a:r>
+            <a:r>
+              <a:rPr lang="en-US" dirty="0"/>
+              <a:t>: Perform calibration with </a:t>
+            </a:r>
+            <a:r>
+              <a:rPr lang="en-US" b="1" dirty="0"/>
+              <a:t>really high memory orders</a:t>
+            </a:r>
+            <a:r>
+              <a:rPr lang="en-US" dirty="0"/>
+              <a:t> while keeping the polynomial order fixed at 9.</a:t>
+            </a:r>
+          </a:p>
+          <a:p>
+            <a:r>
+              <a:rPr lang="en-US" i="1" dirty="0"/>
+              <a:t>Step 3: </a:t>
+            </a:r>
+            <a:r>
+              <a:rPr lang="en-US" dirty="0"/>
+              <a:t>Calculate THD values for the input, output and calibrated waveforms. </a:t>
+            </a:r>
+            <a:r>
+              <a:rPr lang="en-US" b="1" dirty="0"/>
+              <a:t>(</a:t>
+            </a:r>
+            <a:r>
+              <a:rPr lang="en-US" b="1" i="1" dirty="0"/>
+              <a:t>#ofHarmonics is 9 @ all cases</a:t>
+            </a:r>
+            <a:r>
+              <a:rPr lang="en-US" b="1" dirty="0"/>
+              <a:t>)</a:t>
+            </a:r>
+          </a:p>
+          <a:p>
+            <a:r>
+              <a:rPr lang="en-US" i="1" dirty="0"/>
+              <a:t>Step 4: </a:t>
+            </a:r>
+            <a:r>
+              <a:rPr lang="en-US" dirty="0"/>
+              <a:t>Plot and compare all results in a plot.</a:t>
+            </a:r>
+            <a:endParaRPr lang="tr-TR" i="1" dirty="0"/>
+          </a:p>
+        </p:txBody>
+      </p:sp>
+      <p:sp>
+        <p:nvSpPr>
+          <p:cNvPr id="3" name="Title 2">
+            <a:extLst>
+              <a:ext uri="{FF2B5EF4-FFF2-40B4-BE49-F238E27FC236}">
+                <a16:creationId xmlns:a16="http://schemas.microsoft.com/office/drawing/2014/main" id="{8ED31237-54BF-4A33-5D87-312437F4397F}"/>
+              </a:ext>
+            </a:extLst>
+          </p:cNvPr>
+          <p:cNvSpPr>
+            <a:spLocks noGrp="1"/>
+          </p:cNvSpPr>
+          <p:nvPr>
+            <p:ph type="title"/>
+          </p:nvPr>
+        </p:nvSpPr>
+        <p:spPr/>
+        <p:txBody>
+          <a:bodyPr/>
+          <a:lstStyle/>
+          <a:p>
+            <a:br>
+              <a:rPr lang="en-US" dirty="0"/>
+            </a:br>
+            <a:r>
+              <a:rPr lang="en-US" dirty="0"/>
+              <a:t>Approaching an ideal calibration: Set Up - Reviewed</a:t>
+            </a:r>
+            <a:endParaRPr lang="tr-TR" dirty="0"/>
+          </a:p>
+        </p:txBody>
+      </p:sp>
+      <p:sp>
+        <p:nvSpPr>
+          <p:cNvPr id="4" name="Footer Placeholder 3">
+            <a:extLst>
+              <a:ext uri="{FF2B5EF4-FFF2-40B4-BE49-F238E27FC236}">
+                <a16:creationId xmlns:a16="http://schemas.microsoft.com/office/drawing/2014/main" id="{864CED26-882A-13E6-AF73-7C4B4F37EF1B}"/>
+              </a:ext>
+            </a:extLst>
+          </p:cNvPr>
+          <p:cNvSpPr>
+            <a:spLocks noGrp="1"/>
+          </p:cNvSpPr>
+          <p:nvPr>
+            <p:ph type="ftr" sz="quarter" idx="15"/>
+          </p:nvPr>
+        </p:nvSpPr>
+        <p:spPr/>
+        <p:txBody>
+          <a:bodyPr/>
+          <a:lstStyle/>
+          <a:p>
+            <a:endParaRPr lang="en-US"/>
+          </a:p>
+        </p:txBody>
+      </p:sp>
+      <p:sp>
+        <p:nvSpPr>
+          <p:cNvPr id="5" name="Slide Number Placeholder 4">
+            <a:extLst>
+              <a:ext uri="{FF2B5EF4-FFF2-40B4-BE49-F238E27FC236}">
+                <a16:creationId xmlns:a16="http://schemas.microsoft.com/office/drawing/2014/main" id="{86267473-3A34-8DBD-02DC-F30AB74890FA}"/>
+              </a:ext>
+            </a:extLst>
+          </p:cNvPr>
+          <p:cNvSpPr>
+            <a:spLocks noGrp="1"/>
+          </p:cNvSpPr>
+          <p:nvPr>
+            <p:ph type="sldNum" sz="quarter" idx="16"/>
+          </p:nvPr>
+        </p:nvSpPr>
+        <p:spPr/>
+        <p:txBody>
+          <a:bodyPr/>
+          <a:lstStyle/>
+          <a:p>
+            <a:r>
+              <a:rPr lang="en-US"/>
+              <a:t> </a:t>
+            </a:r>
+          </a:p>
+        </p:txBody>
+      </p:sp>
     </p:spTree>
     <p:extLst>
       <p:ext uri="{BB962C8B-B14F-4D97-AF65-F5344CB8AC3E}">
-        <p14:creationId xmlns:p14="http://schemas.microsoft.com/office/powerpoint/2010/main" val="895135860"/>
+        <p14:creationId xmlns:p14="http://schemas.microsoft.com/office/powerpoint/2010/main" val="3653337"/>
+      </p:ext>
+    </p:extLst>
+  </p:cSld>
+  <p:clrMapOvr>
+    <a:masterClrMapping/>
+  </p:clrMapOvr>
+</p:sld>
+</file>
+
+<file path=ppt/slides/slide27.xml><?xml version="1.0" encoding="utf-8"?>
+<p:sld xmlns:a="http://schemas.openxmlformats.org/drawingml/2006/main" xmlns:r="http://schemas.openxmlformats.org/officeDocument/2006/relationships" xmlns:p="http://schemas.openxmlformats.org/presentationml/2006/main">
+  <p:cSld>
+    <p:spTree>
+      <p:nvGrpSpPr>
+        <p:cNvPr id="1" name="">
+          <a:extLst>
+            <a:ext uri="{FF2B5EF4-FFF2-40B4-BE49-F238E27FC236}">
+              <a16:creationId xmlns:a16="http://schemas.microsoft.com/office/drawing/2014/main" id="{14DC6ED1-8171-9935-38AC-ACB8A286CD72}"/>
+            </a:ext>
+          </a:extLst>
+        </p:cNvPr>
+        <p:cNvGrpSpPr/>
+        <p:nvPr/>
+      </p:nvGrpSpPr>
+      <p:grpSpPr>
+        <a:xfrm>
+          <a:off x="0" y="0"/>
+          <a:ext cx="0" cy="0"/>
+          <a:chOff x="0" y="0"/>
+          <a:chExt cx="0" cy="0"/>
+        </a:xfrm>
+      </p:grpSpPr>
+      <p:sp>
+        <p:nvSpPr>
+          <p:cNvPr id="3" name="Title 2">
+            <a:extLst>
+              <a:ext uri="{FF2B5EF4-FFF2-40B4-BE49-F238E27FC236}">
+                <a16:creationId xmlns:a16="http://schemas.microsoft.com/office/drawing/2014/main" id="{3028EDD7-C666-6138-F775-0DC4A3D8CC13}"/>
+              </a:ext>
+            </a:extLst>
+          </p:cNvPr>
+          <p:cNvSpPr>
+            <a:spLocks noGrp="1"/>
+          </p:cNvSpPr>
+          <p:nvPr>
+            <p:ph type="title"/>
+          </p:nvPr>
+        </p:nvSpPr>
+        <p:spPr/>
+        <p:txBody>
+          <a:bodyPr/>
+          <a:lstStyle/>
+          <a:p>
+            <a:r>
+              <a:rPr lang="en-US" dirty="0"/>
+              <a:t>Approaching an ideal calibration – Results - Reviewed</a:t>
+            </a:r>
+            <a:endParaRPr lang="tr-TR" dirty="0"/>
+          </a:p>
+        </p:txBody>
+      </p:sp>
+      <p:sp>
+        <p:nvSpPr>
+          <p:cNvPr id="4" name="Footer Placeholder 3">
+            <a:extLst>
+              <a:ext uri="{FF2B5EF4-FFF2-40B4-BE49-F238E27FC236}">
+                <a16:creationId xmlns:a16="http://schemas.microsoft.com/office/drawing/2014/main" id="{47F079B6-E584-9165-CB6F-E00F55AD504B}"/>
+              </a:ext>
+            </a:extLst>
+          </p:cNvPr>
+          <p:cNvSpPr>
+            <a:spLocks noGrp="1"/>
+          </p:cNvSpPr>
+          <p:nvPr>
+            <p:ph type="ftr" sz="quarter" idx="15"/>
+          </p:nvPr>
+        </p:nvSpPr>
+        <p:spPr/>
+        <p:txBody>
+          <a:bodyPr/>
+          <a:lstStyle/>
+          <a:p>
+            <a:endParaRPr lang="en-US"/>
+          </a:p>
+        </p:txBody>
+      </p:sp>
+      <p:sp>
+        <p:nvSpPr>
+          <p:cNvPr id="5" name="Slide Number Placeholder 4">
+            <a:extLst>
+              <a:ext uri="{FF2B5EF4-FFF2-40B4-BE49-F238E27FC236}">
+                <a16:creationId xmlns:a16="http://schemas.microsoft.com/office/drawing/2014/main" id="{69446F41-896A-B0F6-90EC-863755842C27}"/>
+              </a:ext>
+            </a:extLst>
+          </p:cNvPr>
+          <p:cNvSpPr>
+            <a:spLocks noGrp="1"/>
+          </p:cNvSpPr>
+          <p:nvPr>
+            <p:ph type="sldNum" sz="quarter" idx="16"/>
+          </p:nvPr>
+        </p:nvSpPr>
+        <p:spPr/>
+        <p:txBody>
+          <a:bodyPr/>
+          <a:lstStyle/>
+          <a:p>
+            <a:r>
+              <a:rPr lang="en-US"/>
+              <a:t> </a:t>
+            </a:r>
+          </a:p>
+        </p:txBody>
+      </p:sp>
+      <p:cxnSp>
+        <p:nvCxnSpPr>
+          <p:cNvPr id="10" name="Straight Arrow Connector 9">
+            <a:extLst>
+              <a:ext uri="{FF2B5EF4-FFF2-40B4-BE49-F238E27FC236}">
+                <a16:creationId xmlns:a16="http://schemas.microsoft.com/office/drawing/2014/main" id="{3874C80E-F6A1-5B4D-882D-5323F4D4BB0D}"/>
+              </a:ext>
+            </a:extLst>
+          </p:cNvPr>
+          <p:cNvCxnSpPr>
+            <a:cxnSpLocks/>
+          </p:cNvCxnSpPr>
+          <p:nvPr/>
+        </p:nvCxnSpPr>
+        <p:spPr>
+          <a:xfrm flipH="1">
+            <a:off x="1173804" y="4046706"/>
+            <a:ext cx="1258110" cy="515874"/>
+          </a:xfrm>
+          <a:prstGeom prst="straightConnector1">
+            <a:avLst/>
+          </a:prstGeom>
+          <a:ln w="76200">
+            <a:solidFill>
+              <a:srgbClr val="FF0000"/>
+            </a:solidFill>
+            <a:tailEnd type="triangle"/>
+          </a:ln>
+        </p:spPr>
+        <p:style>
+          <a:lnRef idx="1">
+            <a:schemeClr val="accent1"/>
+          </a:lnRef>
+          <a:fillRef idx="0">
+            <a:schemeClr val="accent1"/>
+          </a:fillRef>
+          <a:effectRef idx="0">
+            <a:schemeClr val="accent1"/>
+          </a:effectRef>
+          <a:fontRef idx="minor">
+            <a:schemeClr val="tx1"/>
+          </a:fontRef>
+        </p:style>
+      </p:cxnSp>
+      <p:cxnSp>
+        <p:nvCxnSpPr>
+          <p:cNvPr id="13" name="Straight Arrow Connector 12">
+            <a:extLst>
+              <a:ext uri="{FF2B5EF4-FFF2-40B4-BE49-F238E27FC236}">
+                <a16:creationId xmlns:a16="http://schemas.microsoft.com/office/drawing/2014/main" id="{2CAC5102-BE28-B0EE-2854-32BEE959181A}"/>
+              </a:ext>
+            </a:extLst>
+          </p:cNvPr>
+          <p:cNvCxnSpPr>
+            <a:cxnSpLocks/>
+          </p:cNvCxnSpPr>
+          <p:nvPr/>
+        </p:nvCxnSpPr>
+        <p:spPr>
+          <a:xfrm flipV="1">
+            <a:off x="11018196" y="4137071"/>
+            <a:ext cx="476655" cy="851017"/>
+          </a:xfrm>
+          <a:prstGeom prst="straightConnector1">
+            <a:avLst/>
+          </a:prstGeom>
+          <a:ln w="76200">
+            <a:solidFill>
+              <a:srgbClr val="FF0000"/>
+            </a:solidFill>
+            <a:tailEnd type="triangle"/>
+          </a:ln>
+        </p:spPr>
+        <p:style>
+          <a:lnRef idx="1">
+            <a:schemeClr val="accent1"/>
+          </a:lnRef>
+          <a:fillRef idx="0">
+            <a:schemeClr val="accent1"/>
+          </a:fillRef>
+          <a:effectRef idx="0">
+            <a:schemeClr val="accent1"/>
+          </a:effectRef>
+          <a:fontRef idx="minor">
+            <a:schemeClr val="tx1"/>
+          </a:fontRef>
+        </p:style>
+      </p:cxnSp>
+      <p:pic>
+        <p:nvPicPr>
+          <p:cNvPr id="6" name="Picture 5" descr="A graph of different colored lines&#10;&#10;AI-generated content may be incorrect.">
+            <a:extLst>
+              <a:ext uri="{FF2B5EF4-FFF2-40B4-BE49-F238E27FC236}">
+                <a16:creationId xmlns:a16="http://schemas.microsoft.com/office/drawing/2014/main" id="{216DF03B-A0BA-1895-055F-F76AC177F775}"/>
+              </a:ext>
+            </a:extLst>
+          </p:cNvPr>
+          <p:cNvPicPr>
+            <a:picLocks noChangeAspect="1"/>
+          </p:cNvPicPr>
+          <p:nvPr/>
+        </p:nvPicPr>
+        <p:blipFill>
+          <a:blip r:embed="rId2">
+            <a:extLst>
+              <a:ext uri="{28A0092B-C50C-407E-A947-70E740481C1C}">
+                <a14:useLocalDpi xmlns:a14="http://schemas.microsoft.com/office/drawing/2010/main" val="0"/>
+              </a:ext>
+            </a:extLst>
+          </a:blip>
+          <a:stretch>
+            <a:fillRect/>
+          </a:stretch>
+        </p:blipFill>
+        <p:spPr>
+          <a:xfrm>
+            <a:off x="-1200" y="1210048"/>
+            <a:ext cx="12192000" cy="5243465"/>
+          </a:xfrm>
+          <a:prstGeom prst="rect">
+            <a:avLst/>
+          </a:prstGeom>
+        </p:spPr>
+      </p:pic>
+      <p:cxnSp>
+        <p:nvCxnSpPr>
+          <p:cNvPr id="11" name="Straight Arrow Connector 10">
+            <a:extLst>
+              <a:ext uri="{FF2B5EF4-FFF2-40B4-BE49-F238E27FC236}">
+                <a16:creationId xmlns:a16="http://schemas.microsoft.com/office/drawing/2014/main" id="{38EFE8E9-F184-F906-5579-1C2EB204B711}"/>
+              </a:ext>
+            </a:extLst>
+          </p:cNvPr>
+          <p:cNvCxnSpPr>
+            <a:cxnSpLocks/>
+          </p:cNvCxnSpPr>
+          <p:nvPr/>
+        </p:nvCxnSpPr>
+        <p:spPr>
+          <a:xfrm flipH="1">
+            <a:off x="879754" y="4304643"/>
+            <a:ext cx="1258110" cy="515874"/>
+          </a:xfrm>
+          <a:prstGeom prst="straightConnector1">
+            <a:avLst/>
+          </a:prstGeom>
+          <a:ln w="76200">
+            <a:solidFill>
+              <a:srgbClr val="FF0000"/>
+            </a:solidFill>
+            <a:tailEnd type="triangle"/>
+          </a:ln>
+        </p:spPr>
+        <p:style>
+          <a:lnRef idx="1">
+            <a:schemeClr val="accent1"/>
+          </a:lnRef>
+          <a:fillRef idx="0">
+            <a:schemeClr val="accent1"/>
+          </a:fillRef>
+          <a:effectRef idx="0">
+            <a:schemeClr val="accent1"/>
+          </a:effectRef>
+          <a:fontRef idx="minor">
+            <a:schemeClr val="tx1"/>
+          </a:fontRef>
+        </p:style>
+      </p:cxnSp>
+      <p:cxnSp>
+        <p:nvCxnSpPr>
+          <p:cNvPr id="12" name="Straight Arrow Connector 11">
+            <a:extLst>
+              <a:ext uri="{FF2B5EF4-FFF2-40B4-BE49-F238E27FC236}">
+                <a16:creationId xmlns:a16="http://schemas.microsoft.com/office/drawing/2014/main" id="{427B5085-6C12-F6D0-9FBB-00F8997E97BB}"/>
+              </a:ext>
+            </a:extLst>
+          </p:cNvPr>
+          <p:cNvCxnSpPr>
+            <a:cxnSpLocks/>
+          </p:cNvCxnSpPr>
+          <p:nvPr/>
+        </p:nvCxnSpPr>
+        <p:spPr>
+          <a:xfrm flipV="1">
+            <a:off x="11318731" y="4304643"/>
+            <a:ext cx="476655" cy="851017"/>
+          </a:xfrm>
+          <a:prstGeom prst="straightConnector1">
+            <a:avLst/>
+          </a:prstGeom>
+          <a:ln w="76200">
+            <a:solidFill>
+              <a:srgbClr val="FF0000"/>
+            </a:solidFill>
+            <a:tailEnd type="triangle"/>
+          </a:ln>
+        </p:spPr>
+        <p:style>
+          <a:lnRef idx="1">
+            <a:schemeClr val="accent1"/>
+          </a:lnRef>
+          <a:fillRef idx="0">
+            <a:schemeClr val="accent1"/>
+          </a:fillRef>
+          <a:effectRef idx="0">
+            <a:schemeClr val="accent1"/>
+          </a:effectRef>
+          <a:fontRef idx="minor">
+            <a:schemeClr val="tx1"/>
+          </a:fontRef>
+        </p:style>
+      </p:cxnSp>
+    </p:spTree>
+    <p:extLst>
+      <p:ext uri="{BB962C8B-B14F-4D97-AF65-F5344CB8AC3E}">
+        <p14:creationId xmlns:p14="http://schemas.microsoft.com/office/powerpoint/2010/main" val="1027904537"/>
+      </p:ext>
+    </p:extLst>
+  </p:cSld>
+  <p:clrMapOvr>
+    <a:masterClrMapping/>
+  </p:clrMapOvr>
+</p:sld>
+</file>
+
+<file path=ppt/slides/slide28.xml><?xml version="1.0" encoding="utf-8"?>
+<p:sld xmlns:a="http://schemas.openxmlformats.org/drawingml/2006/main" xmlns:r="http://schemas.openxmlformats.org/officeDocument/2006/relationships" xmlns:p="http://schemas.openxmlformats.org/presentationml/2006/main">
+  <p:cSld>
+    <p:spTree>
+      <p:nvGrpSpPr>
+        <p:cNvPr id="1" name="">
+          <a:extLst>
+            <a:ext uri="{FF2B5EF4-FFF2-40B4-BE49-F238E27FC236}">
+              <a16:creationId xmlns:a16="http://schemas.microsoft.com/office/drawing/2014/main" id="{A5244F14-E346-4EBA-3F4B-EF0EBA50ED3A}"/>
+            </a:ext>
+          </a:extLst>
+        </p:cNvPr>
+        <p:cNvGrpSpPr/>
+        <p:nvPr/>
+      </p:nvGrpSpPr>
+      <p:grpSpPr>
+        <a:xfrm>
+          <a:off x="0" y="0"/>
+          <a:ext cx="0" cy="0"/>
+          <a:chOff x="0" y="0"/>
+          <a:chExt cx="0" cy="0"/>
+        </a:xfrm>
+      </p:grpSpPr>
+      <p:sp>
+        <p:nvSpPr>
+          <p:cNvPr id="3" name="Title 2">
+            <a:extLst>
+              <a:ext uri="{FF2B5EF4-FFF2-40B4-BE49-F238E27FC236}">
+                <a16:creationId xmlns:a16="http://schemas.microsoft.com/office/drawing/2014/main" id="{B7B2617F-AADD-699D-C659-B4CB4E280573}"/>
+              </a:ext>
+            </a:extLst>
+          </p:cNvPr>
+          <p:cNvSpPr>
+            <a:spLocks noGrp="1"/>
+          </p:cNvSpPr>
+          <p:nvPr>
+            <p:ph type="title"/>
+          </p:nvPr>
+        </p:nvSpPr>
+        <p:spPr>
+          <a:xfrm>
+            <a:off x="445713" y="1517515"/>
+            <a:ext cx="11300573" cy="2779921"/>
+          </a:xfrm>
+        </p:spPr>
+        <p:txBody>
+          <a:bodyPr/>
+          <a:lstStyle/>
+          <a:p>
+            <a:pPr algn="ctr"/>
+            <a:r>
+              <a:rPr lang="en-US" sz="3600" dirty="0"/>
+              <a:t>Approaching an ideal calibration:</a:t>
+            </a:r>
+            <a:br>
+              <a:rPr lang="en-US" sz="3600" dirty="0"/>
+            </a:br>
+            <a:r>
+              <a:rPr lang="en-US" sz="3600" dirty="0"/>
+              <a:t>Problem @1GHz</a:t>
+            </a:r>
+          </a:p>
+        </p:txBody>
+      </p:sp>
+    </p:spTree>
+    <p:extLst>
+      <p:ext uri="{BB962C8B-B14F-4D97-AF65-F5344CB8AC3E}">
+        <p14:creationId xmlns:p14="http://schemas.microsoft.com/office/powerpoint/2010/main" val="147095052"/>
+      </p:ext>
+    </p:extLst>
+  </p:cSld>
+  <p:clrMapOvr>
+    <a:masterClrMapping/>
+  </p:clrMapOvr>
+</p:sld>
+</file>
+
+<file path=ppt/slides/slide29.xml><?xml version="1.0" encoding="utf-8"?>
+<p:sld xmlns:a="http://schemas.openxmlformats.org/drawingml/2006/main" xmlns:r="http://schemas.openxmlformats.org/officeDocument/2006/relationships" xmlns:p="http://schemas.openxmlformats.org/presentationml/2006/main">
+  <p:cSld>
+    <p:spTree>
+      <p:nvGrpSpPr>
+        <p:cNvPr id="1" name="">
+          <a:extLst>
+            <a:ext uri="{FF2B5EF4-FFF2-40B4-BE49-F238E27FC236}">
+              <a16:creationId xmlns:a16="http://schemas.microsoft.com/office/drawing/2014/main" id="{4C0AADEB-5345-2435-E342-63771B379A8A}"/>
+            </a:ext>
+          </a:extLst>
+        </p:cNvPr>
+        <p:cNvGrpSpPr/>
+        <p:nvPr/>
+      </p:nvGrpSpPr>
+      <p:grpSpPr>
+        <a:xfrm>
+          <a:off x="0" y="0"/>
+          <a:ext cx="0" cy="0"/>
+          <a:chOff x="0" y="0"/>
+          <a:chExt cx="0" cy="0"/>
+        </a:xfrm>
+      </p:grpSpPr>
+      <p:sp>
+        <p:nvSpPr>
+          <p:cNvPr id="3" name="Title 2">
+            <a:extLst>
+              <a:ext uri="{FF2B5EF4-FFF2-40B4-BE49-F238E27FC236}">
+                <a16:creationId xmlns:a16="http://schemas.microsoft.com/office/drawing/2014/main" id="{73AF3D1F-3E37-B303-314C-78B9FCBB30B0}"/>
+              </a:ext>
+            </a:extLst>
+          </p:cNvPr>
+          <p:cNvSpPr>
+            <a:spLocks noGrp="1"/>
+          </p:cNvSpPr>
+          <p:nvPr>
+            <p:ph type="title"/>
+          </p:nvPr>
+        </p:nvSpPr>
+        <p:spPr/>
+        <p:txBody>
+          <a:bodyPr/>
+          <a:lstStyle/>
+          <a:p>
+            <a:r>
+              <a:rPr lang="en-US" dirty="0"/>
+              <a:t>Approaching an ideal calibration – Problem @1GHz</a:t>
+            </a:r>
+            <a:endParaRPr lang="tr-TR" dirty="0"/>
+          </a:p>
+        </p:txBody>
+      </p:sp>
+      <p:sp>
+        <p:nvSpPr>
+          <p:cNvPr id="4" name="Footer Placeholder 3">
+            <a:extLst>
+              <a:ext uri="{FF2B5EF4-FFF2-40B4-BE49-F238E27FC236}">
+                <a16:creationId xmlns:a16="http://schemas.microsoft.com/office/drawing/2014/main" id="{641C58C2-7128-248E-B5F4-18DBA0970E03}"/>
+              </a:ext>
+            </a:extLst>
+          </p:cNvPr>
+          <p:cNvSpPr>
+            <a:spLocks noGrp="1"/>
+          </p:cNvSpPr>
+          <p:nvPr>
+            <p:ph type="ftr" sz="quarter" idx="15"/>
+          </p:nvPr>
+        </p:nvSpPr>
+        <p:spPr/>
+        <p:txBody>
+          <a:bodyPr/>
+          <a:lstStyle/>
+          <a:p>
+            <a:endParaRPr lang="en-US"/>
+          </a:p>
+        </p:txBody>
+      </p:sp>
+      <p:sp>
+        <p:nvSpPr>
+          <p:cNvPr id="5" name="Slide Number Placeholder 4">
+            <a:extLst>
+              <a:ext uri="{FF2B5EF4-FFF2-40B4-BE49-F238E27FC236}">
+                <a16:creationId xmlns:a16="http://schemas.microsoft.com/office/drawing/2014/main" id="{CD839F67-CA42-B6A7-5D45-4D78DF6A1B28}"/>
+              </a:ext>
+            </a:extLst>
+          </p:cNvPr>
+          <p:cNvSpPr>
+            <a:spLocks noGrp="1"/>
+          </p:cNvSpPr>
+          <p:nvPr>
+            <p:ph type="sldNum" sz="quarter" idx="16"/>
+          </p:nvPr>
+        </p:nvSpPr>
+        <p:spPr/>
+        <p:txBody>
+          <a:bodyPr/>
+          <a:lstStyle/>
+          <a:p>
+            <a:r>
+              <a:rPr lang="en-US"/>
+              <a:t> </a:t>
+            </a:r>
+          </a:p>
+        </p:txBody>
+      </p:sp>
+      <p:sp>
+        <p:nvSpPr>
+          <p:cNvPr id="6" name="Content Placeholder 5">
+            <a:extLst>
+              <a:ext uri="{FF2B5EF4-FFF2-40B4-BE49-F238E27FC236}">
+                <a16:creationId xmlns:a16="http://schemas.microsoft.com/office/drawing/2014/main" id="{2DD18650-E317-03C7-0562-A9B481EDBC56}"/>
+              </a:ext>
+            </a:extLst>
+          </p:cNvPr>
+          <p:cNvSpPr>
+            <a:spLocks noGrp="1"/>
+          </p:cNvSpPr>
+          <p:nvPr>
+            <p:ph sz="quarter" idx="13"/>
+          </p:nvPr>
+        </p:nvSpPr>
+        <p:spPr/>
+        <p:txBody>
+          <a:bodyPr/>
+          <a:lstStyle/>
+          <a:p>
+            <a:r>
+              <a:rPr lang="en-US" dirty="0"/>
+              <a:t>Input Voltage Waveform @1GHz</a:t>
+            </a:r>
+            <a:endParaRPr lang="tr-TR" dirty="0"/>
+          </a:p>
+        </p:txBody>
+      </p:sp>
+      <p:pic>
+        <p:nvPicPr>
+          <p:cNvPr id="12" name="Picture 11" descr="A graph of a graph&#10;&#10;AI-generated content may be incorrect.">
+            <a:extLst>
+              <a:ext uri="{FF2B5EF4-FFF2-40B4-BE49-F238E27FC236}">
+                <a16:creationId xmlns:a16="http://schemas.microsoft.com/office/drawing/2014/main" id="{4D46EDE1-B6CD-12D5-CDD3-205382E705D6}"/>
+              </a:ext>
+            </a:extLst>
+          </p:cNvPr>
+          <p:cNvPicPr>
+            <a:picLocks noChangeAspect="1"/>
+          </p:cNvPicPr>
+          <p:nvPr/>
+        </p:nvPicPr>
+        <p:blipFill>
+          <a:blip r:embed="rId2">
+            <a:extLst>
+              <a:ext uri="{28A0092B-C50C-407E-A947-70E740481C1C}">
+                <a14:useLocalDpi xmlns:a14="http://schemas.microsoft.com/office/drawing/2010/main" val="0"/>
+              </a:ext>
+            </a:extLst>
+          </a:blip>
+          <a:stretch>
+            <a:fillRect/>
+          </a:stretch>
+        </p:blipFill>
+        <p:spPr>
+          <a:xfrm>
+            <a:off x="167400" y="1687191"/>
+            <a:ext cx="11857200" cy="5170809"/>
+          </a:xfrm>
+          <a:prstGeom prst="rect">
+            <a:avLst/>
+          </a:prstGeom>
+        </p:spPr>
+      </p:pic>
+    </p:spTree>
+    <p:extLst>
+      <p:ext uri="{BB962C8B-B14F-4D97-AF65-F5344CB8AC3E}">
+        <p14:creationId xmlns:p14="http://schemas.microsoft.com/office/powerpoint/2010/main" val="2506714919"/>
       </p:ext>
     </p:extLst>
   </p:cSld>
@@ -35095,6 +36819,1207 @@
     <p:extLst>
       <p:ext uri="{BB962C8B-B14F-4D97-AF65-F5344CB8AC3E}">
         <p14:creationId xmlns:p14="http://schemas.microsoft.com/office/powerpoint/2010/main" val="3638456107"/>
+      </p:ext>
+    </p:extLst>
+  </p:cSld>
+  <p:clrMapOvr>
+    <a:masterClrMapping/>
+  </p:clrMapOvr>
+</p:sld>
+</file>
+
+<file path=ppt/slides/slide30.xml><?xml version="1.0" encoding="utf-8"?>
+<p:sld xmlns:a="http://schemas.openxmlformats.org/drawingml/2006/main" xmlns:r="http://schemas.openxmlformats.org/officeDocument/2006/relationships" xmlns:p="http://schemas.openxmlformats.org/presentationml/2006/main">
+  <p:cSld>
+    <p:spTree>
+      <p:nvGrpSpPr>
+        <p:cNvPr id="1" name="">
+          <a:extLst>
+            <a:ext uri="{FF2B5EF4-FFF2-40B4-BE49-F238E27FC236}">
+              <a16:creationId xmlns:a16="http://schemas.microsoft.com/office/drawing/2014/main" id="{B7DE9E49-A611-9146-BC9A-E9625EF9A8C1}"/>
+            </a:ext>
+          </a:extLst>
+        </p:cNvPr>
+        <p:cNvGrpSpPr/>
+        <p:nvPr/>
+      </p:nvGrpSpPr>
+      <p:grpSpPr>
+        <a:xfrm>
+          <a:off x="0" y="0"/>
+          <a:ext cx="0" cy="0"/>
+          <a:chOff x="0" y="0"/>
+          <a:chExt cx="0" cy="0"/>
+        </a:xfrm>
+      </p:grpSpPr>
+      <p:sp>
+        <p:nvSpPr>
+          <p:cNvPr id="3" name="Title 2">
+            <a:extLst>
+              <a:ext uri="{FF2B5EF4-FFF2-40B4-BE49-F238E27FC236}">
+                <a16:creationId xmlns:a16="http://schemas.microsoft.com/office/drawing/2014/main" id="{5B95DA1D-CC23-3919-28B9-F1BA4CD00362}"/>
+              </a:ext>
+            </a:extLst>
+          </p:cNvPr>
+          <p:cNvSpPr>
+            <a:spLocks noGrp="1"/>
+          </p:cNvSpPr>
+          <p:nvPr>
+            <p:ph type="title"/>
+          </p:nvPr>
+        </p:nvSpPr>
+        <p:spPr/>
+        <p:txBody>
+          <a:bodyPr/>
+          <a:lstStyle/>
+          <a:p>
+            <a:r>
+              <a:rPr lang="en-US" dirty="0"/>
+              <a:t>Approaching an ideal calibration – Problem @1GHz</a:t>
+            </a:r>
+            <a:endParaRPr lang="tr-TR" dirty="0"/>
+          </a:p>
+        </p:txBody>
+      </p:sp>
+      <p:sp>
+        <p:nvSpPr>
+          <p:cNvPr id="4" name="Footer Placeholder 3">
+            <a:extLst>
+              <a:ext uri="{FF2B5EF4-FFF2-40B4-BE49-F238E27FC236}">
+                <a16:creationId xmlns:a16="http://schemas.microsoft.com/office/drawing/2014/main" id="{09C678F4-4511-655E-235A-D0CB3D6D4BA4}"/>
+              </a:ext>
+            </a:extLst>
+          </p:cNvPr>
+          <p:cNvSpPr>
+            <a:spLocks noGrp="1"/>
+          </p:cNvSpPr>
+          <p:nvPr>
+            <p:ph type="ftr" sz="quarter" idx="15"/>
+          </p:nvPr>
+        </p:nvSpPr>
+        <p:spPr/>
+        <p:txBody>
+          <a:bodyPr/>
+          <a:lstStyle/>
+          <a:p>
+            <a:endParaRPr lang="en-US"/>
+          </a:p>
+        </p:txBody>
+      </p:sp>
+      <p:sp>
+        <p:nvSpPr>
+          <p:cNvPr id="5" name="Slide Number Placeholder 4">
+            <a:extLst>
+              <a:ext uri="{FF2B5EF4-FFF2-40B4-BE49-F238E27FC236}">
+                <a16:creationId xmlns:a16="http://schemas.microsoft.com/office/drawing/2014/main" id="{0C585C5D-5E15-CE7F-C030-895C7149A1B1}"/>
+              </a:ext>
+            </a:extLst>
+          </p:cNvPr>
+          <p:cNvSpPr>
+            <a:spLocks noGrp="1"/>
+          </p:cNvSpPr>
+          <p:nvPr>
+            <p:ph type="sldNum" sz="quarter" idx="16"/>
+          </p:nvPr>
+        </p:nvSpPr>
+        <p:spPr/>
+        <p:txBody>
+          <a:bodyPr/>
+          <a:lstStyle/>
+          <a:p>
+            <a:r>
+              <a:rPr lang="en-US"/>
+              <a:t> </a:t>
+            </a:r>
+          </a:p>
+        </p:txBody>
+      </p:sp>
+      <p:sp>
+        <p:nvSpPr>
+          <p:cNvPr id="6" name="Content Placeholder 5">
+            <a:extLst>
+              <a:ext uri="{FF2B5EF4-FFF2-40B4-BE49-F238E27FC236}">
+                <a16:creationId xmlns:a16="http://schemas.microsoft.com/office/drawing/2014/main" id="{D12754EE-D83E-6EB6-2502-26F840EA929B}"/>
+              </a:ext>
+            </a:extLst>
+          </p:cNvPr>
+          <p:cNvSpPr>
+            <a:spLocks noGrp="1"/>
+          </p:cNvSpPr>
+          <p:nvPr>
+            <p:ph sz="quarter" idx="13"/>
+          </p:nvPr>
+        </p:nvSpPr>
+        <p:spPr/>
+        <p:txBody>
+          <a:bodyPr/>
+          <a:lstStyle/>
+          <a:p>
+            <a:r>
+              <a:rPr lang="en-US" dirty="0"/>
+              <a:t>Calibrated Voltage Waveform @1GHz</a:t>
+            </a:r>
+            <a:endParaRPr lang="tr-TR" dirty="0"/>
+          </a:p>
+        </p:txBody>
+      </p:sp>
+      <p:pic>
+        <p:nvPicPr>
+          <p:cNvPr id="7" name="Picture 6" descr="A graph of a graph&#10;&#10;AI-generated content may be incorrect.">
+            <a:extLst>
+              <a:ext uri="{FF2B5EF4-FFF2-40B4-BE49-F238E27FC236}">
+                <a16:creationId xmlns:a16="http://schemas.microsoft.com/office/drawing/2014/main" id="{0EB42BD4-2C69-062A-5D7C-A05339765E93}"/>
+              </a:ext>
+            </a:extLst>
+          </p:cNvPr>
+          <p:cNvPicPr>
+            <a:picLocks noChangeAspect="1"/>
+          </p:cNvPicPr>
+          <p:nvPr/>
+        </p:nvPicPr>
+        <p:blipFill>
+          <a:blip r:embed="rId2">
+            <a:extLst>
+              <a:ext uri="{28A0092B-C50C-407E-A947-70E740481C1C}">
+                <a14:useLocalDpi xmlns:a14="http://schemas.microsoft.com/office/drawing/2010/main" val="0"/>
+              </a:ext>
+            </a:extLst>
+          </a:blip>
+          <a:stretch>
+            <a:fillRect/>
+          </a:stretch>
+        </p:blipFill>
+        <p:spPr>
+          <a:xfrm>
+            <a:off x="334799" y="1701445"/>
+            <a:ext cx="11520001" cy="5040000"/>
+          </a:xfrm>
+          <a:prstGeom prst="rect">
+            <a:avLst/>
+          </a:prstGeom>
+        </p:spPr>
+      </p:pic>
+    </p:spTree>
+    <p:extLst>
+      <p:ext uri="{BB962C8B-B14F-4D97-AF65-F5344CB8AC3E}">
+        <p14:creationId xmlns:p14="http://schemas.microsoft.com/office/powerpoint/2010/main" val="2967630317"/>
+      </p:ext>
+    </p:extLst>
+  </p:cSld>
+  <p:clrMapOvr>
+    <a:masterClrMapping/>
+  </p:clrMapOvr>
+</p:sld>
+</file>
+
+<file path=ppt/slides/slide31.xml><?xml version="1.0" encoding="utf-8"?>
+<p:sld xmlns:a="http://schemas.openxmlformats.org/drawingml/2006/main" xmlns:r="http://schemas.openxmlformats.org/officeDocument/2006/relationships" xmlns:p="http://schemas.openxmlformats.org/presentationml/2006/main">
+  <p:cSld>
+    <p:spTree>
+      <p:nvGrpSpPr>
+        <p:cNvPr id="1" name="">
+          <a:extLst>
+            <a:ext uri="{FF2B5EF4-FFF2-40B4-BE49-F238E27FC236}">
+              <a16:creationId xmlns:a16="http://schemas.microsoft.com/office/drawing/2014/main" id="{83D04BF0-A3DF-5556-36D5-6DA3E2CF7555}"/>
+            </a:ext>
+          </a:extLst>
+        </p:cNvPr>
+        <p:cNvGrpSpPr/>
+        <p:nvPr/>
+      </p:nvGrpSpPr>
+      <p:grpSpPr>
+        <a:xfrm>
+          <a:off x="0" y="0"/>
+          <a:ext cx="0" cy="0"/>
+          <a:chOff x="0" y="0"/>
+          <a:chExt cx="0" cy="0"/>
+        </a:xfrm>
+      </p:grpSpPr>
+      <p:sp>
+        <p:nvSpPr>
+          <p:cNvPr id="3" name="Title 2">
+            <a:extLst>
+              <a:ext uri="{FF2B5EF4-FFF2-40B4-BE49-F238E27FC236}">
+                <a16:creationId xmlns:a16="http://schemas.microsoft.com/office/drawing/2014/main" id="{63A80900-A24C-9A9E-DF77-29C62170D7BF}"/>
+              </a:ext>
+            </a:extLst>
+          </p:cNvPr>
+          <p:cNvSpPr>
+            <a:spLocks noGrp="1"/>
+          </p:cNvSpPr>
+          <p:nvPr>
+            <p:ph type="title"/>
+          </p:nvPr>
+        </p:nvSpPr>
+        <p:spPr>
+          <a:xfrm>
+            <a:off x="445713" y="1517515"/>
+            <a:ext cx="11300573" cy="2779921"/>
+          </a:xfrm>
+        </p:spPr>
+        <p:txBody>
+          <a:bodyPr/>
+          <a:lstStyle/>
+          <a:p>
+            <a:pPr algn="ctr"/>
+            <a:r>
+              <a:rPr lang="en-US" sz="3600" dirty="0"/>
+              <a:t>Approaching an ideal calibration:</a:t>
+            </a:r>
+            <a:br>
+              <a:rPr lang="en-US" sz="3600" dirty="0"/>
+            </a:br>
+            <a:r>
+              <a:rPr lang="en-US" sz="3600" dirty="0"/>
+              <a:t>Solution @1GHz</a:t>
+            </a:r>
+          </a:p>
+        </p:txBody>
+      </p:sp>
+    </p:spTree>
+    <p:extLst>
+      <p:ext uri="{BB962C8B-B14F-4D97-AF65-F5344CB8AC3E}">
+        <p14:creationId xmlns:p14="http://schemas.microsoft.com/office/powerpoint/2010/main" val="1365098250"/>
+      </p:ext>
+    </p:extLst>
+  </p:cSld>
+  <p:clrMapOvr>
+    <a:masterClrMapping/>
+  </p:clrMapOvr>
+</p:sld>
+</file>
+
+<file path=ppt/slides/slide32.xml><?xml version="1.0" encoding="utf-8"?>
+<p:sld xmlns:a="http://schemas.openxmlformats.org/drawingml/2006/main" xmlns:r="http://schemas.openxmlformats.org/officeDocument/2006/relationships" xmlns:p="http://schemas.openxmlformats.org/presentationml/2006/main">
+  <p:cSld>
+    <p:spTree>
+      <p:nvGrpSpPr>
+        <p:cNvPr id="1" name="">
+          <a:extLst>
+            <a:ext uri="{FF2B5EF4-FFF2-40B4-BE49-F238E27FC236}">
+              <a16:creationId xmlns:a16="http://schemas.microsoft.com/office/drawing/2014/main" id="{822CC2EF-F23B-8722-7892-6210542A9D8E}"/>
+            </a:ext>
+          </a:extLst>
+        </p:cNvPr>
+        <p:cNvGrpSpPr/>
+        <p:nvPr/>
+      </p:nvGrpSpPr>
+      <p:grpSpPr>
+        <a:xfrm>
+          <a:off x="0" y="0"/>
+          <a:ext cx="0" cy="0"/>
+          <a:chOff x="0" y="0"/>
+          <a:chExt cx="0" cy="0"/>
+        </a:xfrm>
+      </p:grpSpPr>
+      <p:pic>
+        <p:nvPicPr>
+          <p:cNvPr id="7" name="Picture 6" descr="A graph with lines and numbers&#10;&#10;AI-generated content may be incorrect.">
+            <a:extLst>
+              <a:ext uri="{FF2B5EF4-FFF2-40B4-BE49-F238E27FC236}">
+                <a16:creationId xmlns:a16="http://schemas.microsoft.com/office/drawing/2014/main" id="{79698191-EE5E-75E3-7154-4424A66E4159}"/>
+              </a:ext>
+            </a:extLst>
+          </p:cNvPr>
+          <p:cNvPicPr>
+            <a:picLocks noChangeAspect="1"/>
+          </p:cNvPicPr>
+          <p:nvPr/>
+        </p:nvPicPr>
+        <p:blipFill>
+          <a:blip r:embed="rId2">
+            <a:extLst>
+              <a:ext uri="{28A0092B-C50C-407E-A947-70E740481C1C}">
+                <a14:useLocalDpi xmlns:a14="http://schemas.microsoft.com/office/drawing/2010/main" val="0"/>
+              </a:ext>
+            </a:extLst>
+          </a:blip>
+          <a:stretch>
+            <a:fillRect/>
+          </a:stretch>
+        </p:blipFill>
+        <p:spPr>
+          <a:xfrm>
+            <a:off x="336000" y="1629723"/>
+            <a:ext cx="11520000" cy="5039557"/>
+          </a:xfrm>
+          <a:prstGeom prst="rect">
+            <a:avLst/>
+          </a:prstGeom>
+        </p:spPr>
+      </p:pic>
+      <p:sp>
+        <p:nvSpPr>
+          <p:cNvPr id="3" name="Title 2">
+            <a:extLst>
+              <a:ext uri="{FF2B5EF4-FFF2-40B4-BE49-F238E27FC236}">
+                <a16:creationId xmlns:a16="http://schemas.microsoft.com/office/drawing/2014/main" id="{6F4061E4-6C5C-2668-12A9-C58057206581}"/>
+              </a:ext>
+            </a:extLst>
+          </p:cNvPr>
+          <p:cNvSpPr>
+            <a:spLocks noGrp="1"/>
+          </p:cNvSpPr>
+          <p:nvPr>
+            <p:ph type="title"/>
+          </p:nvPr>
+        </p:nvSpPr>
+        <p:spPr/>
+        <p:txBody>
+          <a:bodyPr/>
+          <a:lstStyle/>
+          <a:p>
+            <a:r>
+              <a:rPr lang="en-US" dirty="0"/>
+              <a:t>Approaching an ideal calibration – Solution @1GHz</a:t>
+            </a:r>
+            <a:endParaRPr lang="tr-TR" dirty="0"/>
+          </a:p>
+        </p:txBody>
+      </p:sp>
+      <p:sp>
+        <p:nvSpPr>
+          <p:cNvPr id="4" name="Footer Placeholder 3">
+            <a:extLst>
+              <a:ext uri="{FF2B5EF4-FFF2-40B4-BE49-F238E27FC236}">
+                <a16:creationId xmlns:a16="http://schemas.microsoft.com/office/drawing/2014/main" id="{007FCF4A-F31A-553B-9CD2-FCCDE49D4135}"/>
+              </a:ext>
+            </a:extLst>
+          </p:cNvPr>
+          <p:cNvSpPr>
+            <a:spLocks noGrp="1"/>
+          </p:cNvSpPr>
+          <p:nvPr>
+            <p:ph type="ftr" sz="quarter" idx="15"/>
+          </p:nvPr>
+        </p:nvSpPr>
+        <p:spPr/>
+        <p:txBody>
+          <a:bodyPr/>
+          <a:lstStyle/>
+          <a:p>
+            <a:endParaRPr lang="en-US"/>
+          </a:p>
+        </p:txBody>
+      </p:sp>
+      <p:sp>
+        <p:nvSpPr>
+          <p:cNvPr id="5" name="Slide Number Placeholder 4">
+            <a:extLst>
+              <a:ext uri="{FF2B5EF4-FFF2-40B4-BE49-F238E27FC236}">
+                <a16:creationId xmlns:a16="http://schemas.microsoft.com/office/drawing/2014/main" id="{E7DC657E-931B-E9FD-548A-DCB839A34BD6}"/>
+              </a:ext>
+            </a:extLst>
+          </p:cNvPr>
+          <p:cNvSpPr>
+            <a:spLocks noGrp="1"/>
+          </p:cNvSpPr>
+          <p:nvPr>
+            <p:ph type="sldNum" sz="quarter" idx="16"/>
+          </p:nvPr>
+        </p:nvSpPr>
+        <p:spPr/>
+        <p:txBody>
+          <a:bodyPr/>
+          <a:lstStyle/>
+          <a:p>
+            <a:r>
+              <a:rPr lang="en-US"/>
+              <a:t> </a:t>
+            </a:r>
+          </a:p>
+        </p:txBody>
+      </p:sp>
+      <p:sp>
+        <p:nvSpPr>
+          <p:cNvPr id="6" name="Content Placeholder 5">
+            <a:extLst>
+              <a:ext uri="{FF2B5EF4-FFF2-40B4-BE49-F238E27FC236}">
+                <a16:creationId xmlns:a16="http://schemas.microsoft.com/office/drawing/2014/main" id="{624EA7DA-29A3-AEB1-DE94-2CA5DF9CC485}"/>
+              </a:ext>
+            </a:extLst>
+          </p:cNvPr>
+          <p:cNvSpPr>
+            <a:spLocks noGrp="1"/>
+          </p:cNvSpPr>
+          <p:nvPr>
+            <p:ph sz="quarter" idx="13"/>
+          </p:nvPr>
+        </p:nvSpPr>
+        <p:spPr/>
+        <p:txBody>
+          <a:bodyPr/>
+          <a:lstStyle/>
+          <a:p>
+            <a:r>
+              <a:rPr lang="en-US" dirty="0"/>
+              <a:t>Input Voltage Waveform @1GHz </a:t>
+            </a:r>
+            <a:r>
+              <a:rPr lang="en-US" i="1" dirty="0"/>
+              <a:t>(#ofHarmonics = 64)</a:t>
+            </a:r>
+            <a:endParaRPr lang="tr-TR" i="1" dirty="0"/>
+          </a:p>
+        </p:txBody>
+      </p:sp>
+    </p:spTree>
+    <p:extLst>
+      <p:ext uri="{BB962C8B-B14F-4D97-AF65-F5344CB8AC3E}">
+        <p14:creationId xmlns:p14="http://schemas.microsoft.com/office/powerpoint/2010/main" val="2234196968"/>
+      </p:ext>
+    </p:extLst>
+  </p:cSld>
+  <p:clrMapOvr>
+    <a:masterClrMapping/>
+  </p:clrMapOvr>
+</p:sld>
+</file>
+
+<file path=ppt/slides/slide33.xml><?xml version="1.0" encoding="utf-8"?>
+<p:sld xmlns:a="http://schemas.openxmlformats.org/drawingml/2006/main" xmlns:r="http://schemas.openxmlformats.org/officeDocument/2006/relationships" xmlns:p="http://schemas.openxmlformats.org/presentationml/2006/main">
+  <p:cSld>
+    <p:spTree>
+      <p:nvGrpSpPr>
+        <p:cNvPr id="1" name="">
+          <a:extLst>
+            <a:ext uri="{FF2B5EF4-FFF2-40B4-BE49-F238E27FC236}">
+              <a16:creationId xmlns:a16="http://schemas.microsoft.com/office/drawing/2014/main" id="{B73C8680-1815-FE3E-EF63-9822E7128E6E}"/>
+            </a:ext>
+          </a:extLst>
+        </p:cNvPr>
+        <p:cNvGrpSpPr/>
+        <p:nvPr/>
+      </p:nvGrpSpPr>
+      <p:grpSpPr>
+        <a:xfrm>
+          <a:off x="0" y="0"/>
+          <a:ext cx="0" cy="0"/>
+          <a:chOff x="0" y="0"/>
+          <a:chExt cx="0" cy="0"/>
+        </a:xfrm>
+      </p:grpSpPr>
+      <p:sp>
+        <p:nvSpPr>
+          <p:cNvPr id="3" name="Title 2">
+            <a:extLst>
+              <a:ext uri="{FF2B5EF4-FFF2-40B4-BE49-F238E27FC236}">
+                <a16:creationId xmlns:a16="http://schemas.microsoft.com/office/drawing/2014/main" id="{5B5BF146-C697-D588-A657-255C69EF0871}"/>
+              </a:ext>
+            </a:extLst>
+          </p:cNvPr>
+          <p:cNvSpPr>
+            <a:spLocks noGrp="1"/>
+          </p:cNvSpPr>
+          <p:nvPr>
+            <p:ph type="title"/>
+          </p:nvPr>
+        </p:nvSpPr>
+        <p:spPr/>
+        <p:txBody>
+          <a:bodyPr/>
+          <a:lstStyle/>
+          <a:p>
+            <a:r>
+              <a:rPr lang="en-US" dirty="0"/>
+              <a:t>Approaching an ideal calibration – Solution @1GHz</a:t>
+            </a:r>
+            <a:endParaRPr lang="tr-TR" dirty="0"/>
+          </a:p>
+        </p:txBody>
+      </p:sp>
+      <p:sp>
+        <p:nvSpPr>
+          <p:cNvPr id="4" name="Footer Placeholder 3">
+            <a:extLst>
+              <a:ext uri="{FF2B5EF4-FFF2-40B4-BE49-F238E27FC236}">
+                <a16:creationId xmlns:a16="http://schemas.microsoft.com/office/drawing/2014/main" id="{A38D4892-F5DE-83A7-F1D7-126EAB03BB65}"/>
+              </a:ext>
+            </a:extLst>
+          </p:cNvPr>
+          <p:cNvSpPr>
+            <a:spLocks noGrp="1"/>
+          </p:cNvSpPr>
+          <p:nvPr>
+            <p:ph type="ftr" sz="quarter" idx="15"/>
+          </p:nvPr>
+        </p:nvSpPr>
+        <p:spPr/>
+        <p:txBody>
+          <a:bodyPr/>
+          <a:lstStyle/>
+          <a:p>
+            <a:endParaRPr lang="en-US"/>
+          </a:p>
+        </p:txBody>
+      </p:sp>
+      <p:sp>
+        <p:nvSpPr>
+          <p:cNvPr id="5" name="Slide Number Placeholder 4">
+            <a:extLst>
+              <a:ext uri="{FF2B5EF4-FFF2-40B4-BE49-F238E27FC236}">
+                <a16:creationId xmlns:a16="http://schemas.microsoft.com/office/drawing/2014/main" id="{1605FB86-F188-B68C-5A96-43A72EB16982}"/>
+              </a:ext>
+            </a:extLst>
+          </p:cNvPr>
+          <p:cNvSpPr>
+            <a:spLocks noGrp="1"/>
+          </p:cNvSpPr>
+          <p:nvPr>
+            <p:ph type="sldNum" sz="quarter" idx="16"/>
+          </p:nvPr>
+        </p:nvSpPr>
+        <p:spPr/>
+        <p:txBody>
+          <a:bodyPr/>
+          <a:lstStyle/>
+          <a:p>
+            <a:r>
+              <a:rPr lang="en-US"/>
+              <a:t> </a:t>
+            </a:r>
+          </a:p>
+        </p:txBody>
+      </p:sp>
+      <p:sp>
+        <p:nvSpPr>
+          <p:cNvPr id="6" name="Content Placeholder 5">
+            <a:extLst>
+              <a:ext uri="{FF2B5EF4-FFF2-40B4-BE49-F238E27FC236}">
+                <a16:creationId xmlns:a16="http://schemas.microsoft.com/office/drawing/2014/main" id="{CD579FEF-ACAB-6B47-DF34-2C57BED3DB47}"/>
+              </a:ext>
+            </a:extLst>
+          </p:cNvPr>
+          <p:cNvSpPr>
+            <a:spLocks noGrp="1"/>
+          </p:cNvSpPr>
+          <p:nvPr>
+            <p:ph sz="quarter" idx="13"/>
+          </p:nvPr>
+        </p:nvSpPr>
+        <p:spPr/>
+        <p:txBody>
+          <a:bodyPr/>
+          <a:lstStyle/>
+          <a:p>
+            <a:r>
+              <a:rPr lang="en-US" dirty="0"/>
+              <a:t>Calibrated Voltage Waveform @1GHz</a:t>
+            </a:r>
+            <a:endParaRPr lang="tr-TR" dirty="0"/>
+          </a:p>
+        </p:txBody>
+      </p:sp>
+      <p:pic>
+        <p:nvPicPr>
+          <p:cNvPr id="8" name="Picture 7" descr="A graph of a graph&#10;&#10;AI-generated content may be incorrect.">
+            <a:extLst>
+              <a:ext uri="{FF2B5EF4-FFF2-40B4-BE49-F238E27FC236}">
+                <a16:creationId xmlns:a16="http://schemas.microsoft.com/office/drawing/2014/main" id="{7EBA618D-BB6A-4026-C897-75C6911D2886}"/>
+              </a:ext>
+            </a:extLst>
+          </p:cNvPr>
+          <p:cNvPicPr>
+            <a:picLocks noChangeAspect="1"/>
+          </p:cNvPicPr>
+          <p:nvPr/>
+        </p:nvPicPr>
+        <p:blipFill>
+          <a:blip r:embed="rId2">
+            <a:extLst>
+              <a:ext uri="{28A0092B-C50C-407E-A947-70E740481C1C}">
+                <a14:useLocalDpi xmlns:a14="http://schemas.microsoft.com/office/drawing/2010/main" val="0"/>
+              </a:ext>
+            </a:extLst>
+          </a:blip>
+          <a:stretch>
+            <a:fillRect/>
+          </a:stretch>
+        </p:blipFill>
+        <p:spPr>
+          <a:xfrm>
+            <a:off x="470591" y="1704919"/>
+            <a:ext cx="11248417" cy="4855683"/>
+          </a:xfrm>
+          <a:prstGeom prst="rect">
+            <a:avLst/>
+          </a:prstGeom>
+        </p:spPr>
+      </p:pic>
+    </p:spTree>
+    <p:extLst>
+      <p:ext uri="{BB962C8B-B14F-4D97-AF65-F5344CB8AC3E}">
+        <p14:creationId xmlns:p14="http://schemas.microsoft.com/office/powerpoint/2010/main" val="669135031"/>
+      </p:ext>
+    </p:extLst>
+  </p:cSld>
+  <p:clrMapOvr>
+    <a:masterClrMapping/>
+  </p:clrMapOvr>
+</p:sld>
+</file>
+
+<file path=ppt/slides/slide34.xml><?xml version="1.0" encoding="utf-8"?>
+<p:sld xmlns:a="http://schemas.openxmlformats.org/drawingml/2006/main" xmlns:r="http://schemas.openxmlformats.org/officeDocument/2006/relationships" xmlns:p="http://schemas.openxmlformats.org/presentationml/2006/main">
+  <p:cSld>
+    <p:spTree>
+      <p:nvGrpSpPr>
+        <p:cNvPr id="1" name="">
+          <a:extLst>
+            <a:ext uri="{FF2B5EF4-FFF2-40B4-BE49-F238E27FC236}">
+              <a16:creationId xmlns:a16="http://schemas.microsoft.com/office/drawing/2014/main" id="{645527D3-E6B1-39F7-5910-5009BFD906F0}"/>
+            </a:ext>
+          </a:extLst>
+        </p:cNvPr>
+        <p:cNvGrpSpPr/>
+        <p:nvPr/>
+      </p:nvGrpSpPr>
+      <p:grpSpPr>
+        <a:xfrm>
+          <a:off x="0" y="0"/>
+          <a:ext cx="0" cy="0"/>
+          <a:chOff x="0" y="0"/>
+          <a:chExt cx="0" cy="0"/>
+        </a:xfrm>
+      </p:grpSpPr>
+      <p:sp>
+        <p:nvSpPr>
+          <p:cNvPr id="3" name="Title 2">
+            <a:extLst>
+              <a:ext uri="{FF2B5EF4-FFF2-40B4-BE49-F238E27FC236}">
+                <a16:creationId xmlns:a16="http://schemas.microsoft.com/office/drawing/2014/main" id="{FA0F3694-1532-6B66-EA5A-170D70A2802D}"/>
+              </a:ext>
+            </a:extLst>
+          </p:cNvPr>
+          <p:cNvSpPr>
+            <a:spLocks noGrp="1"/>
+          </p:cNvSpPr>
+          <p:nvPr>
+            <p:ph type="title"/>
+          </p:nvPr>
+        </p:nvSpPr>
+        <p:spPr>
+          <a:xfrm>
+            <a:off x="445713" y="1517515"/>
+            <a:ext cx="11300573" cy="2779921"/>
+          </a:xfrm>
+        </p:spPr>
+        <p:txBody>
+          <a:bodyPr/>
+          <a:lstStyle/>
+          <a:p>
+            <a:pPr algn="ctr"/>
+            <a:r>
+              <a:rPr lang="en-US" sz="3600" dirty="0"/>
+              <a:t>Approaching an ideal calibration:</a:t>
+            </a:r>
+            <a:br>
+              <a:rPr lang="en-US" sz="3600" dirty="0"/>
+            </a:br>
+            <a:r>
+              <a:rPr lang="en-US" sz="3600" dirty="0"/>
+              <a:t>Problem @2GHz</a:t>
+            </a:r>
+          </a:p>
+        </p:txBody>
+      </p:sp>
+    </p:spTree>
+    <p:extLst>
+      <p:ext uri="{BB962C8B-B14F-4D97-AF65-F5344CB8AC3E}">
+        <p14:creationId xmlns:p14="http://schemas.microsoft.com/office/powerpoint/2010/main" val="3011533954"/>
+      </p:ext>
+    </p:extLst>
+  </p:cSld>
+  <p:clrMapOvr>
+    <a:masterClrMapping/>
+  </p:clrMapOvr>
+</p:sld>
+</file>
+
+<file path=ppt/slides/slide35.xml><?xml version="1.0" encoding="utf-8"?>
+<p:sld xmlns:a="http://schemas.openxmlformats.org/drawingml/2006/main" xmlns:r="http://schemas.openxmlformats.org/officeDocument/2006/relationships" xmlns:p="http://schemas.openxmlformats.org/presentationml/2006/main">
+  <p:cSld>
+    <p:spTree>
+      <p:nvGrpSpPr>
+        <p:cNvPr id="1" name="">
+          <a:extLst>
+            <a:ext uri="{FF2B5EF4-FFF2-40B4-BE49-F238E27FC236}">
+              <a16:creationId xmlns:a16="http://schemas.microsoft.com/office/drawing/2014/main" id="{B03E4A76-3074-138A-C70B-AD05812F21AE}"/>
+            </a:ext>
+          </a:extLst>
+        </p:cNvPr>
+        <p:cNvGrpSpPr/>
+        <p:nvPr/>
+      </p:nvGrpSpPr>
+      <p:grpSpPr>
+        <a:xfrm>
+          <a:off x="0" y="0"/>
+          <a:ext cx="0" cy="0"/>
+          <a:chOff x="0" y="0"/>
+          <a:chExt cx="0" cy="0"/>
+        </a:xfrm>
+      </p:grpSpPr>
+      <p:sp>
+        <p:nvSpPr>
+          <p:cNvPr id="3" name="Title 2">
+            <a:extLst>
+              <a:ext uri="{FF2B5EF4-FFF2-40B4-BE49-F238E27FC236}">
+                <a16:creationId xmlns:a16="http://schemas.microsoft.com/office/drawing/2014/main" id="{960D16DB-7485-344F-99CA-1DD55C89D0A6}"/>
+              </a:ext>
+            </a:extLst>
+          </p:cNvPr>
+          <p:cNvSpPr>
+            <a:spLocks noGrp="1"/>
+          </p:cNvSpPr>
+          <p:nvPr>
+            <p:ph type="title"/>
+          </p:nvPr>
+        </p:nvSpPr>
+        <p:spPr/>
+        <p:txBody>
+          <a:bodyPr/>
+          <a:lstStyle/>
+          <a:p>
+            <a:r>
+              <a:rPr lang="en-US" dirty="0"/>
+              <a:t>Approaching an ideal calibration – Problem @2GHz</a:t>
+            </a:r>
+            <a:endParaRPr lang="tr-TR" dirty="0"/>
+          </a:p>
+        </p:txBody>
+      </p:sp>
+      <p:sp>
+        <p:nvSpPr>
+          <p:cNvPr id="4" name="Footer Placeholder 3">
+            <a:extLst>
+              <a:ext uri="{FF2B5EF4-FFF2-40B4-BE49-F238E27FC236}">
+                <a16:creationId xmlns:a16="http://schemas.microsoft.com/office/drawing/2014/main" id="{E6F9CDB8-B551-F8E7-E594-EE2D1B439414}"/>
+              </a:ext>
+            </a:extLst>
+          </p:cNvPr>
+          <p:cNvSpPr>
+            <a:spLocks noGrp="1"/>
+          </p:cNvSpPr>
+          <p:nvPr>
+            <p:ph type="ftr" sz="quarter" idx="15"/>
+          </p:nvPr>
+        </p:nvSpPr>
+        <p:spPr/>
+        <p:txBody>
+          <a:bodyPr/>
+          <a:lstStyle/>
+          <a:p>
+            <a:endParaRPr lang="en-US"/>
+          </a:p>
+        </p:txBody>
+      </p:sp>
+      <p:sp>
+        <p:nvSpPr>
+          <p:cNvPr id="5" name="Slide Number Placeholder 4">
+            <a:extLst>
+              <a:ext uri="{FF2B5EF4-FFF2-40B4-BE49-F238E27FC236}">
+                <a16:creationId xmlns:a16="http://schemas.microsoft.com/office/drawing/2014/main" id="{F02EFD14-0BBF-2957-F862-86DC58FCF55B}"/>
+              </a:ext>
+            </a:extLst>
+          </p:cNvPr>
+          <p:cNvSpPr>
+            <a:spLocks noGrp="1"/>
+          </p:cNvSpPr>
+          <p:nvPr>
+            <p:ph type="sldNum" sz="quarter" idx="16"/>
+          </p:nvPr>
+        </p:nvSpPr>
+        <p:spPr/>
+        <p:txBody>
+          <a:bodyPr/>
+          <a:lstStyle/>
+          <a:p>
+            <a:r>
+              <a:rPr lang="en-US"/>
+              <a:t> </a:t>
+            </a:r>
+          </a:p>
+        </p:txBody>
+      </p:sp>
+      <p:sp>
+        <p:nvSpPr>
+          <p:cNvPr id="6" name="Content Placeholder 5">
+            <a:extLst>
+              <a:ext uri="{FF2B5EF4-FFF2-40B4-BE49-F238E27FC236}">
+                <a16:creationId xmlns:a16="http://schemas.microsoft.com/office/drawing/2014/main" id="{4AFA7858-19EA-D41C-1CCA-E2F797BB32B2}"/>
+              </a:ext>
+            </a:extLst>
+          </p:cNvPr>
+          <p:cNvSpPr>
+            <a:spLocks noGrp="1"/>
+          </p:cNvSpPr>
+          <p:nvPr>
+            <p:ph sz="quarter" idx="13"/>
+          </p:nvPr>
+        </p:nvSpPr>
+        <p:spPr/>
+        <p:txBody>
+          <a:bodyPr/>
+          <a:lstStyle/>
+          <a:p>
+            <a:r>
+              <a:rPr lang="en-US" dirty="0"/>
+              <a:t>Input Voltage Waveform @2GHz</a:t>
+            </a:r>
+            <a:endParaRPr lang="tr-TR" dirty="0"/>
+          </a:p>
+        </p:txBody>
+      </p:sp>
+      <p:pic>
+        <p:nvPicPr>
+          <p:cNvPr id="7" name="Picture 6" descr="A graph of a graph&#10;&#10;AI-generated content may be incorrect.">
+            <a:extLst>
+              <a:ext uri="{FF2B5EF4-FFF2-40B4-BE49-F238E27FC236}">
+                <a16:creationId xmlns:a16="http://schemas.microsoft.com/office/drawing/2014/main" id="{D917563D-2C2B-86F3-9F9F-FB0E8C8B8A15}"/>
+              </a:ext>
+            </a:extLst>
+          </p:cNvPr>
+          <p:cNvPicPr>
+            <a:picLocks noChangeAspect="1"/>
+          </p:cNvPicPr>
+          <p:nvPr/>
+        </p:nvPicPr>
+        <p:blipFill>
+          <a:blip r:embed="rId2">
+            <a:extLst>
+              <a:ext uri="{28A0092B-C50C-407E-A947-70E740481C1C}">
+                <a14:useLocalDpi xmlns:a14="http://schemas.microsoft.com/office/drawing/2010/main" val="0"/>
+              </a:ext>
+            </a:extLst>
+          </a:blip>
+          <a:stretch>
+            <a:fillRect/>
+          </a:stretch>
+        </p:blipFill>
+        <p:spPr>
+          <a:xfrm>
+            <a:off x="334800" y="1746324"/>
+            <a:ext cx="11520000" cy="4922956"/>
+          </a:xfrm>
+          <a:prstGeom prst="rect">
+            <a:avLst/>
+          </a:prstGeom>
+        </p:spPr>
+      </p:pic>
+      <p:cxnSp>
+        <p:nvCxnSpPr>
+          <p:cNvPr id="10" name="Straight Arrow Connector 9">
+            <a:extLst>
+              <a:ext uri="{FF2B5EF4-FFF2-40B4-BE49-F238E27FC236}">
+                <a16:creationId xmlns:a16="http://schemas.microsoft.com/office/drawing/2014/main" id="{85A5EFFA-F6AC-A5EB-882C-FE7724E27B82}"/>
+              </a:ext>
+            </a:extLst>
+          </p:cNvPr>
+          <p:cNvCxnSpPr>
+            <a:cxnSpLocks/>
+          </p:cNvCxnSpPr>
+          <p:nvPr/>
+        </p:nvCxnSpPr>
+        <p:spPr>
+          <a:xfrm>
+            <a:off x="8966681" y="3908753"/>
+            <a:ext cx="2122851" cy="598097"/>
+          </a:xfrm>
+          <a:prstGeom prst="straightConnector1">
+            <a:avLst/>
+          </a:prstGeom>
+          <a:ln w="76200">
+            <a:solidFill>
+              <a:srgbClr val="FF0000"/>
+            </a:solidFill>
+            <a:tailEnd type="triangle"/>
+          </a:ln>
+        </p:spPr>
+        <p:style>
+          <a:lnRef idx="1">
+            <a:schemeClr val="accent1"/>
+          </a:lnRef>
+          <a:fillRef idx="0">
+            <a:schemeClr val="accent1"/>
+          </a:fillRef>
+          <a:effectRef idx="0">
+            <a:schemeClr val="accent1"/>
+          </a:effectRef>
+          <a:fontRef idx="minor">
+            <a:schemeClr val="tx1"/>
+          </a:fontRef>
+        </p:style>
+      </p:cxnSp>
+    </p:spTree>
+    <p:extLst>
+      <p:ext uri="{BB962C8B-B14F-4D97-AF65-F5344CB8AC3E}">
+        <p14:creationId xmlns:p14="http://schemas.microsoft.com/office/powerpoint/2010/main" val="1388860611"/>
+      </p:ext>
+    </p:extLst>
+  </p:cSld>
+  <p:clrMapOvr>
+    <a:masterClrMapping/>
+  </p:clrMapOvr>
+</p:sld>
+</file>
+
+<file path=ppt/slides/slide36.xml><?xml version="1.0" encoding="utf-8"?>
+<p:sld xmlns:a="http://schemas.openxmlformats.org/drawingml/2006/main" xmlns:r="http://schemas.openxmlformats.org/officeDocument/2006/relationships" xmlns:p="http://schemas.openxmlformats.org/presentationml/2006/main">
+  <p:cSld>
+    <p:spTree>
+      <p:nvGrpSpPr>
+        <p:cNvPr id="1" name="">
+          <a:extLst>
+            <a:ext uri="{FF2B5EF4-FFF2-40B4-BE49-F238E27FC236}">
+              <a16:creationId xmlns:a16="http://schemas.microsoft.com/office/drawing/2014/main" id="{07DC1060-EAC9-4BAF-DDBF-49F03AA91252}"/>
+            </a:ext>
+          </a:extLst>
+        </p:cNvPr>
+        <p:cNvGrpSpPr/>
+        <p:nvPr/>
+      </p:nvGrpSpPr>
+      <p:grpSpPr>
+        <a:xfrm>
+          <a:off x="0" y="0"/>
+          <a:ext cx="0" cy="0"/>
+          <a:chOff x="0" y="0"/>
+          <a:chExt cx="0" cy="0"/>
+        </a:xfrm>
+      </p:grpSpPr>
+      <p:sp>
+        <p:nvSpPr>
+          <p:cNvPr id="3" name="Title 2">
+            <a:extLst>
+              <a:ext uri="{FF2B5EF4-FFF2-40B4-BE49-F238E27FC236}">
+                <a16:creationId xmlns:a16="http://schemas.microsoft.com/office/drawing/2014/main" id="{FEBD8611-DB6F-B45E-47B6-36A49E68329D}"/>
+              </a:ext>
+            </a:extLst>
+          </p:cNvPr>
+          <p:cNvSpPr>
+            <a:spLocks noGrp="1"/>
+          </p:cNvSpPr>
+          <p:nvPr>
+            <p:ph type="title"/>
+          </p:nvPr>
+        </p:nvSpPr>
+        <p:spPr>
+          <a:xfrm>
+            <a:off x="445713" y="1517515"/>
+            <a:ext cx="11300573" cy="2779921"/>
+          </a:xfrm>
+        </p:spPr>
+        <p:txBody>
+          <a:bodyPr/>
+          <a:lstStyle/>
+          <a:p>
+            <a:pPr algn="ctr"/>
+            <a:br>
+              <a:rPr lang="en-US" sz="3600" dirty="0"/>
+            </a:br>
+            <a:r>
+              <a:rPr lang="en-US" sz="3600" dirty="0"/>
+              <a:t>Plans for the next weeks</a:t>
+            </a:r>
+          </a:p>
+        </p:txBody>
+      </p:sp>
+    </p:spTree>
+    <p:extLst>
+      <p:ext uri="{BB962C8B-B14F-4D97-AF65-F5344CB8AC3E}">
+        <p14:creationId xmlns:p14="http://schemas.microsoft.com/office/powerpoint/2010/main" val="2276428960"/>
+      </p:ext>
+    </p:extLst>
+  </p:cSld>
+  <p:clrMapOvr>
+    <a:masterClrMapping/>
+  </p:clrMapOvr>
+</p:sld>
+</file>
+
+<file path=ppt/slides/slide37.xml><?xml version="1.0" encoding="utf-8"?>
+<p:sld xmlns:a="http://schemas.openxmlformats.org/drawingml/2006/main" xmlns:r="http://schemas.openxmlformats.org/officeDocument/2006/relationships" xmlns:p="http://schemas.openxmlformats.org/presentationml/2006/main">
+  <p:cSld>
+    <p:spTree>
+      <p:nvGrpSpPr>
+        <p:cNvPr id="1" name="">
+          <a:extLst>
+            <a:ext uri="{FF2B5EF4-FFF2-40B4-BE49-F238E27FC236}">
+              <a16:creationId xmlns:a16="http://schemas.microsoft.com/office/drawing/2014/main" id="{680F7869-6885-4764-BC2A-EEA50D472907}"/>
+            </a:ext>
+          </a:extLst>
+        </p:cNvPr>
+        <p:cNvGrpSpPr/>
+        <p:nvPr/>
+      </p:nvGrpSpPr>
+      <p:grpSpPr>
+        <a:xfrm>
+          <a:off x="0" y="0"/>
+          <a:ext cx="0" cy="0"/>
+          <a:chOff x="0" y="0"/>
+          <a:chExt cx="0" cy="0"/>
+        </a:xfrm>
+      </p:grpSpPr>
+      <p:sp>
+        <p:nvSpPr>
+          <p:cNvPr id="3" name="Title 2">
+            <a:extLst>
+              <a:ext uri="{FF2B5EF4-FFF2-40B4-BE49-F238E27FC236}">
+                <a16:creationId xmlns:a16="http://schemas.microsoft.com/office/drawing/2014/main" id="{2ADA1D37-2629-ED52-7026-F9A080B825C4}"/>
+              </a:ext>
+            </a:extLst>
+          </p:cNvPr>
+          <p:cNvSpPr>
+            <a:spLocks noGrp="1"/>
+          </p:cNvSpPr>
+          <p:nvPr>
+            <p:ph type="title"/>
+          </p:nvPr>
+        </p:nvSpPr>
+        <p:spPr/>
+        <p:txBody>
+          <a:bodyPr/>
+          <a:lstStyle/>
+          <a:p>
+            <a:pPr>
+              <a:lnSpc>
+                <a:spcPct val="250000"/>
+              </a:lnSpc>
+            </a:pPr>
+            <a:r>
+              <a:rPr lang="en-US" dirty="0"/>
+              <a:t>Plans for the next weeks </a:t>
+            </a:r>
+          </a:p>
+        </p:txBody>
+      </p:sp>
+      <p:sp>
+        <p:nvSpPr>
+          <p:cNvPr id="4" name="Footer Placeholder 3">
+            <a:extLst>
+              <a:ext uri="{FF2B5EF4-FFF2-40B4-BE49-F238E27FC236}">
+                <a16:creationId xmlns:a16="http://schemas.microsoft.com/office/drawing/2014/main" id="{B05EA2D6-AA58-9CF6-4C00-B074DB58E102}"/>
+              </a:ext>
+            </a:extLst>
+          </p:cNvPr>
+          <p:cNvSpPr>
+            <a:spLocks noGrp="1"/>
+          </p:cNvSpPr>
+          <p:nvPr>
+            <p:ph type="ftr" sz="quarter" idx="15"/>
+          </p:nvPr>
+        </p:nvSpPr>
+        <p:spPr/>
+        <p:txBody>
+          <a:bodyPr/>
+          <a:lstStyle/>
+          <a:p>
+            <a:endParaRPr lang="en-US"/>
+          </a:p>
+        </p:txBody>
+      </p:sp>
+      <p:sp>
+        <p:nvSpPr>
+          <p:cNvPr id="5" name="Slide Number Placeholder 4">
+            <a:extLst>
+              <a:ext uri="{FF2B5EF4-FFF2-40B4-BE49-F238E27FC236}">
+                <a16:creationId xmlns:a16="http://schemas.microsoft.com/office/drawing/2014/main" id="{72BC4D0F-4BE5-27FC-8DCB-2F3CBCC183FE}"/>
+              </a:ext>
+            </a:extLst>
+          </p:cNvPr>
+          <p:cNvSpPr>
+            <a:spLocks noGrp="1"/>
+          </p:cNvSpPr>
+          <p:nvPr>
+            <p:ph type="sldNum" sz="quarter" idx="16"/>
+          </p:nvPr>
+        </p:nvSpPr>
+        <p:spPr/>
+        <p:txBody>
+          <a:bodyPr/>
+          <a:lstStyle/>
+          <a:p>
+            <a:r>
+              <a:rPr lang="en-US"/>
+              <a:t> </a:t>
+            </a:r>
+          </a:p>
+        </p:txBody>
+      </p:sp>
+      <p:sp>
+        <p:nvSpPr>
+          <p:cNvPr id="10" name="Content Placeholder 9">
+            <a:extLst>
+              <a:ext uri="{FF2B5EF4-FFF2-40B4-BE49-F238E27FC236}">
+                <a16:creationId xmlns:a16="http://schemas.microsoft.com/office/drawing/2014/main" id="{4216B05E-B5E4-FF76-7F06-40FA03298148}"/>
+              </a:ext>
+            </a:extLst>
+          </p:cNvPr>
+          <p:cNvSpPr>
+            <a:spLocks noGrp="1"/>
+          </p:cNvSpPr>
+          <p:nvPr>
+            <p:ph sz="quarter" idx="13"/>
+          </p:nvPr>
+        </p:nvSpPr>
+        <p:spPr/>
+        <p:txBody>
+          <a:bodyPr/>
+          <a:lstStyle/>
+          <a:p>
+            <a:r>
+              <a:rPr lang="en-US" dirty="0"/>
+              <a:t>For the next week, determine how many levels of PRBS signal is required to obtain similar coefficients</a:t>
+            </a:r>
+          </a:p>
+          <a:p>
+            <a:r>
+              <a:rPr lang="en-US" dirty="0"/>
+              <a:t>My final exam is on 12</a:t>
+            </a:r>
+            <a:r>
+              <a:rPr lang="en-US" baseline="30000" dirty="0"/>
+              <a:t>th</a:t>
+            </a:r>
+            <a:r>
+              <a:rPr lang="en-US" dirty="0"/>
+              <a:t> September.</a:t>
+            </a:r>
+          </a:p>
+        </p:txBody>
+      </p:sp>
+    </p:spTree>
+    <p:extLst>
+      <p:ext uri="{BB962C8B-B14F-4D97-AF65-F5344CB8AC3E}">
+        <p14:creationId xmlns:p14="http://schemas.microsoft.com/office/powerpoint/2010/main" val="2024187701"/>
+      </p:ext>
+    </p:extLst>
+  </p:cSld>
+  <p:clrMapOvr>
+    <a:masterClrMapping/>
+  </p:clrMapOvr>
+</p:sld>
+</file>
+
+<file path=ppt/slides/slide38.xml><?xml version="1.0" encoding="utf-8"?>
+<p:sld xmlns:a="http://schemas.openxmlformats.org/drawingml/2006/main" xmlns:r="http://schemas.openxmlformats.org/officeDocument/2006/relationships" xmlns:p="http://schemas.openxmlformats.org/presentationml/2006/main">
+  <p:cSld>
+    <p:spTree>
+      <p:nvGrpSpPr>
+        <p:cNvPr id="1" name=""/>
+        <p:cNvGrpSpPr/>
+        <p:nvPr/>
+      </p:nvGrpSpPr>
+      <p:grpSpPr>
+        <a:xfrm>
+          <a:off x="0" y="0"/>
+          <a:ext cx="0" cy="0"/>
+          <a:chOff x="0" y="0"/>
+          <a:chExt cx="0" cy="0"/>
+        </a:xfrm>
+      </p:grpSpPr>
+    </p:spTree>
+    <p:extLst>
+      <p:ext uri="{BB962C8B-B14F-4D97-AF65-F5344CB8AC3E}">
+        <p14:creationId xmlns:p14="http://schemas.microsoft.com/office/powerpoint/2010/main" val="895135860"/>
       </p:ext>
     </p:extLst>
   </p:cSld>
@@ -38345,6 +41270,14 @@
 </file>
 
 <file path=customXml/item1.xml><?xml version="1.0" encoding="utf-8"?>
+<p:properties xmlns:p="http://schemas.microsoft.com/office/2006/metadata/properties" xmlns:xsi="http://www.w3.org/2001/XMLSchema-instance" xmlns:pc="http://schemas.microsoft.com/office/infopath/2007/PartnerControls">
+  <documentManagement>
+    <Ver xmlns="a709603d-609a-478b-a91d-3c5e984c0e79">0</Ver>
+  </documentManagement>
+</p:properties>
+</file>
+
+<file path=customXml/item2.xml><?xml version="1.0" encoding="utf-8"?>
 <ct:contentTypeSchema xmlns:ct="http://schemas.microsoft.com/office/2006/metadata/contentType" xmlns:ma="http://schemas.microsoft.com/office/2006/metadata/properties/metaAttributes" ct:_="" ma:_="" ma:contentTypeName="Document" ma:contentTypeID="0x010100A655AAE9148B404486CBFDD74AD2AA0B" ma:contentTypeVersion="2" ma:contentTypeDescription="Create a new document." ma:contentTypeScope="" ma:versionID="a24cc1775e4f53b56bd6bf310015a115">
   <xsd:schema xmlns:xsd="http://www.w3.org/2001/XMLSchema" xmlns:xs="http://www.w3.org/2001/XMLSchema" xmlns:p="http://schemas.microsoft.com/office/2006/metadata/properties" xmlns:ns2="a709603d-609a-478b-a91d-3c5e984c0e79" xmlns:ns3="6ef45842-284e-44e4-b2db-1749e7948b44" targetNamespace="http://schemas.microsoft.com/office/2006/metadata/properties" ma:root="true" ma:fieldsID="f8923fe8aa0ace7ab58ef4ccc8b43a85" ns2:_="" ns3:_="">
     <xsd:import namespace="a709603d-609a-478b-a91d-3c5e984c0e79"/>
@@ -38495,15 +41428,16 @@
 </ct:contentTypeSchema>
 </file>
 
-<file path=customXml/item2.xml><?xml version="1.0" encoding="utf-8"?>
-<p:properties xmlns:p="http://schemas.microsoft.com/office/2006/metadata/properties" xmlns:xsi="http://www.w3.org/2001/XMLSchema-instance" xmlns:pc="http://schemas.microsoft.com/office/infopath/2007/PartnerControls">
-  <documentManagement>
-    <Ver xmlns="a709603d-609a-478b-a91d-3c5e984c0e79">0</Ver>
-  </documentManagement>
-</p:properties>
+<file path=customXml/item3.xml><?xml version="1.0" encoding="utf-8"?>
+<?mso-contentType ?>
+<FormTemplates xmlns="http://schemas.microsoft.com/sharepoint/v3/contenttype/forms">
+  <Display>DocumentLibraryForm</Display>
+  <Edit>DocumentLibraryForm</Edit>
+  <New>DocumentLibraryForm</New>
+</FormTemplates>
 </file>
 
-<file path=customXml/item3.xml><?xml version="1.0" encoding="utf-8"?>
+<file path=customXml/item4.xml><?xml version="1.0" encoding="utf-8"?>
 <?mso-contentType ?>
 <customXsn xmlns="http://schemas.microsoft.com/office/2006/metadata/customXsn">
   <xsnLocation/>
@@ -38513,16 +41447,24 @@
 </customXsn>
 </file>
 
-<file path=customXml/item4.xml><?xml version="1.0" encoding="utf-8"?>
-<?mso-contentType ?>
-<FormTemplates xmlns="http://schemas.microsoft.com/sharepoint/v3/contenttype/forms">
-  <Display>DocumentLibraryForm</Display>
-  <Edit>DocumentLibraryForm</Edit>
-  <New>DocumentLibraryForm</New>
-</FormTemplates>
+<file path=customXml/itemProps1.xml><?xml version="1.0" encoding="utf-8"?>
+<ds:datastoreItem xmlns:ds="http://schemas.openxmlformats.org/officeDocument/2006/customXml" ds:itemID="{D299A1D5-F553-4264-9022-E0136C61CE27}">
+  <ds:schemaRefs>
+    <ds:schemaRef ds:uri="http://schemas.microsoft.com/office/2006/documentManagement/types"/>
+    <ds:schemaRef ds:uri="a709603d-609a-478b-a91d-3c5e984c0e79"/>
+    <ds:schemaRef ds:uri="http://purl.org/dc/dcmitype/"/>
+    <ds:schemaRef ds:uri="6ef45842-284e-44e4-b2db-1749e7948b44"/>
+    <ds:schemaRef ds:uri="http://purl.org/dc/elements/1.1/"/>
+    <ds:schemaRef ds:uri="http://schemas.microsoft.com/office/infopath/2007/PartnerControls"/>
+    <ds:schemaRef ds:uri="http://purl.org/dc/terms/"/>
+    <ds:schemaRef ds:uri="http://schemas.openxmlformats.org/package/2006/metadata/core-properties"/>
+    <ds:schemaRef ds:uri="http://schemas.microsoft.com/office/2006/metadata/properties"/>
+    <ds:schemaRef ds:uri="http://www.w3.org/XML/1998/namespace"/>
+  </ds:schemaRefs>
+</ds:datastoreItem>
 </file>
 
-<file path=customXml/itemProps1.xml><?xml version="1.0" encoding="utf-8"?>
+<file path=customXml/itemProps2.xml><?xml version="1.0" encoding="utf-8"?>
 <ds:datastoreItem xmlns:ds="http://schemas.openxmlformats.org/officeDocument/2006/customXml" ds:itemID="{AF2014AB-78C2-4F59-9D6E-9572E72F7781}">
   <ds:schemaRefs>
     <ds:schemaRef ds:uri="6ef45842-284e-44e4-b2db-1749e7948b44"/>
@@ -38541,35 +41483,18 @@
 </ds:datastoreItem>
 </file>
 
-<file path=customXml/itemProps2.xml><?xml version="1.0" encoding="utf-8"?>
-<ds:datastoreItem xmlns:ds="http://schemas.openxmlformats.org/officeDocument/2006/customXml" ds:itemID="{D299A1D5-F553-4264-9022-E0136C61CE27}">
+<file path=customXml/itemProps3.xml><?xml version="1.0" encoding="utf-8"?>
+<ds:datastoreItem xmlns:ds="http://schemas.openxmlformats.org/officeDocument/2006/customXml" ds:itemID="{63C6748B-B74E-4BE1-834C-AEBB9BCA18FB}">
   <ds:schemaRefs>
-    <ds:schemaRef ds:uri="http://schemas.microsoft.com/office/2006/documentManagement/types"/>
-    <ds:schemaRef ds:uri="a709603d-609a-478b-a91d-3c5e984c0e79"/>
-    <ds:schemaRef ds:uri="http://purl.org/dc/dcmitype/"/>
-    <ds:schemaRef ds:uri="6ef45842-284e-44e4-b2db-1749e7948b44"/>
-    <ds:schemaRef ds:uri="http://purl.org/dc/elements/1.1/"/>
-    <ds:schemaRef ds:uri="http://schemas.microsoft.com/office/infopath/2007/PartnerControls"/>
-    <ds:schemaRef ds:uri="http://purl.org/dc/terms/"/>
-    <ds:schemaRef ds:uri="http://schemas.openxmlformats.org/package/2006/metadata/core-properties"/>
-    <ds:schemaRef ds:uri="http://schemas.microsoft.com/office/2006/metadata/properties"/>
-    <ds:schemaRef ds:uri="http://www.w3.org/XML/1998/namespace"/>
+    <ds:schemaRef ds:uri="http://schemas.microsoft.com/sharepoint/v3/contenttype/forms"/>
   </ds:schemaRefs>
 </ds:datastoreItem>
 </file>
 
-<file path=customXml/itemProps3.xml><?xml version="1.0" encoding="utf-8"?>
+<file path=customXml/itemProps4.xml><?xml version="1.0" encoding="utf-8"?>
 <ds:datastoreItem xmlns:ds="http://schemas.openxmlformats.org/officeDocument/2006/customXml" ds:itemID="{EC144A13-A380-40B3-9980-61BD11F58D02}">
   <ds:schemaRefs>
     <ds:schemaRef ds:uri="http://schemas.microsoft.com/office/2006/metadata/customXsn"/>
   </ds:schemaRefs>
 </ds:datastoreItem>
-</file>
-
-<file path=customXml/itemProps4.xml><?xml version="1.0" encoding="utf-8"?>
-<ds:datastoreItem xmlns:ds="http://schemas.openxmlformats.org/officeDocument/2006/customXml" ds:itemID="{63C6748B-B74E-4BE1-834C-AEBB9BCA18FB}">
-  <ds:schemaRefs>
-    <ds:schemaRef ds:uri="http://schemas.microsoft.com/sharepoint/v3/contenttype/forms"/>
-  </ds:schemaRefs>
-</ds:datastoreItem>
 </file>
</xml_diff>

<commit_message>
Last check on the 5th presentation
</commit_message>
<xml_diff>
--- a/Presentations/presentation5_4_sep/20250904_bi.pptx
+++ b/Presentations/presentation5_4_sep/20250904_bi.pptx
@@ -3119,6 +3119,117 @@
     </pc:docChg>
   </pc:docChgLst>
   <pc:docChgLst>
+    <pc:chgData name="Luca Ricci" userId="S::10451631@polimi.it::ee5f09d5-0832-4e68-94c9-d8bfd2ad04f0" providerId="AD" clId="Web-{01963A96-2E06-E2CD-1350-082BA7D4CF1B}"/>
+    <pc:docChg chg="modSld">
+      <pc:chgData name="Luca Ricci" userId="S::10451631@polimi.it::ee5f09d5-0832-4e68-94c9-d8bfd2ad04f0" providerId="AD" clId="Web-{01963A96-2E06-E2CD-1350-082BA7D4CF1B}" dt="2024-01-24T10:24:38.882" v="320"/>
+      <pc:docMkLst>
+        <pc:docMk/>
+      </pc:docMkLst>
+      <pc:sldChg chg="addSp delSp modSp modNotes">
+        <pc:chgData name="Luca Ricci" userId="S::10451631@polimi.it::ee5f09d5-0832-4e68-94c9-d8bfd2ad04f0" providerId="AD" clId="Web-{01963A96-2E06-E2CD-1350-082BA7D4CF1B}" dt="2024-01-24T10:24:38.882" v="320"/>
+        <pc:sldMkLst>
+          <pc:docMk/>
+          <pc:sldMk cId="4109715435" sldId="313"/>
+        </pc:sldMkLst>
+        <pc:picChg chg="add del mod">
+          <ac:chgData name="Luca Ricci" userId="S::10451631@polimi.it::ee5f09d5-0832-4e68-94c9-d8bfd2ad04f0" providerId="AD" clId="Web-{01963A96-2E06-E2CD-1350-082BA7D4CF1B}" dt="2024-01-24T10:24:38.882" v="320"/>
+          <ac:picMkLst>
+            <pc:docMk/>
+            <pc:sldMk cId="4109715435" sldId="313"/>
+            <ac:picMk id="5" creationId="{CA4B9B14-FA33-53DB-09E4-CEE578977A56}"/>
+          </ac:picMkLst>
+        </pc:picChg>
+        <pc:picChg chg="del">
+          <ac:chgData name="Luca Ricci" userId="S::10451631@polimi.it::ee5f09d5-0832-4e68-94c9-d8bfd2ad04f0" providerId="AD" clId="Web-{01963A96-2E06-E2CD-1350-082BA7D4CF1B}" dt="2024-01-24T10:21:46.517" v="318"/>
+          <ac:picMkLst>
+            <pc:docMk/>
+            <pc:sldMk cId="4109715435" sldId="313"/>
+            <ac:picMk id="6" creationId="{081E3E13-A1F1-4FF3-9F97-8D0431E79976}"/>
+          </ac:picMkLst>
+        </pc:picChg>
+      </pc:sldChg>
+    </pc:docChg>
+  </pc:docChgLst>
+  <pc:docChgLst>
+    <pc:chgData name="Luca Ricci" userId="S::10451631@polimi.it::ee5f09d5-0832-4e68-94c9-d8bfd2ad04f0" providerId="AD" clId="Web-{B2D310EA-72CF-4690-94EE-78BFEA809EFD}"/>
+    <pc:docChg chg="modSld">
+      <pc:chgData name="Luca Ricci" userId="S::10451631@polimi.it::ee5f09d5-0832-4e68-94c9-d8bfd2ad04f0" providerId="AD" clId="Web-{B2D310EA-72CF-4690-94EE-78BFEA809EFD}" dt="2024-01-23T15:58:01.521" v="949" actId="20577"/>
+      <pc:docMkLst>
+        <pc:docMk/>
+      </pc:docMkLst>
+      <pc:sldChg chg="modSp">
+        <pc:chgData name="Luca Ricci" userId="S::10451631@polimi.it::ee5f09d5-0832-4e68-94c9-d8bfd2ad04f0" providerId="AD" clId="Web-{B2D310EA-72CF-4690-94EE-78BFEA809EFD}" dt="2024-01-23T15:26:33.096" v="66" actId="20577"/>
+        <pc:sldMkLst>
+          <pc:docMk/>
+          <pc:sldMk cId="994454846" sldId="291"/>
+        </pc:sldMkLst>
+        <pc:spChg chg="mod">
+          <ac:chgData name="Luca Ricci" userId="S::10451631@polimi.it::ee5f09d5-0832-4e68-94c9-d8bfd2ad04f0" providerId="AD" clId="Web-{B2D310EA-72CF-4690-94EE-78BFEA809EFD}" dt="2024-01-23T15:26:33.096" v="66" actId="20577"/>
+          <ac:spMkLst>
+            <pc:docMk/>
+            <pc:sldMk cId="994454846" sldId="291"/>
+            <ac:spMk id="9" creationId="{384C8E91-B72A-D715-878D-3115E7D21AE9}"/>
+          </ac:spMkLst>
+        </pc:spChg>
+      </pc:sldChg>
+      <pc:sldChg chg="addSp delSp modSp mod modClrScheme chgLayout">
+        <pc:chgData name="Luca Ricci" userId="S::10451631@polimi.it::ee5f09d5-0832-4e68-94c9-d8bfd2ad04f0" providerId="AD" clId="Web-{B2D310EA-72CF-4690-94EE-78BFEA809EFD}" dt="2024-01-23T15:58:01.521" v="949" actId="20577"/>
+        <pc:sldMkLst>
+          <pc:docMk/>
+          <pc:sldMk cId="4109715435" sldId="313"/>
+        </pc:sldMkLst>
+        <pc:spChg chg="mod ord">
+          <ac:chgData name="Luca Ricci" userId="S::10451631@polimi.it::ee5f09d5-0832-4e68-94c9-d8bfd2ad04f0" providerId="AD" clId="Web-{B2D310EA-72CF-4690-94EE-78BFEA809EFD}" dt="2024-01-23T15:41:51.589" v="722" actId="20577"/>
+          <ac:spMkLst>
+            <pc:docMk/>
+            <pc:sldMk cId="4109715435" sldId="313"/>
+            <ac:spMk id="2" creationId="{2764E89C-42F0-7F7D-800A-DA392F66BC91}"/>
+          </ac:spMkLst>
+        </pc:spChg>
+        <pc:spChg chg="mod ord">
+          <ac:chgData name="Luca Ricci" userId="S::10451631@polimi.it::ee5f09d5-0832-4e68-94c9-d8bfd2ad04f0" providerId="AD" clId="Web-{B2D310EA-72CF-4690-94EE-78BFEA809EFD}" dt="2024-01-23T15:29:45.773" v="89"/>
+          <ac:spMkLst>
+            <pc:docMk/>
+            <pc:sldMk cId="4109715435" sldId="313"/>
+            <ac:spMk id="3" creationId="{937AAAB0-FB21-FB0E-A628-9C20C23B6347}"/>
+          </ac:spMkLst>
+        </pc:spChg>
+        <pc:spChg chg="mod ord">
+          <ac:chgData name="Luca Ricci" userId="S::10451631@polimi.it::ee5f09d5-0832-4e68-94c9-d8bfd2ad04f0" providerId="AD" clId="Web-{B2D310EA-72CF-4690-94EE-78BFEA809EFD}" dt="2024-01-23T15:29:45.773" v="89"/>
+          <ac:spMkLst>
+            <pc:docMk/>
+            <pc:sldMk cId="4109715435" sldId="313"/>
+            <ac:spMk id="4" creationId="{AAB1B8BC-4F92-6038-D555-1AD1EDEF431A}"/>
+          </ac:spMkLst>
+        </pc:spChg>
+        <pc:spChg chg="add del mod ord">
+          <ac:chgData name="Luca Ricci" userId="S::10451631@polimi.it::ee5f09d5-0832-4e68-94c9-d8bfd2ad04f0" providerId="AD" clId="Web-{B2D310EA-72CF-4690-94EE-78BFEA809EFD}" dt="2024-01-23T15:30:00.117" v="92"/>
+          <ac:spMkLst>
+            <pc:docMk/>
+            <pc:sldMk cId="4109715435" sldId="313"/>
+            <ac:spMk id="5" creationId="{42712514-1EB7-83FB-F854-2424E1C5F6FC}"/>
+          </ac:spMkLst>
+        </pc:spChg>
+        <pc:spChg chg="add mod ord">
+          <ac:chgData name="Luca Ricci" userId="S::10451631@polimi.it::ee5f09d5-0832-4e68-94c9-d8bfd2ad04f0" providerId="AD" clId="Web-{B2D310EA-72CF-4690-94EE-78BFEA809EFD}" dt="2024-01-23T15:58:01.521" v="949" actId="20577"/>
+          <ac:spMkLst>
+            <pc:docMk/>
+            <pc:sldMk cId="4109715435" sldId="313"/>
+            <ac:spMk id="7" creationId="{8ED043E4-ED32-1DA9-33FC-E4B34D009A79}"/>
+          </ac:spMkLst>
+        </pc:spChg>
+        <pc:picChg chg="add del mod">
+          <ac:chgData name="Luca Ricci" userId="S::10451631@polimi.it::ee5f09d5-0832-4e68-94c9-d8bfd2ad04f0" providerId="AD" clId="Web-{B2D310EA-72CF-4690-94EE-78BFEA809EFD}" dt="2024-01-23T15:50:29.821" v="912" actId="1076"/>
+          <ac:picMkLst>
+            <pc:docMk/>
+            <pc:sldMk cId="4109715435" sldId="313"/>
+            <ac:picMk id="6" creationId="{081E3E13-A1F1-4FF3-9F97-8D0431E79976}"/>
+          </ac:picMkLst>
+        </pc:picChg>
+      </pc:sldChg>
+    </pc:docChg>
+  </pc:docChgLst>
+  <pc:docChgLst>
     <pc:chgData name="Gabriele Zanoletti" userId="fc6666fa-3441-4ddc-a8b9-f69fbbdf5644" providerId="ADAL" clId="{FF896906-D997-4B2C-9772-B85E3A21DE27}"/>
     <pc:docChg chg="undo custSel delSld modSld sldOrd addSection modSection">
       <pc:chgData name="Gabriele Zanoletti" userId="fc6666fa-3441-4ddc-a8b9-f69fbbdf5644" providerId="ADAL" clId="{FF896906-D997-4B2C-9772-B85E3A21DE27}" dt="2024-01-25T12:01:57.728" v="4336" actId="47"/>
@@ -3447,117 +3558,6 @@
             <pc:docMk/>
             <pc:sldMk cId="3489691726" sldId="348"/>
             <ac:picMk id="7" creationId="{BF47B201-4C7A-808B-4502-11BCAE8039BE}"/>
-          </ac:picMkLst>
-        </pc:picChg>
-      </pc:sldChg>
-    </pc:docChg>
-  </pc:docChgLst>
-  <pc:docChgLst>
-    <pc:chgData name="Luca Ricci" userId="S::10451631@polimi.it::ee5f09d5-0832-4e68-94c9-d8bfd2ad04f0" providerId="AD" clId="Web-{B2D310EA-72CF-4690-94EE-78BFEA809EFD}"/>
-    <pc:docChg chg="modSld">
-      <pc:chgData name="Luca Ricci" userId="S::10451631@polimi.it::ee5f09d5-0832-4e68-94c9-d8bfd2ad04f0" providerId="AD" clId="Web-{B2D310EA-72CF-4690-94EE-78BFEA809EFD}" dt="2024-01-23T15:58:01.521" v="949" actId="20577"/>
-      <pc:docMkLst>
-        <pc:docMk/>
-      </pc:docMkLst>
-      <pc:sldChg chg="modSp">
-        <pc:chgData name="Luca Ricci" userId="S::10451631@polimi.it::ee5f09d5-0832-4e68-94c9-d8bfd2ad04f0" providerId="AD" clId="Web-{B2D310EA-72CF-4690-94EE-78BFEA809EFD}" dt="2024-01-23T15:26:33.096" v="66" actId="20577"/>
-        <pc:sldMkLst>
-          <pc:docMk/>
-          <pc:sldMk cId="994454846" sldId="291"/>
-        </pc:sldMkLst>
-        <pc:spChg chg="mod">
-          <ac:chgData name="Luca Ricci" userId="S::10451631@polimi.it::ee5f09d5-0832-4e68-94c9-d8bfd2ad04f0" providerId="AD" clId="Web-{B2D310EA-72CF-4690-94EE-78BFEA809EFD}" dt="2024-01-23T15:26:33.096" v="66" actId="20577"/>
-          <ac:spMkLst>
-            <pc:docMk/>
-            <pc:sldMk cId="994454846" sldId="291"/>
-            <ac:spMk id="9" creationId="{384C8E91-B72A-D715-878D-3115E7D21AE9}"/>
-          </ac:spMkLst>
-        </pc:spChg>
-      </pc:sldChg>
-      <pc:sldChg chg="addSp delSp modSp mod modClrScheme chgLayout">
-        <pc:chgData name="Luca Ricci" userId="S::10451631@polimi.it::ee5f09d5-0832-4e68-94c9-d8bfd2ad04f0" providerId="AD" clId="Web-{B2D310EA-72CF-4690-94EE-78BFEA809EFD}" dt="2024-01-23T15:58:01.521" v="949" actId="20577"/>
-        <pc:sldMkLst>
-          <pc:docMk/>
-          <pc:sldMk cId="4109715435" sldId="313"/>
-        </pc:sldMkLst>
-        <pc:spChg chg="mod ord">
-          <ac:chgData name="Luca Ricci" userId="S::10451631@polimi.it::ee5f09d5-0832-4e68-94c9-d8bfd2ad04f0" providerId="AD" clId="Web-{B2D310EA-72CF-4690-94EE-78BFEA809EFD}" dt="2024-01-23T15:41:51.589" v="722" actId="20577"/>
-          <ac:spMkLst>
-            <pc:docMk/>
-            <pc:sldMk cId="4109715435" sldId="313"/>
-            <ac:spMk id="2" creationId="{2764E89C-42F0-7F7D-800A-DA392F66BC91}"/>
-          </ac:spMkLst>
-        </pc:spChg>
-        <pc:spChg chg="mod ord">
-          <ac:chgData name="Luca Ricci" userId="S::10451631@polimi.it::ee5f09d5-0832-4e68-94c9-d8bfd2ad04f0" providerId="AD" clId="Web-{B2D310EA-72CF-4690-94EE-78BFEA809EFD}" dt="2024-01-23T15:29:45.773" v="89"/>
-          <ac:spMkLst>
-            <pc:docMk/>
-            <pc:sldMk cId="4109715435" sldId="313"/>
-            <ac:spMk id="3" creationId="{937AAAB0-FB21-FB0E-A628-9C20C23B6347}"/>
-          </ac:spMkLst>
-        </pc:spChg>
-        <pc:spChg chg="mod ord">
-          <ac:chgData name="Luca Ricci" userId="S::10451631@polimi.it::ee5f09d5-0832-4e68-94c9-d8bfd2ad04f0" providerId="AD" clId="Web-{B2D310EA-72CF-4690-94EE-78BFEA809EFD}" dt="2024-01-23T15:29:45.773" v="89"/>
-          <ac:spMkLst>
-            <pc:docMk/>
-            <pc:sldMk cId="4109715435" sldId="313"/>
-            <ac:spMk id="4" creationId="{AAB1B8BC-4F92-6038-D555-1AD1EDEF431A}"/>
-          </ac:spMkLst>
-        </pc:spChg>
-        <pc:spChg chg="add del mod ord">
-          <ac:chgData name="Luca Ricci" userId="S::10451631@polimi.it::ee5f09d5-0832-4e68-94c9-d8bfd2ad04f0" providerId="AD" clId="Web-{B2D310EA-72CF-4690-94EE-78BFEA809EFD}" dt="2024-01-23T15:30:00.117" v="92"/>
-          <ac:spMkLst>
-            <pc:docMk/>
-            <pc:sldMk cId="4109715435" sldId="313"/>
-            <ac:spMk id="5" creationId="{42712514-1EB7-83FB-F854-2424E1C5F6FC}"/>
-          </ac:spMkLst>
-        </pc:spChg>
-        <pc:spChg chg="add mod ord">
-          <ac:chgData name="Luca Ricci" userId="S::10451631@polimi.it::ee5f09d5-0832-4e68-94c9-d8bfd2ad04f0" providerId="AD" clId="Web-{B2D310EA-72CF-4690-94EE-78BFEA809EFD}" dt="2024-01-23T15:58:01.521" v="949" actId="20577"/>
-          <ac:spMkLst>
-            <pc:docMk/>
-            <pc:sldMk cId="4109715435" sldId="313"/>
-            <ac:spMk id="7" creationId="{8ED043E4-ED32-1DA9-33FC-E4B34D009A79}"/>
-          </ac:spMkLst>
-        </pc:spChg>
-        <pc:picChg chg="add del mod">
-          <ac:chgData name="Luca Ricci" userId="S::10451631@polimi.it::ee5f09d5-0832-4e68-94c9-d8bfd2ad04f0" providerId="AD" clId="Web-{B2D310EA-72CF-4690-94EE-78BFEA809EFD}" dt="2024-01-23T15:50:29.821" v="912" actId="1076"/>
-          <ac:picMkLst>
-            <pc:docMk/>
-            <pc:sldMk cId="4109715435" sldId="313"/>
-            <ac:picMk id="6" creationId="{081E3E13-A1F1-4FF3-9F97-8D0431E79976}"/>
-          </ac:picMkLst>
-        </pc:picChg>
-      </pc:sldChg>
-    </pc:docChg>
-  </pc:docChgLst>
-  <pc:docChgLst>
-    <pc:chgData name="Luca Ricci" userId="S::10451631@polimi.it::ee5f09d5-0832-4e68-94c9-d8bfd2ad04f0" providerId="AD" clId="Web-{01963A96-2E06-E2CD-1350-082BA7D4CF1B}"/>
-    <pc:docChg chg="modSld">
-      <pc:chgData name="Luca Ricci" userId="S::10451631@polimi.it::ee5f09d5-0832-4e68-94c9-d8bfd2ad04f0" providerId="AD" clId="Web-{01963A96-2E06-E2CD-1350-082BA7D4CF1B}" dt="2024-01-24T10:24:38.882" v="320"/>
-      <pc:docMkLst>
-        <pc:docMk/>
-      </pc:docMkLst>
-      <pc:sldChg chg="addSp delSp modSp modNotes">
-        <pc:chgData name="Luca Ricci" userId="S::10451631@polimi.it::ee5f09d5-0832-4e68-94c9-d8bfd2ad04f0" providerId="AD" clId="Web-{01963A96-2E06-E2CD-1350-082BA7D4CF1B}" dt="2024-01-24T10:24:38.882" v="320"/>
-        <pc:sldMkLst>
-          <pc:docMk/>
-          <pc:sldMk cId="4109715435" sldId="313"/>
-        </pc:sldMkLst>
-        <pc:picChg chg="add del mod">
-          <ac:chgData name="Luca Ricci" userId="S::10451631@polimi.it::ee5f09d5-0832-4e68-94c9-d8bfd2ad04f0" providerId="AD" clId="Web-{01963A96-2E06-E2CD-1350-082BA7D4CF1B}" dt="2024-01-24T10:24:38.882" v="320"/>
-          <ac:picMkLst>
-            <pc:docMk/>
-            <pc:sldMk cId="4109715435" sldId="313"/>
-            <ac:picMk id="5" creationId="{CA4B9B14-FA33-53DB-09E4-CEE578977A56}"/>
-          </ac:picMkLst>
-        </pc:picChg>
-        <pc:picChg chg="del">
-          <ac:chgData name="Luca Ricci" userId="S::10451631@polimi.it::ee5f09d5-0832-4e68-94c9-d8bfd2ad04f0" providerId="AD" clId="Web-{01963A96-2E06-E2CD-1350-082BA7D4CF1B}" dt="2024-01-24T10:21:46.517" v="318"/>
-          <ac:picMkLst>
-            <pc:docMk/>
-            <pc:sldMk cId="4109715435" sldId="313"/>
-            <ac:picMk id="6" creationId="{081E3E13-A1F1-4FF3-9F97-8D0431E79976}"/>
           </ac:picMkLst>
         </pc:picChg>
       </pc:sldChg>
@@ -35049,9 +35049,28 @@
               </a:lnSpc>
             </a:pPr>
             <a:r>
-              <a:rPr lang="en-US" dirty="0"/>
+              <a:rPr lang="en-US" sz="1600" dirty="0"/>
               <a:t>PRBS Signal Reading cont.</a:t>
             </a:r>
+          </a:p>
+          <a:p>
+            <a:pPr lvl="1">
+              <a:lnSpc>
+                <a:spcPct val="250000"/>
+              </a:lnSpc>
+            </a:pPr>
+            <a:r>
+              <a:rPr lang="en-US" sz="1600" dirty="0"/>
+              <a:t>Approaching an ideal calibration cont.</a:t>
+            </a:r>
+          </a:p>
+          <a:p>
+            <a:pPr lvl="1">
+              <a:lnSpc>
+                <a:spcPct val="250000"/>
+              </a:lnSpc>
+            </a:pPr>
+            <a:endParaRPr lang="en-US" dirty="0"/>
           </a:p>
         </p:txBody>
       </p:sp>
@@ -35382,7 +35401,7 @@
             </a:r>
             <a:r>
               <a:rPr lang="en-US" dirty="0"/>
-              <a:t>: We want to make sure that the signal can be . </a:t>
+              <a:t>: We want to make sure that the signal can be reversed by using an ideal calibration (infinite number of coefficients) . </a:t>
             </a:r>
           </a:p>
           <a:p>
@@ -35988,7 +36007,7 @@
             </a:r>
             <a:r>
               <a:rPr lang="en-US" dirty="0"/>
-              <a:t>: We want to make sure that the signal can be . </a:t>
+              <a:t>: We want to make sure that the signal can be reversed by using an ideal calibration (infinite number of coefficients) . </a:t>
             </a:r>
           </a:p>
           <a:p>
@@ -37403,7 +37422,11 @@
           <a:p>
             <a:r>
               <a:rPr lang="en-US" dirty="0"/>
-              <a:t>Calibrated Voltage Waveform @1GHz</a:t>
+              <a:t>Calibrated Voltage Waveform @1GHz </a:t>
+            </a:r>
+            <a:r>
+              <a:rPr lang="en-US" i="1" dirty="0"/>
+              <a:t>(#ofHarmonics = 64)</a:t>
             </a:r>
             <a:endParaRPr lang="tr-TR" dirty="0"/>
           </a:p>
@@ -37967,7 +37990,13 @@
           <a:p>
             <a:r>
               <a:rPr lang="en-US" dirty="0"/>
-              <a:t>For the next week, determine how many levels of PRBS signal is required to obtain similar coefficients</a:t>
+              <a:t>Try to fix problem of ideal calibration @2GHz.</a:t>
+            </a:r>
+          </a:p>
+          <a:p>
+            <a:r>
+              <a:rPr lang="en-US" dirty="0"/>
+              <a:t>Determine how many levels of PRBS signal is required to obtain similar coefficients</a:t>
             </a:r>
           </a:p>
           <a:p>
@@ -41270,14 +41299,6 @@
 </file>
 
 <file path=customXml/item1.xml><?xml version="1.0" encoding="utf-8"?>
-<p:properties xmlns:p="http://schemas.microsoft.com/office/2006/metadata/properties" xmlns:xsi="http://www.w3.org/2001/XMLSchema-instance" xmlns:pc="http://schemas.microsoft.com/office/infopath/2007/PartnerControls">
-  <documentManagement>
-    <Ver xmlns="a709603d-609a-478b-a91d-3c5e984c0e79">0</Ver>
-  </documentManagement>
-</p:properties>
-</file>
-
-<file path=customXml/item2.xml><?xml version="1.0" encoding="utf-8"?>
 <ct:contentTypeSchema xmlns:ct="http://schemas.microsoft.com/office/2006/metadata/contentType" xmlns:ma="http://schemas.microsoft.com/office/2006/metadata/properties/metaAttributes" ct:_="" ma:_="" ma:contentTypeName="Document" ma:contentTypeID="0x010100A655AAE9148B404486CBFDD74AD2AA0B" ma:contentTypeVersion="2" ma:contentTypeDescription="Create a new document." ma:contentTypeScope="" ma:versionID="a24cc1775e4f53b56bd6bf310015a115">
   <xsd:schema xmlns:xsd="http://www.w3.org/2001/XMLSchema" xmlns:xs="http://www.w3.org/2001/XMLSchema" xmlns:p="http://schemas.microsoft.com/office/2006/metadata/properties" xmlns:ns2="a709603d-609a-478b-a91d-3c5e984c0e79" xmlns:ns3="6ef45842-284e-44e4-b2db-1749e7948b44" targetNamespace="http://schemas.microsoft.com/office/2006/metadata/properties" ma:root="true" ma:fieldsID="f8923fe8aa0ace7ab58ef4ccc8b43a85" ns2:_="" ns3:_="">
     <xsd:import namespace="a709603d-609a-478b-a91d-3c5e984c0e79"/>
@@ -41428,6 +41449,16 @@
 </ct:contentTypeSchema>
 </file>
 
+<file path=customXml/item2.xml><?xml version="1.0" encoding="utf-8"?>
+<?mso-contentType ?>
+<customXsn xmlns="http://schemas.microsoft.com/office/2006/metadata/customXsn">
+  <xsnLocation/>
+  <cached>True</cached>
+  <openByDefault>False</openByDefault>
+  <xsnScope/>
+</customXsn>
+</file>
+
 <file path=customXml/item3.xml><?xml version="1.0" encoding="utf-8"?>
 <?mso-contentType ?>
 <FormTemplates xmlns="http://schemas.microsoft.com/sharepoint/v3/contenttype/forms">
@@ -41438,33 +41469,14 @@
 </file>
 
 <file path=customXml/item4.xml><?xml version="1.0" encoding="utf-8"?>
-<?mso-contentType ?>
-<customXsn xmlns="http://schemas.microsoft.com/office/2006/metadata/customXsn">
-  <xsnLocation/>
-  <cached>True</cached>
-  <openByDefault>False</openByDefault>
-  <xsnScope/>
-</customXsn>
+<p:properties xmlns:p="http://schemas.microsoft.com/office/2006/metadata/properties" xmlns:xsi="http://www.w3.org/2001/XMLSchema-instance" xmlns:pc="http://schemas.microsoft.com/office/infopath/2007/PartnerControls">
+  <documentManagement>
+    <Ver xmlns="a709603d-609a-478b-a91d-3c5e984c0e79">0</Ver>
+  </documentManagement>
+</p:properties>
 </file>
 
 <file path=customXml/itemProps1.xml><?xml version="1.0" encoding="utf-8"?>
-<ds:datastoreItem xmlns:ds="http://schemas.openxmlformats.org/officeDocument/2006/customXml" ds:itemID="{D299A1D5-F553-4264-9022-E0136C61CE27}">
-  <ds:schemaRefs>
-    <ds:schemaRef ds:uri="http://schemas.microsoft.com/office/2006/documentManagement/types"/>
-    <ds:schemaRef ds:uri="a709603d-609a-478b-a91d-3c5e984c0e79"/>
-    <ds:schemaRef ds:uri="http://purl.org/dc/dcmitype/"/>
-    <ds:schemaRef ds:uri="6ef45842-284e-44e4-b2db-1749e7948b44"/>
-    <ds:schemaRef ds:uri="http://purl.org/dc/elements/1.1/"/>
-    <ds:schemaRef ds:uri="http://schemas.microsoft.com/office/infopath/2007/PartnerControls"/>
-    <ds:schemaRef ds:uri="http://purl.org/dc/terms/"/>
-    <ds:schemaRef ds:uri="http://schemas.openxmlformats.org/package/2006/metadata/core-properties"/>
-    <ds:schemaRef ds:uri="http://schemas.microsoft.com/office/2006/metadata/properties"/>
-    <ds:schemaRef ds:uri="http://www.w3.org/XML/1998/namespace"/>
-  </ds:schemaRefs>
-</ds:datastoreItem>
-</file>
-
-<file path=customXml/itemProps2.xml><?xml version="1.0" encoding="utf-8"?>
 <ds:datastoreItem xmlns:ds="http://schemas.openxmlformats.org/officeDocument/2006/customXml" ds:itemID="{AF2014AB-78C2-4F59-9D6E-9572E72F7781}">
   <ds:schemaRefs>
     <ds:schemaRef ds:uri="6ef45842-284e-44e4-b2db-1749e7948b44"/>
@@ -41483,6 +41495,14 @@
 </ds:datastoreItem>
 </file>
 
+<file path=customXml/itemProps2.xml><?xml version="1.0" encoding="utf-8"?>
+<ds:datastoreItem xmlns:ds="http://schemas.openxmlformats.org/officeDocument/2006/customXml" ds:itemID="{EC144A13-A380-40B3-9980-61BD11F58D02}">
+  <ds:schemaRefs>
+    <ds:schemaRef ds:uri="http://schemas.microsoft.com/office/2006/metadata/customXsn"/>
+  </ds:schemaRefs>
+</ds:datastoreItem>
+</file>
+
 <file path=customXml/itemProps3.xml><?xml version="1.0" encoding="utf-8"?>
 <ds:datastoreItem xmlns:ds="http://schemas.openxmlformats.org/officeDocument/2006/customXml" ds:itemID="{63C6748B-B74E-4BE1-834C-AEBB9BCA18FB}">
   <ds:schemaRefs>
@@ -41492,9 +41512,18 @@
 </file>
 
 <file path=customXml/itemProps4.xml><?xml version="1.0" encoding="utf-8"?>
-<ds:datastoreItem xmlns:ds="http://schemas.openxmlformats.org/officeDocument/2006/customXml" ds:itemID="{EC144A13-A380-40B3-9980-61BD11F58D02}">
+<ds:datastoreItem xmlns:ds="http://schemas.openxmlformats.org/officeDocument/2006/customXml" ds:itemID="{D299A1D5-F553-4264-9022-E0136C61CE27}">
   <ds:schemaRefs>
-    <ds:schemaRef ds:uri="http://schemas.microsoft.com/office/2006/metadata/customXsn"/>
+    <ds:schemaRef ds:uri="http://schemas.microsoft.com/office/2006/documentManagement/types"/>
+    <ds:schemaRef ds:uri="a709603d-609a-478b-a91d-3c5e984c0e79"/>
+    <ds:schemaRef ds:uri="http://purl.org/dc/dcmitype/"/>
+    <ds:schemaRef ds:uri="6ef45842-284e-44e4-b2db-1749e7948b44"/>
+    <ds:schemaRef ds:uri="http://purl.org/dc/elements/1.1/"/>
+    <ds:schemaRef ds:uri="http://schemas.microsoft.com/office/infopath/2007/PartnerControls"/>
+    <ds:schemaRef ds:uri="http://purl.org/dc/terms/"/>
+    <ds:schemaRef ds:uri="http://schemas.openxmlformats.org/package/2006/metadata/core-properties"/>
+    <ds:schemaRef ds:uri="http://schemas.microsoft.com/office/2006/metadata/properties"/>
+    <ds:schemaRef ds:uri="http://www.w3.org/XML/1998/namespace"/>
   </ds:schemaRefs>
 </ds:datastoreItem>
 </file>
</xml_diff>

<commit_message>
new figures added for the new presentation and updated gpa calculator
</commit_message>
<xml_diff>
--- a/Presentations/presentation5_4_sep/20250904_bi.pptx
+++ b/Presentations/presentation5_4_sep/20250904_bi.pptx
@@ -3119,117 +3119,6 @@
     </pc:docChg>
   </pc:docChgLst>
   <pc:docChgLst>
-    <pc:chgData name="Luca Ricci" userId="S::10451631@polimi.it::ee5f09d5-0832-4e68-94c9-d8bfd2ad04f0" providerId="AD" clId="Web-{01963A96-2E06-E2CD-1350-082BA7D4CF1B}"/>
-    <pc:docChg chg="modSld">
-      <pc:chgData name="Luca Ricci" userId="S::10451631@polimi.it::ee5f09d5-0832-4e68-94c9-d8bfd2ad04f0" providerId="AD" clId="Web-{01963A96-2E06-E2CD-1350-082BA7D4CF1B}" dt="2024-01-24T10:24:38.882" v="320"/>
-      <pc:docMkLst>
-        <pc:docMk/>
-      </pc:docMkLst>
-      <pc:sldChg chg="addSp delSp modSp modNotes">
-        <pc:chgData name="Luca Ricci" userId="S::10451631@polimi.it::ee5f09d5-0832-4e68-94c9-d8bfd2ad04f0" providerId="AD" clId="Web-{01963A96-2E06-E2CD-1350-082BA7D4CF1B}" dt="2024-01-24T10:24:38.882" v="320"/>
-        <pc:sldMkLst>
-          <pc:docMk/>
-          <pc:sldMk cId="4109715435" sldId="313"/>
-        </pc:sldMkLst>
-        <pc:picChg chg="add del mod">
-          <ac:chgData name="Luca Ricci" userId="S::10451631@polimi.it::ee5f09d5-0832-4e68-94c9-d8bfd2ad04f0" providerId="AD" clId="Web-{01963A96-2E06-E2CD-1350-082BA7D4CF1B}" dt="2024-01-24T10:24:38.882" v="320"/>
-          <ac:picMkLst>
-            <pc:docMk/>
-            <pc:sldMk cId="4109715435" sldId="313"/>
-            <ac:picMk id="5" creationId="{CA4B9B14-FA33-53DB-09E4-CEE578977A56}"/>
-          </ac:picMkLst>
-        </pc:picChg>
-        <pc:picChg chg="del">
-          <ac:chgData name="Luca Ricci" userId="S::10451631@polimi.it::ee5f09d5-0832-4e68-94c9-d8bfd2ad04f0" providerId="AD" clId="Web-{01963A96-2E06-E2CD-1350-082BA7D4CF1B}" dt="2024-01-24T10:21:46.517" v="318"/>
-          <ac:picMkLst>
-            <pc:docMk/>
-            <pc:sldMk cId="4109715435" sldId="313"/>
-            <ac:picMk id="6" creationId="{081E3E13-A1F1-4FF3-9F97-8D0431E79976}"/>
-          </ac:picMkLst>
-        </pc:picChg>
-      </pc:sldChg>
-    </pc:docChg>
-  </pc:docChgLst>
-  <pc:docChgLst>
-    <pc:chgData name="Luca Ricci" userId="S::10451631@polimi.it::ee5f09d5-0832-4e68-94c9-d8bfd2ad04f0" providerId="AD" clId="Web-{B2D310EA-72CF-4690-94EE-78BFEA809EFD}"/>
-    <pc:docChg chg="modSld">
-      <pc:chgData name="Luca Ricci" userId="S::10451631@polimi.it::ee5f09d5-0832-4e68-94c9-d8bfd2ad04f0" providerId="AD" clId="Web-{B2D310EA-72CF-4690-94EE-78BFEA809EFD}" dt="2024-01-23T15:58:01.521" v="949" actId="20577"/>
-      <pc:docMkLst>
-        <pc:docMk/>
-      </pc:docMkLst>
-      <pc:sldChg chg="modSp">
-        <pc:chgData name="Luca Ricci" userId="S::10451631@polimi.it::ee5f09d5-0832-4e68-94c9-d8bfd2ad04f0" providerId="AD" clId="Web-{B2D310EA-72CF-4690-94EE-78BFEA809EFD}" dt="2024-01-23T15:26:33.096" v="66" actId="20577"/>
-        <pc:sldMkLst>
-          <pc:docMk/>
-          <pc:sldMk cId="994454846" sldId="291"/>
-        </pc:sldMkLst>
-        <pc:spChg chg="mod">
-          <ac:chgData name="Luca Ricci" userId="S::10451631@polimi.it::ee5f09d5-0832-4e68-94c9-d8bfd2ad04f0" providerId="AD" clId="Web-{B2D310EA-72CF-4690-94EE-78BFEA809EFD}" dt="2024-01-23T15:26:33.096" v="66" actId="20577"/>
-          <ac:spMkLst>
-            <pc:docMk/>
-            <pc:sldMk cId="994454846" sldId="291"/>
-            <ac:spMk id="9" creationId="{384C8E91-B72A-D715-878D-3115E7D21AE9}"/>
-          </ac:spMkLst>
-        </pc:spChg>
-      </pc:sldChg>
-      <pc:sldChg chg="addSp delSp modSp mod modClrScheme chgLayout">
-        <pc:chgData name="Luca Ricci" userId="S::10451631@polimi.it::ee5f09d5-0832-4e68-94c9-d8bfd2ad04f0" providerId="AD" clId="Web-{B2D310EA-72CF-4690-94EE-78BFEA809EFD}" dt="2024-01-23T15:58:01.521" v="949" actId="20577"/>
-        <pc:sldMkLst>
-          <pc:docMk/>
-          <pc:sldMk cId="4109715435" sldId="313"/>
-        </pc:sldMkLst>
-        <pc:spChg chg="mod ord">
-          <ac:chgData name="Luca Ricci" userId="S::10451631@polimi.it::ee5f09d5-0832-4e68-94c9-d8bfd2ad04f0" providerId="AD" clId="Web-{B2D310EA-72CF-4690-94EE-78BFEA809EFD}" dt="2024-01-23T15:41:51.589" v="722" actId="20577"/>
-          <ac:spMkLst>
-            <pc:docMk/>
-            <pc:sldMk cId="4109715435" sldId="313"/>
-            <ac:spMk id="2" creationId="{2764E89C-42F0-7F7D-800A-DA392F66BC91}"/>
-          </ac:spMkLst>
-        </pc:spChg>
-        <pc:spChg chg="mod ord">
-          <ac:chgData name="Luca Ricci" userId="S::10451631@polimi.it::ee5f09d5-0832-4e68-94c9-d8bfd2ad04f0" providerId="AD" clId="Web-{B2D310EA-72CF-4690-94EE-78BFEA809EFD}" dt="2024-01-23T15:29:45.773" v="89"/>
-          <ac:spMkLst>
-            <pc:docMk/>
-            <pc:sldMk cId="4109715435" sldId="313"/>
-            <ac:spMk id="3" creationId="{937AAAB0-FB21-FB0E-A628-9C20C23B6347}"/>
-          </ac:spMkLst>
-        </pc:spChg>
-        <pc:spChg chg="mod ord">
-          <ac:chgData name="Luca Ricci" userId="S::10451631@polimi.it::ee5f09d5-0832-4e68-94c9-d8bfd2ad04f0" providerId="AD" clId="Web-{B2D310EA-72CF-4690-94EE-78BFEA809EFD}" dt="2024-01-23T15:29:45.773" v="89"/>
-          <ac:spMkLst>
-            <pc:docMk/>
-            <pc:sldMk cId="4109715435" sldId="313"/>
-            <ac:spMk id="4" creationId="{AAB1B8BC-4F92-6038-D555-1AD1EDEF431A}"/>
-          </ac:spMkLst>
-        </pc:spChg>
-        <pc:spChg chg="add del mod ord">
-          <ac:chgData name="Luca Ricci" userId="S::10451631@polimi.it::ee5f09d5-0832-4e68-94c9-d8bfd2ad04f0" providerId="AD" clId="Web-{B2D310EA-72CF-4690-94EE-78BFEA809EFD}" dt="2024-01-23T15:30:00.117" v="92"/>
-          <ac:spMkLst>
-            <pc:docMk/>
-            <pc:sldMk cId="4109715435" sldId="313"/>
-            <ac:spMk id="5" creationId="{42712514-1EB7-83FB-F854-2424E1C5F6FC}"/>
-          </ac:spMkLst>
-        </pc:spChg>
-        <pc:spChg chg="add mod ord">
-          <ac:chgData name="Luca Ricci" userId="S::10451631@polimi.it::ee5f09d5-0832-4e68-94c9-d8bfd2ad04f0" providerId="AD" clId="Web-{B2D310EA-72CF-4690-94EE-78BFEA809EFD}" dt="2024-01-23T15:58:01.521" v="949" actId="20577"/>
-          <ac:spMkLst>
-            <pc:docMk/>
-            <pc:sldMk cId="4109715435" sldId="313"/>
-            <ac:spMk id="7" creationId="{8ED043E4-ED32-1DA9-33FC-E4B34D009A79}"/>
-          </ac:spMkLst>
-        </pc:spChg>
-        <pc:picChg chg="add del mod">
-          <ac:chgData name="Luca Ricci" userId="S::10451631@polimi.it::ee5f09d5-0832-4e68-94c9-d8bfd2ad04f0" providerId="AD" clId="Web-{B2D310EA-72CF-4690-94EE-78BFEA809EFD}" dt="2024-01-23T15:50:29.821" v="912" actId="1076"/>
-          <ac:picMkLst>
-            <pc:docMk/>
-            <pc:sldMk cId="4109715435" sldId="313"/>
-            <ac:picMk id="6" creationId="{081E3E13-A1F1-4FF3-9F97-8D0431E79976}"/>
-          </ac:picMkLst>
-        </pc:picChg>
-      </pc:sldChg>
-    </pc:docChg>
-  </pc:docChgLst>
-  <pc:docChgLst>
     <pc:chgData name="Gabriele Zanoletti" userId="fc6666fa-3441-4ddc-a8b9-f69fbbdf5644" providerId="ADAL" clId="{FF896906-D997-4B2C-9772-B85E3A21DE27}"/>
     <pc:docChg chg="undo custSel delSld modSld sldOrd addSection modSection">
       <pc:chgData name="Gabriele Zanoletti" userId="fc6666fa-3441-4ddc-a8b9-f69fbbdf5644" providerId="ADAL" clId="{FF896906-D997-4B2C-9772-B85E3A21DE27}" dt="2024-01-25T12:01:57.728" v="4336" actId="47"/>
@@ -3558,6 +3447,117 @@
             <pc:docMk/>
             <pc:sldMk cId="3489691726" sldId="348"/>
             <ac:picMk id="7" creationId="{BF47B201-4C7A-808B-4502-11BCAE8039BE}"/>
+          </ac:picMkLst>
+        </pc:picChg>
+      </pc:sldChg>
+    </pc:docChg>
+  </pc:docChgLst>
+  <pc:docChgLst>
+    <pc:chgData name="Luca Ricci" userId="S::10451631@polimi.it::ee5f09d5-0832-4e68-94c9-d8bfd2ad04f0" providerId="AD" clId="Web-{B2D310EA-72CF-4690-94EE-78BFEA809EFD}"/>
+    <pc:docChg chg="modSld">
+      <pc:chgData name="Luca Ricci" userId="S::10451631@polimi.it::ee5f09d5-0832-4e68-94c9-d8bfd2ad04f0" providerId="AD" clId="Web-{B2D310EA-72CF-4690-94EE-78BFEA809EFD}" dt="2024-01-23T15:58:01.521" v="949" actId="20577"/>
+      <pc:docMkLst>
+        <pc:docMk/>
+      </pc:docMkLst>
+      <pc:sldChg chg="modSp">
+        <pc:chgData name="Luca Ricci" userId="S::10451631@polimi.it::ee5f09d5-0832-4e68-94c9-d8bfd2ad04f0" providerId="AD" clId="Web-{B2D310EA-72CF-4690-94EE-78BFEA809EFD}" dt="2024-01-23T15:26:33.096" v="66" actId="20577"/>
+        <pc:sldMkLst>
+          <pc:docMk/>
+          <pc:sldMk cId="994454846" sldId="291"/>
+        </pc:sldMkLst>
+        <pc:spChg chg="mod">
+          <ac:chgData name="Luca Ricci" userId="S::10451631@polimi.it::ee5f09d5-0832-4e68-94c9-d8bfd2ad04f0" providerId="AD" clId="Web-{B2D310EA-72CF-4690-94EE-78BFEA809EFD}" dt="2024-01-23T15:26:33.096" v="66" actId="20577"/>
+          <ac:spMkLst>
+            <pc:docMk/>
+            <pc:sldMk cId="994454846" sldId="291"/>
+            <ac:spMk id="9" creationId="{384C8E91-B72A-D715-878D-3115E7D21AE9}"/>
+          </ac:spMkLst>
+        </pc:spChg>
+      </pc:sldChg>
+      <pc:sldChg chg="addSp delSp modSp mod modClrScheme chgLayout">
+        <pc:chgData name="Luca Ricci" userId="S::10451631@polimi.it::ee5f09d5-0832-4e68-94c9-d8bfd2ad04f0" providerId="AD" clId="Web-{B2D310EA-72CF-4690-94EE-78BFEA809EFD}" dt="2024-01-23T15:58:01.521" v="949" actId="20577"/>
+        <pc:sldMkLst>
+          <pc:docMk/>
+          <pc:sldMk cId="4109715435" sldId="313"/>
+        </pc:sldMkLst>
+        <pc:spChg chg="mod ord">
+          <ac:chgData name="Luca Ricci" userId="S::10451631@polimi.it::ee5f09d5-0832-4e68-94c9-d8bfd2ad04f0" providerId="AD" clId="Web-{B2D310EA-72CF-4690-94EE-78BFEA809EFD}" dt="2024-01-23T15:41:51.589" v="722" actId="20577"/>
+          <ac:spMkLst>
+            <pc:docMk/>
+            <pc:sldMk cId="4109715435" sldId="313"/>
+            <ac:spMk id="2" creationId="{2764E89C-42F0-7F7D-800A-DA392F66BC91}"/>
+          </ac:spMkLst>
+        </pc:spChg>
+        <pc:spChg chg="mod ord">
+          <ac:chgData name="Luca Ricci" userId="S::10451631@polimi.it::ee5f09d5-0832-4e68-94c9-d8bfd2ad04f0" providerId="AD" clId="Web-{B2D310EA-72CF-4690-94EE-78BFEA809EFD}" dt="2024-01-23T15:29:45.773" v="89"/>
+          <ac:spMkLst>
+            <pc:docMk/>
+            <pc:sldMk cId="4109715435" sldId="313"/>
+            <ac:spMk id="3" creationId="{937AAAB0-FB21-FB0E-A628-9C20C23B6347}"/>
+          </ac:spMkLst>
+        </pc:spChg>
+        <pc:spChg chg="mod ord">
+          <ac:chgData name="Luca Ricci" userId="S::10451631@polimi.it::ee5f09d5-0832-4e68-94c9-d8bfd2ad04f0" providerId="AD" clId="Web-{B2D310EA-72CF-4690-94EE-78BFEA809EFD}" dt="2024-01-23T15:29:45.773" v="89"/>
+          <ac:spMkLst>
+            <pc:docMk/>
+            <pc:sldMk cId="4109715435" sldId="313"/>
+            <ac:spMk id="4" creationId="{AAB1B8BC-4F92-6038-D555-1AD1EDEF431A}"/>
+          </ac:spMkLst>
+        </pc:spChg>
+        <pc:spChg chg="add del mod ord">
+          <ac:chgData name="Luca Ricci" userId="S::10451631@polimi.it::ee5f09d5-0832-4e68-94c9-d8bfd2ad04f0" providerId="AD" clId="Web-{B2D310EA-72CF-4690-94EE-78BFEA809EFD}" dt="2024-01-23T15:30:00.117" v="92"/>
+          <ac:spMkLst>
+            <pc:docMk/>
+            <pc:sldMk cId="4109715435" sldId="313"/>
+            <ac:spMk id="5" creationId="{42712514-1EB7-83FB-F854-2424E1C5F6FC}"/>
+          </ac:spMkLst>
+        </pc:spChg>
+        <pc:spChg chg="add mod ord">
+          <ac:chgData name="Luca Ricci" userId="S::10451631@polimi.it::ee5f09d5-0832-4e68-94c9-d8bfd2ad04f0" providerId="AD" clId="Web-{B2D310EA-72CF-4690-94EE-78BFEA809EFD}" dt="2024-01-23T15:58:01.521" v="949" actId="20577"/>
+          <ac:spMkLst>
+            <pc:docMk/>
+            <pc:sldMk cId="4109715435" sldId="313"/>
+            <ac:spMk id="7" creationId="{8ED043E4-ED32-1DA9-33FC-E4B34D009A79}"/>
+          </ac:spMkLst>
+        </pc:spChg>
+        <pc:picChg chg="add del mod">
+          <ac:chgData name="Luca Ricci" userId="S::10451631@polimi.it::ee5f09d5-0832-4e68-94c9-d8bfd2ad04f0" providerId="AD" clId="Web-{B2D310EA-72CF-4690-94EE-78BFEA809EFD}" dt="2024-01-23T15:50:29.821" v="912" actId="1076"/>
+          <ac:picMkLst>
+            <pc:docMk/>
+            <pc:sldMk cId="4109715435" sldId="313"/>
+            <ac:picMk id="6" creationId="{081E3E13-A1F1-4FF3-9F97-8D0431E79976}"/>
+          </ac:picMkLst>
+        </pc:picChg>
+      </pc:sldChg>
+    </pc:docChg>
+  </pc:docChgLst>
+  <pc:docChgLst>
+    <pc:chgData name="Luca Ricci" userId="S::10451631@polimi.it::ee5f09d5-0832-4e68-94c9-d8bfd2ad04f0" providerId="AD" clId="Web-{01963A96-2E06-E2CD-1350-082BA7D4CF1B}"/>
+    <pc:docChg chg="modSld">
+      <pc:chgData name="Luca Ricci" userId="S::10451631@polimi.it::ee5f09d5-0832-4e68-94c9-d8bfd2ad04f0" providerId="AD" clId="Web-{01963A96-2E06-E2CD-1350-082BA7D4CF1B}" dt="2024-01-24T10:24:38.882" v="320"/>
+      <pc:docMkLst>
+        <pc:docMk/>
+      </pc:docMkLst>
+      <pc:sldChg chg="addSp delSp modSp modNotes">
+        <pc:chgData name="Luca Ricci" userId="S::10451631@polimi.it::ee5f09d5-0832-4e68-94c9-d8bfd2ad04f0" providerId="AD" clId="Web-{01963A96-2E06-E2CD-1350-082BA7D4CF1B}" dt="2024-01-24T10:24:38.882" v="320"/>
+        <pc:sldMkLst>
+          <pc:docMk/>
+          <pc:sldMk cId="4109715435" sldId="313"/>
+        </pc:sldMkLst>
+        <pc:picChg chg="add del mod">
+          <ac:chgData name="Luca Ricci" userId="S::10451631@polimi.it::ee5f09d5-0832-4e68-94c9-d8bfd2ad04f0" providerId="AD" clId="Web-{01963A96-2E06-E2CD-1350-082BA7D4CF1B}" dt="2024-01-24T10:24:38.882" v="320"/>
+          <ac:picMkLst>
+            <pc:docMk/>
+            <pc:sldMk cId="4109715435" sldId="313"/>
+            <ac:picMk id="5" creationId="{CA4B9B14-FA33-53DB-09E4-CEE578977A56}"/>
+          </ac:picMkLst>
+        </pc:picChg>
+        <pc:picChg chg="del">
+          <ac:chgData name="Luca Ricci" userId="S::10451631@polimi.it::ee5f09d5-0832-4e68-94c9-d8bfd2ad04f0" providerId="AD" clId="Web-{01963A96-2E06-E2CD-1350-082BA7D4CF1B}" dt="2024-01-24T10:21:46.517" v="318"/>
+          <ac:picMkLst>
+            <pc:docMk/>
+            <pc:sldMk cId="4109715435" sldId="313"/>
+            <ac:picMk id="6" creationId="{081E3E13-A1F1-4FF3-9F97-8D0431E79976}"/>
           </ac:picMkLst>
         </pc:picChg>
       </pc:sldChg>
@@ -34699,7 +34699,7 @@
             </a:r>
             <a:r>
               <a:rPr lang="en-US" dirty="0"/>
-              <a:t>: Based on previous results, using a polynomial order of 9 and a memory order of 5 provides approximately 80 dB at 2 GHz, which matches our target. We need to verify whether this configuration is suitable for other frequencies as well. </a:t>
+              <a:t>: Based on previous results, using a polynomial order of 9 and a memory order of 5 provides approximately -80 dB at 2 GHz, which matches our target. We need to verify whether this configuration is suitable for other frequencies as well. </a:t>
             </a:r>
           </a:p>
           <a:p>
@@ -34732,14 +34732,18 @@
             </a:r>
             <a:r>
               <a:rPr lang="en-US" dirty="0"/>
-              <a:t>Calculate THD values for the input, output and calibrated waveforms. (</a:t>
-            </a:r>
-            <a:r>
-              <a:rPr lang="en-US" i="1" dirty="0"/>
+              <a:t>Calculate THD values for the input, output and calibrated waveforms. </a:t>
+            </a:r>
+            <a:r>
+              <a:rPr lang="en-US" b="1" dirty="0"/>
+              <a:t>(</a:t>
+            </a:r>
+            <a:r>
+              <a:rPr lang="en-US" b="1" i="1" dirty="0"/>
               <a:t>#ofHarmonics is 9 @1.5 GHz, 15 otherwise</a:t>
             </a:r>
             <a:r>
-              <a:rPr lang="en-US" dirty="0"/>
+              <a:rPr lang="en-US" b="1" dirty="0"/>
               <a:t>)</a:t>
             </a:r>
           </a:p>
@@ -37990,13 +37994,13 @@
           <a:p>
             <a:r>
               <a:rPr lang="en-US" dirty="0"/>
-              <a:t>Try to fix problem of ideal calibration @2GHz.</a:t>
+              <a:t>Try to fix the problem of ideal calibration @2GHz.</a:t>
             </a:r>
           </a:p>
           <a:p>
             <a:r>
               <a:rPr lang="en-US" dirty="0"/>
-              <a:t>Determine how many levels of PRBS signal is required to obtain similar coefficients</a:t>
+              <a:t>Determine how many levels of PRBS signal is required to obtain similar coefficients.</a:t>
             </a:r>
           </a:p>
           <a:p>
@@ -38102,7 +38106,7 @@
             </a:r>
             <a:r>
               <a:rPr lang="en-US" dirty="0"/>
-              <a:t>: Based on previous results, using a polynomial order of 9 and a memory order of 5 provides approximately 80 dB THD at 2 GHz, which matches our target. We need to verify whether this configuration is suitable for other frequencies as well. </a:t>
+              <a:t>: Based on previous results, using a polynomial order of 9 and a memory order of 5 provides approximately -80 dB THD at 2 GHz, which matches our target. We need to verify whether this configuration is suitable for other frequencies as well. </a:t>
             </a:r>
           </a:p>
           <a:p>
@@ -41299,6 +41303,33 @@
 </file>
 
 <file path=customXml/item1.xml><?xml version="1.0" encoding="utf-8"?>
+<?mso-contentType ?>
+<customXsn xmlns="http://schemas.microsoft.com/office/2006/metadata/customXsn">
+  <xsnLocation/>
+  <cached>True</cached>
+  <openByDefault>False</openByDefault>
+  <xsnScope/>
+</customXsn>
+</file>
+
+<file path=customXml/item2.xml><?xml version="1.0" encoding="utf-8"?>
+<p:properties xmlns:p="http://schemas.microsoft.com/office/2006/metadata/properties" xmlns:xsi="http://www.w3.org/2001/XMLSchema-instance" xmlns:pc="http://schemas.microsoft.com/office/infopath/2007/PartnerControls">
+  <documentManagement>
+    <Ver xmlns="a709603d-609a-478b-a91d-3c5e984c0e79">0</Ver>
+  </documentManagement>
+</p:properties>
+</file>
+
+<file path=customXml/item3.xml><?xml version="1.0" encoding="utf-8"?>
+<?mso-contentType ?>
+<FormTemplates xmlns="http://schemas.microsoft.com/sharepoint/v3/contenttype/forms">
+  <Display>DocumentLibraryForm</Display>
+  <Edit>DocumentLibraryForm</Edit>
+  <New>DocumentLibraryForm</New>
+</FormTemplates>
+</file>
+
+<file path=customXml/item4.xml><?xml version="1.0" encoding="utf-8"?>
 <ct:contentTypeSchema xmlns:ct="http://schemas.microsoft.com/office/2006/metadata/contentType" xmlns:ma="http://schemas.microsoft.com/office/2006/metadata/properties/metaAttributes" ct:_="" ma:_="" ma:contentTypeName="Document" ma:contentTypeID="0x010100A655AAE9148B404486CBFDD74AD2AA0B" ma:contentTypeVersion="2" ma:contentTypeDescription="Create a new document." ma:contentTypeScope="" ma:versionID="a24cc1775e4f53b56bd6bf310015a115">
   <xsd:schema xmlns:xsd="http://www.w3.org/2001/XMLSchema" xmlns:xs="http://www.w3.org/2001/XMLSchema" xmlns:p="http://schemas.microsoft.com/office/2006/metadata/properties" xmlns:ns2="a709603d-609a-478b-a91d-3c5e984c0e79" xmlns:ns3="6ef45842-284e-44e4-b2db-1749e7948b44" targetNamespace="http://schemas.microsoft.com/office/2006/metadata/properties" ma:root="true" ma:fieldsID="f8923fe8aa0ace7ab58ef4ccc8b43a85" ns2:_="" ns3:_="">
     <xsd:import namespace="a709603d-609a-478b-a91d-3c5e984c0e79"/>
@@ -41449,34 +41480,40 @@
 </ct:contentTypeSchema>
 </file>
 
-<file path=customXml/item2.xml><?xml version="1.0" encoding="utf-8"?>
-<?mso-contentType ?>
-<customXsn xmlns="http://schemas.microsoft.com/office/2006/metadata/customXsn">
-  <xsnLocation/>
-  <cached>True</cached>
-  <openByDefault>False</openByDefault>
-  <xsnScope/>
-</customXsn>
+<file path=customXml/itemProps1.xml><?xml version="1.0" encoding="utf-8"?>
+<ds:datastoreItem xmlns:ds="http://schemas.openxmlformats.org/officeDocument/2006/customXml" ds:itemID="{EC144A13-A380-40B3-9980-61BD11F58D02}">
+  <ds:schemaRefs>
+    <ds:schemaRef ds:uri="http://schemas.microsoft.com/office/2006/metadata/customXsn"/>
+  </ds:schemaRefs>
+</ds:datastoreItem>
 </file>
 
-<file path=customXml/item3.xml><?xml version="1.0" encoding="utf-8"?>
-<?mso-contentType ?>
-<FormTemplates xmlns="http://schemas.microsoft.com/sharepoint/v3/contenttype/forms">
-  <Display>DocumentLibraryForm</Display>
-  <Edit>DocumentLibraryForm</Edit>
-  <New>DocumentLibraryForm</New>
-</FormTemplates>
+<file path=customXml/itemProps2.xml><?xml version="1.0" encoding="utf-8"?>
+<ds:datastoreItem xmlns:ds="http://schemas.openxmlformats.org/officeDocument/2006/customXml" ds:itemID="{D299A1D5-F553-4264-9022-E0136C61CE27}">
+  <ds:schemaRefs>
+    <ds:schemaRef ds:uri="http://schemas.microsoft.com/office/2006/documentManagement/types"/>
+    <ds:schemaRef ds:uri="a709603d-609a-478b-a91d-3c5e984c0e79"/>
+    <ds:schemaRef ds:uri="http://purl.org/dc/dcmitype/"/>
+    <ds:schemaRef ds:uri="6ef45842-284e-44e4-b2db-1749e7948b44"/>
+    <ds:schemaRef ds:uri="http://purl.org/dc/elements/1.1/"/>
+    <ds:schemaRef ds:uri="http://schemas.microsoft.com/office/infopath/2007/PartnerControls"/>
+    <ds:schemaRef ds:uri="http://purl.org/dc/terms/"/>
+    <ds:schemaRef ds:uri="http://schemas.openxmlformats.org/package/2006/metadata/core-properties"/>
+    <ds:schemaRef ds:uri="http://schemas.microsoft.com/office/2006/metadata/properties"/>
+    <ds:schemaRef ds:uri="http://www.w3.org/XML/1998/namespace"/>
+  </ds:schemaRefs>
+</ds:datastoreItem>
 </file>
 
-<file path=customXml/item4.xml><?xml version="1.0" encoding="utf-8"?>
-<p:properties xmlns:p="http://schemas.microsoft.com/office/2006/metadata/properties" xmlns:xsi="http://www.w3.org/2001/XMLSchema-instance" xmlns:pc="http://schemas.microsoft.com/office/infopath/2007/PartnerControls">
-  <documentManagement>
-    <Ver xmlns="a709603d-609a-478b-a91d-3c5e984c0e79">0</Ver>
-  </documentManagement>
-</p:properties>
+<file path=customXml/itemProps3.xml><?xml version="1.0" encoding="utf-8"?>
+<ds:datastoreItem xmlns:ds="http://schemas.openxmlformats.org/officeDocument/2006/customXml" ds:itemID="{63C6748B-B74E-4BE1-834C-AEBB9BCA18FB}">
+  <ds:schemaRefs>
+    <ds:schemaRef ds:uri="http://schemas.microsoft.com/sharepoint/v3/contenttype/forms"/>
+  </ds:schemaRefs>
+</ds:datastoreItem>
 </file>
 
-<file path=customXml/itemProps1.xml><?xml version="1.0" encoding="utf-8"?>
+<file path=customXml/itemProps4.xml><?xml version="1.0" encoding="utf-8"?>
 <ds:datastoreItem xmlns:ds="http://schemas.openxmlformats.org/officeDocument/2006/customXml" ds:itemID="{AF2014AB-78C2-4F59-9D6E-9572E72F7781}">
   <ds:schemaRefs>
     <ds:schemaRef ds:uri="6ef45842-284e-44e4-b2db-1749e7948b44"/>
@@ -41493,37 +41530,4 @@
     <ds:schemaRef ds:uri="http://www.w3.org/2001/XMLSchema"/>
   </ds:schemaRefs>
 </ds:datastoreItem>
-</file>
-
-<file path=customXml/itemProps2.xml><?xml version="1.0" encoding="utf-8"?>
-<ds:datastoreItem xmlns:ds="http://schemas.openxmlformats.org/officeDocument/2006/customXml" ds:itemID="{EC144A13-A380-40B3-9980-61BD11F58D02}">
-  <ds:schemaRefs>
-    <ds:schemaRef ds:uri="http://schemas.microsoft.com/office/2006/metadata/customXsn"/>
-  </ds:schemaRefs>
-</ds:datastoreItem>
-</file>
-
-<file path=customXml/itemProps3.xml><?xml version="1.0" encoding="utf-8"?>
-<ds:datastoreItem xmlns:ds="http://schemas.openxmlformats.org/officeDocument/2006/customXml" ds:itemID="{63C6748B-B74E-4BE1-834C-AEBB9BCA18FB}">
-  <ds:schemaRefs>
-    <ds:schemaRef ds:uri="http://schemas.microsoft.com/sharepoint/v3/contenttype/forms"/>
-  </ds:schemaRefs>
-</ds:datastoreItem>
-</file>
-
-<file path=customXml/itemProps4.xml><?xml version="1.0" encoding="utf-8"?>
-<ds:datastoreItem xmlns:ds="http://schemas.openxmlformats.org/officeDocument/2006/customXml" ds:itemID="{D299A1D5-F553-4264-9022-E0136C61CE27}">
-  <ds:schemaRefs>
-    <ds:schemaRef ds:uri="http://schemas.microsoft.com/office/2006/documentManagement/types"/>
-    <ds:schemaRef ds:uri="a709603d-609a-478b-a91d-3c5e984c0e79"/>
-    <ds:schemaRef ds:uri="http://purl.org/dc/dcmitype/"/>
-    <ds:schemaRef ds:uri="6ef45842-284e-44e4-b2db-1749e7948b44"/>
-    <ds:schemaRef ds:uri="http://purl.org/dc/elements/1.1/"/>
-    <ds:schemaRef ds:uri="http://schemas.microsoft.com/office/infopath/2007/PartnerControls"/>
-    <ds:schemaRef ds:uri="http://purl.org/dc/terms/"/>
-    <ds:schemaRef ds:uri="http://schemas.openxmlformats.org/package/2006/metadata/core-properties"/>
-    <ds:schemaRef ds:uri="http://schemas.microsoft.com/office/2006/metadata/properties"/>
-    <ds:schemaRef ds:uri="http://www.w3.org/XML/1998/namespace"/>
-  </ds:schemaRefs>
-</ds:datastoreItem>
 </file>
</xml_diff>